<commit_message>
New figures for new simulations + new circuit in two lines
</commit_message>
<xml_diff>
--- a/Figs/circuits.pptx
+++ b/Figs/circuits.pptx
@@ -11,7 +11,7 @@
     <p:sldId id="260" r:id="rId2"/>
     <p:sldId id="261" r:id="rId3"/>
     <p:sldId id="268" r:id="rId4"/>
-    <p:sldId id="262" r:id="rId5"/>
+    <p:sldId id="269" r:id="rId5"/>
     <p:sldId id="264" r:id="rId6"/>
     <p:sldId id="265" r:id="rId7"/>
     <p:sldId id="266" r:id="rId8"/>
@@ -125,7 +125,7 @@
 <file path=ppt/revisionInfo.xml><?xml version="1.0" encoding="utf-8"?>
 <p1510:revInfo xmlns:a="http://schemas.openxmlformats.org/drawingml/2006/main" xmlns:r="http://schemas.openxmlformats.org/officeDocument/2006/relationships" xmlns:p1510="http://schemas.microsoft.com/office/powerpoint/2015/10/main">
   <p1510:revLst>
-    <p1510:client id="{757AFB6E-8BD6-4500-8559-F9A642CDA90D}" v="135" dt="2023-09-22T07:40:08.994"/>
+    <p1510:client id="{C03BB677-E050-4623-A208-34D9F8363555}" v="27" dt="2023-10-18T13:10:01.946"/>
   </p1510:revLst>
 </p1510:revInfo>
 </file>
@@ -4513,6 +4513,299 @@
           <pc:docMk/>
           <pc:sldMk cId="1281544888" sldId="279"/>
         </pc:sldMkLst>
+      </pc:sldChg>
+    </pc:docChg>
+  </pc:docChgLst>
+  <pc:docChgLst>
+    <pc:chgData name="Johann Bock Severin" userId="3b36179260fc8001" providerId="LiveId" clId="{C03BB677-E050-4623-A208-34D9F8363555}"/>
+    <pc:docChg chg="undo custSel addSld delSld modSld sldOrd">
+      <pc:chgData name="Johann Bock Severin" userId="3b36179260fc8001" providerId="LiveId" clId="{C03BB677-E050-4623-A208-34D9F8363555}" dt="2023-10-18T13:11:06.017" v="118" actId="47"/>
+      <pc:docMkLst>
+        <pc:docMk/>
+      </pc:docMkLst>
+      <pc:sldChg chg="addSp delSp modSp mod">
+        <pc:chgData name="Johann Bock Severin" userId="3b36179260fc8001" providerId="LiveId" clId="{C03BB677-E050-4623-A208-34D9F8363555}" dt="2023-10-18T13:06:38.061" v="57" actId="1076"/>
+        <pc:sldMkLst>
+          <pc:docMk/>
+          <pc:sldMk cId="1287307258" sldId="261"/>
+        </pc:sldMkLst>
+        <pc:spChg chg="del mod">
+          <ac:chgData name="Johann Bock Severin" userId="3b36179260fc8001" providerId="LiveId" clId="{C03BB677-E050-4623-A208-34D9F8363555}" dt="2023-10-18T13:04:35.830" v="24"/>
+          <ac:spMkLst>
+            <pc:docMk/>
+            <pc:sldMk cId="1287307258" sldId="261"/>
+            <ac:spMk id="2" creationId="{6D99F296-36DB-FD9B-7DFE-DE3F6F8CD24D}"/>
+          </ac:spMkLst>
+        </pc:spChg>
+        <pc:spChg chg="mod">
+          <ac:chgData name="Johann Bock Severin" userId="3b36179260fc8001" providerId="LiveId" clId="{C03BB677-E050-4623-A208-34D9F8363555}" dt="2023-10-18T13:05:05.303" v="40" actId="1076"/>
+          <ac:spMkLst>
+            <pc:docMk/>
+            <pc:sldMk cId="1287307258" sldId="261"/>
+            <ac:spMk id="5" creationId="{27AC2383-6C4D-E861-681E-45BE55EB3CDA}"/>
+          </ac:spMkLst>
+        </pc:spChg>
+        <pc:spChg chg="mod">
+          <ac:chgData name="Johann Bock Severin" userId="3b36179260fc8001" providerId="LiveId" clId="{C03BB677-E050-4623-A208-34D9F8363555}" dt="2023-10-18T13:05:05.303" v="40" actId="1076"/>
+          <ac:spMkLst>
+            <pc:docMk/>
+            <pc:sldMk cId="1287307258" sldId="261"/>
+            <ac:spMk id="6" creationId="{D9C95B52-2144-BCB7-B719-A4282C7626B6}"/>
+          </ac:spMkLst>
+        </pc:spChg>
+        <pc:spChg chg="add del mod">
+          <ac:chgData name="Johann Bock Severin" userId="3b36179260fc8001" providerId="LiveId" clId="{C03BB677-E050-4623-A208-34D9F8363555}" dt="2023-10-18T13:04:33.007" v="21"/>
+          <ac:spMkLst>
+            <pc:docMk/>
+            <pc:sldMk cId="1287307258" sldId="261"/>
+            <ac:spMk id="7" creationId="{86C0F4D8-CA53-475C-9853-6BC74300A068}"/>
+          </ac:spMkLst>
+        </pc:spChg>
+        <pc:spChg chg="add mod">
+          <ac:chgData name="Johann Bock Severin" userId="3b36179260fc8001" providerId="LiveId" clId="{C03BB677-E050-4623-A208-34D9F8363555}" dt="2023-10-18T13:06:38.061" v="57" actId="1076"/>
+          <ac:spMkLst>
+            <pc:docMk/>
+            <pc:sldMk cId="1287307258" sldId="261"/>
+            <ac:spMk id="8" creationId="{EAFD8482-E56C-7FEB-6A6E-D58D3EED0B0C}"/>
+          </ac:spMkLst>
+        </pc:spChg>
+        <pc:spChg chg="add mod">
+          <ac:chgData name="Johann Bock Severin" userId="3b36179260fc8001" providerId="LiveId" clId="{C03BB677-E050-4623-A208-34D9F8363555}" dt="2023-10-18T13:05:29.264" v="46" actId="1076"/>
+          <ac:spMkLst>
+            <pc:docMk/>
+            <pc:sldMk cId="1287307258" sldId="261"/>
+            <ac:spMk id="9" creationId="{53E21F6C-0702-D6A4-865B-77F276CABB89}"/>
+          </ac:spMkLst>
+        </pc:spChg>
+        <pc:spChg chg="add mod">
+          <ac:chgData name="Johann Bock Severin" userId="3b36179260fc8001" providerId="LiveId" clId="{C03BB677-E050-4623-A208-34D9F8363555}" dt="2023-10-18T13:06:10.029" v="54" actId="1076"/>
+          <ac:spMkLst>
+            <pc:docMk/>
+            <pc:sldMk cId="1287307258" sldId="261"/>
+            <ac:spMk id="10" creationId="{CD70FD5E-DE0E-7DE6-4F82-5F3776A580BC}"/>
+          </ac:spMkLst>
+        </pc:spChg>
+        <pc:cxnChg chg="add mod">
+          <ac:chgData name="Johann Bock Severin" userId="3b36179260fc8001" providerId="LiveId" clId="{C03BB677-E050-4623-A208-34D9F8363555}" dt="2023-10-18T13:05:05.303" v="40" actId="1076"/>
+          <ac:cxnSpMkLst>
+            <pc:docMk/>
+            <pc:sldMk cId="1287307258" sldId="261"/>
+            <ac:cxnSpMk id="3" creationId="{CA021BD1-0D32-1182-6D37-16374E0B5D55}"/>
+          </ac:cxnSpMkLst>
+        </pc:cxnChg>
+        <pc:cxnChg chg="mod ord">
+          <ac:chgData name="Johann Bock Severin" userId="3b36179260fc8001" providerId="LiveId" clId="{C03BB677-E050-4623-A208-34D9F8363555}" dt="2023-10-18T13:05:05.303" v="40" actId="1076"/>
+          <ac:cxnSpMkLst>
+            <pc:docMk/>
+            <pc:sldMk cId="1287307258" sldId="261"/>
+            <ac:cxnSpMk id="4" creationId="{C4DA9E31-4BEE-8866-CA5F-E9AE4B73D6B6}"/>
+          </ac:cxnSpMkLst>
+        </pc:cxnChg>
+      </pc:sldChg>
+      <pc:sldChg chg="addSp delSp modSp del mod">
+        <pc:chgData name="Johann Bock Severin" userId="3b36179260fc8001" providerId="LiveId" clId="{C03BB677-E050-4623-A208-34D9F8363555}" dt="2023-10-18T13:11:06.017" v="118" actId="47"/>
+        <pc:sldMkLst>
+          <pc:docMk/>
+          <pc:sldMk cId="3480871296" sldId="262"/>
+        </pc:sldMkLst>
+        <pc:spChg chg="add del mod">
+          <ac:chgData name="Johann Bock Severin" userId="3b36179260fc8001" providerId="LiveId" clId="{C03BB677-E050-4623-A208-34D9F8363555}" dt="2023-10-18T13:09:29.555" v="95"/>
+          <ac:spMkLst>
+            <pc:docMk/>
+            <pc:sldMk cId="3480871296" sldId="262"/>
+            <ac:spMk id="3" creationId="{ED9FCEF8-0E15-6DEF-F8D8-DA25DE351D2B}"/>
+          </ac:spMkLst>
+        </pc:spChg>
+        <pc:spChg chg="add del mod">
+          <ac:chgData name="Johann Bock Severin" userId="3b36179260fc8001" providerId="LiveId" clId="{C03BB677-E050-4623-A208-34D9F8363555}" dt="2023-10-18T13:09:29.555" v="95"/>
+          <ac:spMkLst>
+            <pc:docMk/>
+            <pc:sldMk cId="3480871296" sldId="262"/>
+            <ac:spMk id="10" creationId="{7ABBD571-5BF2-5CAA-24D9-97C26BE36D18}"/>
+          </ac:spMkLst>
+        </pc:spChg>
+        <pc:spChg chg="add del mod">
+          <ac:chgData name="Johann Bock Severin" userId="3b36179260fc8001" providerId="LiveId" clId="{C03BB677-E050-4623-A208-34D9F8363555}" dt="2023-10-18T13:09:29.555" v="95"/>
+          <ac:spMkLst>
+            <pc:docMk/>
+            <pc:sldMk cId="3480871296" sldId="262"/>
+            <ac:spMk id="11" creationId="{2B8F820B-8B7A-8938-4A18-4B68208020CE}"/>
+          </ac:spMkLst>
+        </pc:spChg>
+        <pc:spChg chg="add del mod">
+          <ac:chgData name="Johann Bock Severin" userId="3b36179260fc8001" providerId="LiveId" clId="{C03BB677-E050-4623-A208-34D9F8363555}" dt="2023-10-18T13:09:29.555" v="95"/>
+          <ac:spMkLst>
+            <pc:docMk/>
+            <pc:sldMk cId="3480871296" sldId="262"/>
+            <ac:spMk id="12" creationId="{E59AA955-B8AF-4CAC-60FA-479AE5CD5FCB}"/>
+          </ac:spMkLst>
+        </pc:spChg>
+        <pc:cxnChg chg="add del mod">
+          <ac:chgData name="Johann Bock Severin" userId="3b36179260fc8001" providerId="LiveId" clId="{C03BB677-E050-4623-A208-34D9F8363555}" dt="2023-10-18T13:09:29.555" v="95"/>
+          <ac:cxnSpMkLst>
+            <pc:docMk/>
+            <pc:sldMk cId="3480871296" sldId="262"/>
+            <ac:cxnSpMk id="9" creationId="{C6524148-9F5A-6F03-0578-74C18834D67B}"/>
+          </ac:cxnSpMkLst>
+        </pc:cxnChg>
+      </pc:sldChg>
+      <pc:sldChg chg="addSp delSp modSp mod">
+        <pc:chgData name="Johann Bock Severin" userId="3b36179260fc8001" providerId="LiveId" clId="{C03BB677-E050-4623-A208-34D9F8363555}" dt="2023-10-18T13:08:52.216" v="91" actId="1076"/>
+        <pc:sldMkLst>
+          <pc:docMk/>
+          <pc:sldMk cId="867113018" sldId="268"/>
+        </pc:sldMkLst>
+        <pc:spChg chg="del mod">
+          <ac:chgData name="Johann Bock Severin" userId="3b36179260fc8001" providerId="LiveId" clId="{C03BB677-E050-4623-A208-34D9F8363555}" dt="2023-10-18T13:07:00.881" v="62" actId="478"/>
+          <ac:spMkLst>
+            <pc:docMk/>
+            <pc:sldMk cId="867113018" sldId="268"/>
+            <ac:spMk id="2" creationId="{6D99F296-36DB-FD9B-7DFE-DE3F6F8CD24D}"/>
+          </ac:spMkLst>
+        </pc:spChg>
+        <pc:spChg chg="mod">
+          <ac:chgData name="Johann Bock Severin" userId="3b36179260fc8001" providerId="LiveId" clId="{C03BB677-E050-4623-A208-34D9F8363555}" dt="2023-10-18T13:07:21.258" v="67" actId="1076"/>
+          <ac:spMkLst>
+            <pc:docMk/>
+            <pc:sldMk cId="867113018" sldId="268"/>
+            <ac:spMk id="3" creationId="{0011E663-1A4F-9C08-169A-9D03B848A812}"/>
+          </ac:spMkLst>
+        </pc:spChg>
+        <pc:spChg chg="mod">
+          <ac:chgData name="Johann Bock Severin" userId="3b36179260fc8001" providerId="LiveId" clId="{C03BB677-E050-4623-A208-34D9F8363555}" dt="2023-10-18T13:07:21.258" v="67" actId="1076"/>
+          <ac:spMkLst>
+            <pc:docMk/>
+            <pc:sldMk cId="867113018" sldId="268"/>
+            <ac:spMk id="5" creationId="{27AC2383-6C4D-E861-681E-45BE55EB3CDA}"/>
+          </ac:spMkLst>
+        </pc:spChg>
+        <pc:spChg chg="mod">
+          <ac:chgData name="Johann Bock Severin" userId="3b36179260fc8001" providerId="LiveId" clId="{C03BB677-E050-4623-A208-34D9F8363555}" dt="2023-10-18T13:07:43.611" v="71" actId="1076"/>
+          <ac:spMkLst>
+            <pc:docMk/>
+            <pc:sldMk cId="867113018" sldId="268"/>
+            <ac:spMk id="6" creationId="{D9C95B52-2144-BCB7-B719-A4282C7626B6}"/>
+          </ac:spMkLst>
+        </pc:spChg>
+        <pc:spChg chg="add del mod">
+          <ac:chgData name="Johann Bock Severin" userId="3b36179260fc8001" providerId="LiveId" clId="{C03BB677-E050-4623-A208-34D9F8363555}" dt="2023-10-18T13:06:50.519" v="60"/>
+          <ac:spMkLst>
+            <pc:docMk/>
+            <pc:sldMk cId="867113018" sldId="268"/>
+            <ac:spMk id="7" creationId="{69A9A65C-EE66-5FB5-4923-7710C87FB91A}"/>
+          </ac:spMkLst>
+        </pc:spChg>
+        <pc:spChg chg="mod">
+          <ac:chgData name="Johann Bock Severin" userId="3b36179260fc8001" providerId="LiveId" clId="{C03BB677-E050-4623-A208-34D9F8363555}" dt="2023-10-18T13:08:18.980" v="84" actId="1076"/>
+          <ac:spMkLst>
+            <pc:docMk/>
+            <pc:sldMk cId="867113018" sldId="268"/>
+            <ac:spMk id="8" creationId="{BB3D137A-251E-A06D-7546-DFFC008C6B49}"/>
+          </ac:spMkLst>
+        </pc:spChg>
+        <pc:spChg chg="add del mod">
+          <ac:chgData name="Johann Bock Severin" userId="3b36179260fc8001" providerId="LiveId" clId="{C03BB677-E050-4623-A208-34D9F8363555}" dt="2023-10-18T13:06:50.519" v="60"/>
+          <ac:spMkLst>
+            <pc:docMk/>
+            <pc:sldMk cId="867113018" sldId="268"/>
+            <ac:spMk id="9" creationId="{D62DEE56-8A74-7B0D-FD97-140ADE74564A}"/>
+          </ac:spMkLst>
+        </pc:spChg>
+        <pc:spChg chg="add mod">
+          <ac:chgData name="Johann Bock Severin" userId="3b36179260fc8001" providerId="LiveId" clId="{C03BB677-E050-4623-A208-34D9F8363555}" dt="2023-10-18T13:08:43.874" v="89" actId="1076"/>
+          <ac:spMkLst>
+            <pc:docMk/>
+            <pc:sldMk cId="867113018" sldId="268"/>
+            <ac:spMk id="10" creationId="{F0D15A58-3DE7-3E51-5F4B-7D733DED2234}"/>
+          </ac:spMkLst>
+        </pc:spChg>
+        <pc:spChg chg="add mod">
+          <ac:chgData name="Johann Bock Severin" userId="3b36179260fc8001" providerId="LiveId" clId="{C03BB677-E050-4623-A208-34D9F8363555}" dt="2023-10-18T13:08:27.895" v="86" actId="1076"/>
+          <ac:spMkLst>
+            <pc:docMk/>
+            <pc:sldMk cId="867113018" sldId="268"/>
+            <ac:spMk id="11" creationId="{2A3D3EB8-A403-B7F1-1530-A15667B2DC7A}"/>
+          </ac:spMkLst>
+        </pc:spChg>
+        <pc:spChg chg="add mod">
+          <ac:chgData name="Johann Bock Severin" userId="3b36179260fc8001" providerId="LiveId" clId="{C03BB677-E050-4623-A208-34D9F8363555}" dt="2023-10-18T13:08:52.216" v="91" actId="1076"/>
+          <ac:spMkLst>
+            <pc:docMk/>
+            <pc:sldMk cId="867113018" sldId="268"/>
+            <ac:spMk id="12" creationId="{8AB39FF7-F7F9-CA04-0D59-0E1D6B4A7808}"/>
+          </ac:spMkLst>
+        </pc:spChg>
+        <pc:cxnChg chg="mod">
+          <ac:chgData name="Johann Bock Severin" userId="3b36179260fc8001" providerId="LiveId" clId="{C03BB677-E050-4623-A208-34D9F8363555}" dt="2023-10-18T13:07:21.258" v="67" actId="1076"/>
+          <ac:cxnSpMkLst>
+            <pc:docMk/>
+            <pc:sldMk cId="867113018" sldId="268"/>
+            <ac:cxnSpMk id="4" creationId="{C4DA9E31-4BEE-8866-CA5F-E9AE4B73D6B6}"/>
+          </ac:cxnSpMkLst>
+        </pc:cxnChg>
+        <pc:cxnChg chg="add mod">
+          <ac:chgData name="Johann Bock Severin" userId="3b36179260fc8001" providerId="LiveId" clId="{C03BB677-E050-4623-A208-34D9F8363555}" dt="2023-10-18T13:07:29.650" v="69" actId="1076"/>
+          <ac:cxnSpMkLst>
+            <pc:docMk/>
+            <pc:sldMk cId="867113018" sldId="268"/>
+            <ac:cxnSpMk id="13" creationId="{5651479D-4148-F973-5B35-A428B3F706DA}"/>
+          </ac:cxnSpMkLst>
+        </pc:cxnChg>
+      </pc:sldChg>
+      <pc:sldChg chg="addSp delSp modSp add mod ord">
+        <pc:chgData name="Johann Bock Severin" userId="3b36179260fc8001" providerId="LiveId" clId="{C03BB677-E050-4623-A208-34D9F8363555}" dt="2023-10-18T13:10:55.213" v="117" actId="208"/>
+        <pc:sldMkLst>
+          <pc:docMk/>
+          <pc:sldMk cId="905087242" sldId="269"/>
+        </pc:sldMkLst>
+        <pc:spChg chg="add mod ord">
+          <ac:chgData name="Johann Bock Severin" userId="3b36179260fc8001" providerId="LiveId" clId="{C03BB677-E050-4623-A208-34D9F8363555}" dt="2023-10-18T13:09:54.797" v="105" actId="1076"/>
+          <ac:spMkLst>
+            <pc:docMk/>
+            <pc:sldMk cId="905087242" sldId="269"/>
+            <ac:spMk id="2" creationId="{C0EFE72D-3B55-866C-60B8-8F8DE8FFB30C}"/>
+          </ac:spMkLst>
+        </pc:spChg>
+        <pc:spChg chg="del">
+          <ac:chgData name="Johann Bock Severin" userId="3b36179260fc8001" providerId="LiveId" clId="{C03BB677-E050-4623-A208-34D9F8363555}" dt="2023-10-18T13:09:41.162" v="99" actId="478"/>
+          <ac:spMkLst>
+            <pc:docMk/>
+            <pc:sldMk cId="905087242" sldId="269"/>
+            <ac:spMk id="5" creationId="{27AC2383-6C4D-E861-681E-45BE55EB3CDA}"/>
+          </ac:spMkLst>
+        </pc:spChg>
+        <pc:spChg chg="mod">
+          <ac:chgData name="Johann Bock Severin" userId="3b36179260fc8001" providerId="LiveId" clId="{C03BB677-E050-4623-A208-34D9F8363555}" dt="2023-10-18T13:09:52.897" v="104" actId="1076"/>
+          <ac:spMkLst>
+            <pc:docMk/>
+            <pc:sldMk cId="905087242" sldId="269"/>
+            <ac:spMk id="6" creationId="{D9C95B52-2144-BCB7-B719-A4282C7626B6}"/>
+          </ac:spMkLst>
+        </pc:spChg>
+        <pc:spChg chg="add mod">
+          <ac:chgData name="Johann Bock Severin" userId="3b36179260fc8001" providerId="LiveId" clId="{C03BB677-E050-4623-A208-34D9F8363555}" dt="2023-10-18T13:10:41.626" v="115" actId="14100"/>
+          <ac:spMkLst>
+            <pc:docMk/>
+            <pc:sldMk cId="905087242" sldId="269"/>
+            <ac:spMk id="7" creationId="{81996FED-B48A-A56E-983A-2ACD0D2E2E45}"/>
+          </ac:spMkLst>
+        </pc:spChg>
+        <pc:spChg chg="add mod">
+          <ac:chgData name="Johann Bock Severin" userId="3b36179260fc8001" providerId="LiveId" clId="{C03BB677-E050-4623-A208-34D9F8363555}" dt="2023-10-18T13:10:45.413" v="116" actId="1076"/>
+          <ac:spMkLst>
+            <pc:docMk/>
+            <pc:sldMk cId="905087242" sldId="269"/>
+            <ac:spMk id="11" creationId="{1B19C28F-BF7A-7A85-6633-4D334D86F725}"/>
+          </ac:spMkLst>
+        </pc:spChg>
+        <pc:cxnChg chg="add mod ord">
+          <ac:chgData name="Johann Bock Severin" userId="3b36179260fc8001" providerId="LiveId" clId="{C03BB677-E050-4623-A208-34D9F8363555}" dt="2023-10-18T13:10:55.213" v="117" actId="208"/>
+          <ac:cxnSpMkLst>
+            <pc:docMk/>
+            <pc:sldMk cId="905087242" sldId="269"/>
+            <ac:cxnSpMk id="13" creationId="{061099DF-BC20-A0E7-D519-7F32CDE8C83C}"/>
+          </ac:cxnSpMkLst>
+        </pc:cxnChg>
       </pc:sldChg>
     </pc:docChg>
   </pc:docChgLst>
@@ -5230,7 +5523,7 @@
           <a:p>
             <a:fld id="{53BF19A1-7C9B-4536-8619-E606248327B6}" type="datetimeFigureOut">
               <a:rPr lang="en-DK" smtClean="0"/>
-              <a:t>22/09/2023</a:t>
+              <a:t>18/10/2023</a:t>
             </a:fld>
             <a:endParaRPr lang="en-DK"/>
           </a:p>
@@ -5647,7 +5940,7 @@
           <a:p>
             <a:fld id="{B21175D6-FCE9-4988-8B6E-5CB52F8DC15C}" type="datetimeFigureOut">
               <a:rPr lang="en-DK" smtClean="0"/>
-              <a:t>22/09/2023</a:t>
+              <a:t>18/10/2023</a:t>
             </a:fld>
             <a:endParaRPr lang="en-DK"/>
           </a:p>
@@ -5847,7 +6140,7 @@
           <a:p>
             <a:fld id="{B21175D6-FCE9-4988-8B6E-5CB52F8DC15C}" type="datetimeFigureOut">
               <a:rPr lang="en-DK" smtClean="0"/>
-              <a:t>22/09/2023</a:t>
+              <a:t>18/10/2023</a:t>
             </a:fld>
             <a:endParaRPr lang="en-DK"/>
           </a:p>
@@ -6057,7 +6350,7 @@
           <a:p>
             <a:fld id="{B21175D6-FCE9-4988-8B6E-5CB52F8DC15C}" type="datetimeFigureOut">
               <a:rPr lang="en-DK" smtClean="0"/>
-              <a:t>22/09/2023</a:t>
+              <a:t>18/10/2023</a:t>
             </a:fld>
             <a:endParaRPr lang="en-DK"/>
           </a:p>
@@ -6257,7 +6550,7 @@
           <a:p>
             <a:fld id="{B21175D6-FCE9-4988-8B6E-5CB52F8DC15C}" type="datetimeFigureOut">
               <a:rPr lang="en-DK" smtClean="0"/>
-              <a:t>22/09/2023</a:t>
+              <a:t>18/10/2023</a:t>
             </a:fld>
             <a:endParaRPr lang="en-DK"/>
           </a:p>
@@ -6533,7 +6826,7 @@
           <a:p>
             <a:fld id="{B21175D6-FCE9-4988-8B6E-5CB52F8DC15C}" type="datetimeFigureOut">
               <a:rPr lang="en-DK" smtClean="0"/>
-              <a:t>22/09/2023</a:t>
+              <a:t>18/10/2023</a:t>
             </a:fld>
             <a:endParaRPr lang="en-DK"/>
           </a:p>
@@ -6801,7 +7094,7 @@
           <a:p>
             <a:fld id="{B21175D6-FCE9-4988-8B6E-5CB52F8DC15C}" type="datetimeFigureOut">
               <a:rPr lang="en-DK" smtClean="0"/>
-              <a:t>22/09/2023</a:t>
+              <a:t>18/10/2023</a:t>
             </a:fld>
             <a:endParaRPr lang="en-DK"/>
           </a:p>
@@ -7216,7 +7509,7 @@
           <a:p>
             <a:fld id="{B21175D6-FCE9-4988-8B6E-5CB52F8DC15C}" type="datetimeFigureOut">
               <a:rPr lang="en-DK" smtClean="0"/>
-              <a:t>22/09/2023</a:t>
+              <a:t>18/10/2023</a:t>
             </a:fld>
             <a:endParaRPr lang="en-DK"/>
           </a:p>
@@ -7358,7 +7651,7 @@
           <a:p>
             <a:fld id="{B21175D6-FCE9-4988-8B6E-5CB52F8DC15C}" type="datetimeFigureOut">
               <a:rPr lang="en-DK" smtClean="0"/>
-              <a:t>22/09/2023</a:t>
+              <a:t>18/10/2023</a:t>
             </a:fld>
             <a:endParaRPr lang="en-DK"/>
           </a:p>
@@ -7471,7 +7764,7 @@
           <a:p>
             <a:fld id="{B21175D6-FCE9-4988-8B6E-5CB52F8DC15C}" type="datetimeFigureOut">
               <a:rPr lang="en-DK" smtClean="0"/>
-              <a:t>22/09/2023</a:t>
+              <a:t>18/10/2023</a:t>
             </a:fld>
             <a:endParaRPr lang="en-DK"/>
           </a:p>
@@ -7784,7 +8077,7 @@
           <a:p>
             <a:fld id="{B21175D6-FCE9-4988-8B6E-5CB52F8DC15C}" type="datetimeFigureOut">
               <a:rPr lang="en-DK" smtClean="0"/>
-              <a:t>22/09/2023</a:t>
+              <a:t>18/10/2023</a:t>
             </a:fld>
             <a:endParaRPr lang="en-DK"/>
           </a:p>
@@ -8073,7 +8366,7 @@
           <a:p>
             <a:fld id="{B21175D6-FCE9-4988-8B6E-5CB52F8DC15C}" type="datetimeFigureOut">
               <a:rPr lang="en-DK" smtClean="0"/>
-              <a:t>22/09/2023</a:t>
+              <a:t>18/10/2023</a:t>
             </a:fld>
             <a:endParaRPr lang="en-DK"/>
           </a:p>
@@ -8316,7 +8609,7 @@
           <a:p>
             <a:fld id="{B21175D6-FCE9-4988-8B6E-5CB52F8DC15C}" type="datetimeFigureOut">
               <a:rPr lang="en-DK" smtClean="0"/>
-              <a:t>22/09/2023</a:t>
+              <a:t>18/10/2023</a:t>
             </a:fld>
             <a:endParaRPr lang="en-DK"/>
           </a:p>
@@ -10101,7 +10394,7 @@
         </p:nvSpPr>
         <p:spPr>
           <a:xfrm>
-            <a:off x="3632712" y="2465529"/>
+            <a:off x="4952061" y="4149462"/>
             <a:ext cx="4926576" cy="1213450"/>
           </a:xfrm>
           <a:prstGeom prst="rect">
@@ -10161,49 +10454,6 @@
           </a:p>
         </p:txBody>
       </p:sp>
-      <p:cxnSp>
-        <p:nvCxnSpPr>
-          <p:cNvPr id="4" name="Straight Connector 3">
-            <a:extLst>
-              <a:ext uri="{FF2B5EF4-FFF2-40B4-BE49-F238E27FC236}">
-                <a16:creationId xmlns:a16="http://schemas.microsoft.com/office/drawing/2014/main" id="{C4DA9E31-4BEE-8866-CA5F-E9AE4B73D6B6}"/>
-              </a:ext>
-            </a:extLst>
-          </p:cNvPr>
-          <p:cNvCxnSpPr>
-            <a:cxnSpLocks/>
-          </p:cNvCxnSpPr>
-          <p:nvPr/>
-        </p:nvCxnSpPr>
-        <p:spPr>
-          <a:xfrm>
-            <a:off x="1529123" y="3678979"/>
-            <a:ext cx="7929922" cy="0"/>
-          </a:xfrm>
-          <a:prstGeom prst="line">
-            <a:avLst/>
-          </a:prstGeom>
-          <a:ln w="76200">
-            <a:solidFill>
-              <a:schemeClr val="tx1"/>
-            </a:solidFill>
-          </a:ln>
-        </p:spPr>
-        <p:style>
-          <a:lnRef idx="1">
-            <a:schemeClr val="accent1"/>
-          </a:lnRef>
-          <a:fillRef idx="0">
-            <a:schemeClr val="accent1"/>
-          </a:fillRef>
-          <a:effectRef idx="0">
-            <a:schemeClr val="accent1"/>
-          </a:effectRef>
-          <a:fontRef idx="minor">
-            <a:schemeClr val="tx1"/>
-          </a:fontRef>
-        </p:style>
-      </p:cxnSp>
       <p:sp>
         <p:nvSpPr>
           <p:cNvPr id="5" name="Rectangle 4">
@@ -10218,7 +10468,7 @@
         </p:nvSpPr>
         <p:spPr>
           <a:xfrm>
-            <a:off x="2227162" y="2467009"/>
+            <a:off x="3121968" y="2460781"/>
             <a:ext cx="1213450" cy="1213450"/>
           </a:xfrm>
           <a:prstGeom prst="rect">
@@ -10269,14 +10519,172 @@
           </a:p>
         </p:txBody>
       </p:sp>
-      <mc:AlternateContent xmlns:mc="http://schemas.openxmlformats.org/markup-compatibility/2006" xmlns:a14="http://schemas.microsoft.com/office/drawing/2010/main">
-        <mc:Choice Requires="a14">
+      <p:cxnSp>
+        <p:nvCxnSpPr>
+          <p:cNvPr id="3" name="Straight Connector 2">
+            <a:extLst>
+              <a:ext uri="{FF2B5EF4-FFF2-40B4-BE49-F238E27FC236}">
+                <a16:creationId xmlns:a16="http://schemas.microsoft.com/office/drawing/2014/main" id="{CA021BD1-0D32-1182-6D37-16374E0B5D55}"/>
+              </a:ext>
+            </a:extLst>
+          </p:cNvPr>
+          <p:cNvCxnSpPr>
+            <a:cxnSpLocks/>
+          </p:cNvCxnSpPr>
+          <p:nvPr/>
+        </p:nvCxnSpPr>
+        <p:spPr>
+          <a:xfrm>
+            <a:off x="2423929" y="5364391"/>
+            <a:ext cx="7929922" cy="0"/>
+          </a:xfrm>
+          <a:prstGeom prst="line">
+            <a:avLst/>
+          </a:prstGeom>
+          <a:ln w="76200">
+            <a:solidFill>
+              <a:schemeClr val="tx1"/>
+            </a:solidFill>
+          </a:ln>
+        </p:spPr>
+        <p:style>
+          <a:lnRef idx="1">
+            <a:schemeClr val="accent1"/>
+          </a:lnRef>
+          <a:fillRef idx="0">
+            <a:schemeClr val="accent1"/>
+          </a:fillRef>
+          <a:effectRef idx="0">
+            <a:schemeClr val="accent1"/>
+          </a:effectRef>
+          <a:fontRef idx="minor">
+            <a:schemeClr val="tx1"/>
+          </a:fontRef>
+        </p:style>
+      </p:cxnSp>
+      <p:cxnSp>
+        <p:nvCxnSpPr>
+          <p:cNvPr id="4" name="Straight Connector 3">
+            <a:extLst>
+              <a:ext uri="{FF2B5EF4-FFF2-40B4-BE49-F238E27FC236}">
+                <a16:creationId xmlns:a16="http://schemas.microsoft.com/office/drawing/2014/main" id="{C4DA9E31-4BEE-8866-CA5F-E9AE4B73D6B6}"/>
+              </a:ext>
+            </a:extLst>
+          </p:cNvPr>
+          <p:cNvCxnSpPr>
+            <a:cxnSpLocks/>
+          </p:cNvCxnSpPr>
+          <p:nvPr/>
+        </p:nvCxnSpPr>
+        <p:spPr>
+          <a:xfrm>
+            <a:off x="2423929" y="3672751"/>
+            <a:ext cx="7929922" cy="0"/>
+          </a:xfrm>
+          <a:prstGeom prst="line">
+            <a:avLst/>
+          </a:prstGeom>
+          <a:ln w="76200">
+            <a:solidFill>
+              <a:schemeClr val="tx1"/>
+            </a:solidFill>
+          </a:ln>
+        </p:spPr>
+        <p:style>
+          <a:lnRef idx="1">
+            <a:schemeClr val="accent1"/>
+          </a:lnRef>
+          <a:fillRef idx="0">
+            <a:schemeClr val="accent1"/>
+          </a:fillRef>
+          <a:effectRef idx="0">
+            <a:schemeClr val="accent1"/>
+          </a:effectRef>
+          <a:fontRef idx="minor">
+            <a:schemeClr val="tx1"/>
+          </a:fontRef>
+        </p:style>
+      </p:cxnSp>
+      <p:sp>
+        <p:nvSpPr>
+          <p:cNvPr id="8" name="TextBox 7">
+            <a:extLst>
+              <a:ext uri="{FF2B5EF4-FFF2-40B4-BE49-F238E27FC236}">
+                <a16:creationId xmlns:a16="http://schemas.microsoft.com/office/drawing/2014/main" id="{EAFD8482-E56C-7FEB-6A6E-D58D3EED0B0C}"/>
+              </a:ext>
+            </a:extLst>
+          </p:cNvPr>
+          <p:cNvSpPr txBox="1"/>
+          <p:nvPr/>
+        </p:nvSpPr>
+        <p:spPr>
+          <a:xfrm>
+            <a:off x="164863" y="3254780"/>
+            <a:ext cx="1287532" cy="646331"/>
+          </a:xfrm>
+          <a:prstGeom prst="rect">
+            <a:avLst/>
+          </a:prstGeom>
+          <a:noFill/>
+        </p:spPr>
+        <p:txBody>
+          <a:bodyPr wrap="none" rtlCol="0">
+            <a:spAutoFit/>
+          </a:bodyPr>
+          <a:lstStyle/>
+          <a:p>
+            <a:r>
+              <a:rPr lang="en-US" sz="3600" dirty="0"/>
+              <a:t>Qubit</a:t>
+            </a:r>
+            <a:endParaRPr lang="en-DK" sz="3600" dirty="0"/>
+          </a:p>
+        </p:txBody>
+      </p:sp>
+      <p:sp>
+        <p:nvSpPr>
+          <p:cNvPr id="9" name="TextBox 8">
+            <a:extLst>
+              <a:ext uri="{FF2B5EF4-FFF2-40B4-BE49-F238E27FC236}">
+                <a16:creationId xmlns:a16="http://schemas.microsoft.com/office/drawing/2014/main" id="{53E21F6C-0702-D6A4-865B-77F276CABB89}"/>
+              </a:ext>
+            </a:extLst>
+          </p:cNvPr>
+          <p:cNvSpPr txBox="1"/>
+          <p:nvPr/>
+        </p:nvSpPr>
+        <p:spPr>
+          <a:xfrm>
+            <a:off x="110475" y="4934939"/>
+            <a:ext cx="2313454" cy="646331"/>
+          </a:xfrm>
+          <a:prstGeom prst="rect">
+            <a:avLst/>
+          </a:prstGeom>
+          <a:noFill/>
+        </p:spPr>
+        <p:txBody>
+          <a:bodyPr wrap="none" rtlCol="0">
+            <a:spAutoFit/>
+          </a:bodyPr>
+          <a:lstStyle/>
+          <a:p>
+            <a:r>
+              <a:rPr lang="en-US" sz="3600" dirty="0"/>
+              <a:t>Resonator</a:t>
+            </a:r>
+            <a:endParaRPr lang="en-DK" sz="3600" dirty="0"/>
+          </a:p>
+        </p:txBody>
+      </p:sp>
+      <mc:AlternateContent xmlns:mc="http://schemas.openxmlformats.org/markup-compatibility/2006">
+        <mc:Choice xmlns:a14="http://schemas.microsoft.com/office/drawing/2010/main" Requires="a14">
           <p:sp>
             <p:nvSpPr>
-              <p:cNvPr id="2" name="TextBox 1">
+              <p:cNvPr id="10" name="TextBox 9">
                 <a:extLst>
                   <a:ext uri="{FF2B5EF4-FFF2-40B4-BE49-F238E27FC236}">
-                    <a16:creationId xmlns:a16="http://schemas.microsoft.com/office/drawing/2014/main" id="{6D99F296-36DB-FD9B-7DFE-DE3F6F8CD24D}"/>
+                    <a16:creationId xmlns:a16="http://schemas.microsoft.com/office/drawing/2014/main" id="{CD70FD5E-DE0E-7DE6-4F82-5F3776A580BC}"/>
                   </a:ext>
                 </a:extLst>
               </p:cNvPr>
@@ -10285,8 +10693,8 @@
             </p:nvSpPr>
             <p:spPr>
               <a:xfrm>
-                <a:off x="460076" y="3179021"/>
-                <a:ext cx="1141659" cy="830997"/>
+                <a:off x="1452395" y="3254780"/>
+                <a:ext cx="880369" cy="646331"/>
               </a:xfrm>
               <a:prstGeom prst="rect">
                 <a:avLst/>
@@ -10307,38 +10715,26 @@
                     </m:oMathParaPr>
                     <m:oMath xmlns:m="http://schemas.openxmlformats.org/officeDocument/2006/math">
                       <m:r>
-                        <a:rPr lang="en-US" sz="4800" b="1" i="1" smtClean="0">
+                        <a:rPr lang="en-US" sz="3600" b="0" i="1" smtClean="0">
                           <a:latin typeface="Cambria Math" panose="02040503050406030204" pitchFamily="18" charset="0"/>
                         </a:rPr>
-                        <m:t>|</m:t>
-                      </m:r>
-                      <m:r>
-                        <a:rPr lang="en-US" sz="4800" b="1" i="1" smtClean="0">
-                          <a:latin typeface="Cambria Math" panose="02040503050406030204" pitchFamily="18" charset="0"/>
-                        </a:rPr>
-                        <m:t>𝟎</m:t>
-                      </m:r>
-                      <m:r>
-                        <a:rPr lang="en-US" sz="4800" b="1" i="1" smtClean="0">
-                          <a:latin typeface="Cambria Math" panose="02040503050406030204" pitchFamily="18" charset="0"/>
-                        </a:rPr>
-                        <m:t>⟩</m:t>
+                        <m:t>|0⟩</m:t>
                       </m:r>
                     </m:oMath>
                   </m:oMathPara>
                 </a14:m>
-                <a:endParaRPr lang="en-DK" sz="4800" b="1" dirty="0"/>
+                <a:endParaRPr lang="en-DK" sz="3600" dirty="0"/>
               </a:p>
             </p:txBody>
           </p:sp>
         </mc:Choice>
-        <mc:Fallback xmlns="">
+        <mc:Fallback>
           <p:sp>
             <p:nvSpPr>
-              <p:cNvPr id="2" name="TextBox 1">
+              <p:cNvPr id="10" name="TextBox 9">
                 <a:extLst>
                   <a:ext uri="{FF2B5EF4-FFF2-40B4-BE49-F238E27FC236}">
-                    <a16:creationId xmlns:a16="http://schemas.microsoft.com/office/drawing/2014/main" id="{6D99F296-36DB-FD9B-7DFE-DE3F6F8CD24D}"/>
+                    <a16:creationId xmlns:a16="http://schemas.microsoft.com/office/drawing/2014/main" id="{CD70FD5E-DE0E-7DE6-4F82-5F3776A580BC}"/>
                   </a:ext>
                 </a:extLst>
               </p:cNvPr>
@@ -10349,8 +10745,8 @@
             </p:nvSpPr>
             <p:spPr>
               <a:xfrm>
-                <a:off x="460076" y="3179021"/>
-                <a:ext cx="1141659" cy="830997"/>
+                <a:off x="1452395" y="3254780"/>
+                <a:ext cx="880369" cy="646331"/>
               </a:xfrm>
               <a:prstGeom prst="rect">
                 <a:avLst/>
@@ -10433,7 +10829,7 @@
         </p:nvSpPr>
         <p:spPr>
           <a:xfrm>
-            <a:off x="2480312" y="2047338"/>
+            <a:off x="3569972" y="1996955"/>
             <a:ext cx="769830" cy="1631641"/>
           </a:xfrm>
           <a:prstGeom prst="rect">
@@ -10490,7 +10886,7 @@
         </p:nvSpPr>
         <p:spPr>
           <a:xfrm>
-            <a:off x="3632712" y="2465529"/>
+            <a:off x="5004312" y="4128081"/>
             <a:ext cx="4926576" cy="1213450"/>
           </a:xfrm>
           <a:prstGeom prst="rect">
@@ -10566,7 +10962,7 @@
         </p:nvCxnSpPr>
         <p:spPr>
           <a:xfrm>
-            <a:off x="1529123" y="3678979"/>
+            <a:off x="2618783" y="3628596"/>
             <a:ext cx="7929922" cy="0"/>
           </a:xfrm>
           <a:prstGeom prst="line">
@@ -10593,114 +10989,6 @@
           </a:fontRef>
         </p:style>
       </p:cxnSp>
-      <mc:AlternateContent xmlns:mc="http://schemas.openxmlformats.org/markup-compatibility/2006" xmlns:a14="http://schemas.microsoft.com/office/drawing/2010/main">
-        <mc:Choice Requires="a14">
-          <p:sp>
-            <p:nvSpPr>
-              <p:cNvPr id="2" name="TextBox 1">
-                <a:extLst>
-                  <a:ext uri="{FF2B5EF4-FFF2-40B4-BE49-F238E27FC236}">
-                    <a16:creationId xmlns:a16="http://schemas.microsoft.com/office/drawing/2014/main" id="{6D99F296-36DB-FD9B-7DFE-DE3F6F8CD24D}"/>
-                  </a:ext>
-                </a:extLst>
-              </p:cNvPr>
-              <p:cNvSpPr txBox="1"/>
-              <p:nvPr/>
-            </p:nvSpPr>
-            <p:spPr>
-              <a:xfrm>
-                <a:off x="460076" y="3179021"/>
-                <a:ext cx="1141659" cy="830997"/>
-              </a:xfrm>
-              <a:prstGeom prst="rect">
-                <a:avLst/>
-              </a:prstGeom>
-              <a:noFill/>
-            </p:spPr>
-            <p:txBody>
-              <a:bodyPr wrap="none" rtlCol="0">
-                <a:spAutoFit/>
-              </a:bodyPr>
-              <a:lstStyle/>
-              <a:p>
-                <a:pPr/>
-                <a14:m>
-                  <m:oMathPara xmlns:m="http://schemas.openxmlformats.org/officeDocument/2006/math">
-                    <m:oMathParaPr>
-                      <m:jc m:val="centerGroup"/>
-                    </m:oMathParaPr>
-                    <m:oMath xmlns:m="http://schemas.openxmlformats.org/officeDocument/2006/math">
-                      <m:r>
-                        <a:rPr lang="en-US" sz="4800" b="1" i="1" smtClean="0">
-                          <a:latin typeface="Cambria Math" panose="02040503050406030204" pitchFamily="18" charset="0"/>
-                        </a:rPr>
-                        <m:t>|</m:t>
-                      </m:r>
-                      <m:r>
-                        <a:rPr lang="en-US" sz="4800" b="1" i="1" smtClean="0">
-                          <a:latin typeface="Cambria Math" panose="02040503050406030204" pitchFamily="18" charset="0"/>
-                        </a:rPr>
-                        <m:t>𝟎</m:t>
-                      </m:r>
-                      <m:r>
-                        <a:rPr lang="en-US" sz="4800" b="1" i="1" smtClean="0">
-                          <a:latin typeface="Cambria Math" panose="02040503050406030204" pitchFamily="18" charset="0"/>
-                        </a:rPr>
-                        <m:t>⟩</m:t>
-                      </m:r>
-                    </m:oMath>
-                  </m:oMathPara>
-                </a14:m>
-                <a:endParaRPr lang="en-DK" sz="4800" b="1" dirty="0"/>
-              </a:p>
-            </p:txBody>
-          </p:sp>
-        </mc:Choice>
-        <mc:Fallback xmlns="">
-          <p:sp>
-            <p:nvSpPr>
-              <p:cNvPr id="2" name="TextBox 1">
-                <a:extLst>
-                  <a:ext uri="{FF2B5EF4-FFF2-40B4-BE49-F238E27FC236}">
-                    <a16:creationId xmlns:a16="http://schemas.microsoft.com/office/drawing/2014/main" id="{6D99F296-36DB-FD9B-7DFE-DE3F6F8CD24D}"/>
-                  </a:ext>
-                </a:extLst>
-              </p:cNvPr>
-              <p:cNvSpPr txBox="1">
-                <a:spLocks noRot="1" noChangeAspect="1" noMove="1" noResize="1" noEditPoints="1" noAdjustHandles="1" noChangeArrowheads="1" noChangeShapeType="1" noTextEdit="1"/>
-              </p:cNvSpPr>
-              <p:nvPr/>
-            </p:nvSpPr>
-            <p:spPr>
-              <a:xfrm>
-                <a:off x="460076" y="3179021"/>
-                <a:ext cx="1141659" cy="830997"/>
-              </a:xfrm>
-              <a:prstGeom prst="rect">
-                <a:avLst/>
-              </a:prstGeom>
-              <a:blipFill>
-                <a:blip r:embed="rId2"/>
-                <a:stretch>
-                  <a:fillRect/>
-                </a:stretch>
-              </a:blipFill>
-            </p:spPr>
-            <p:txBody>
-              <a:bodyPr/>
-              <a:lstStyle/>
-              <a:p>
-                <a:r>
-                  <a:rPr lang="en-DK">
-                    <a:noFill/>
-                  </a:rPr>
-                  <a:t> </a:t>
-                </a:r>
-              </a:p>
-            </p:txBody>
-          </p:sp>
-        </mc:Fallback>
-      </mc:AlternateContent>
       <p:sp>
         <p:nvSpPr>
           <p:cNvPr id="3" name="Right Brace 2">
@@ -10715,7 +11003,7 @@
         </p:nvSpPr>
         <p:spPr>
           <a:xfrm flipH="1">
-            <a:off x="1818821" y="2047337"/>
+            <a:off x="2908481" y="1996954"/>
             <a:ext cx="557842" cy="1631641"/>
           </a:xfrm>
           <a:prstGeom prst="rightBrace">
@@ -10766,7 +11054,7 @@
             </p:nvSpPr>
             <p:spPr>
               <a:xfrm>
-                <a:off x="-1446265" y="2348024"/>
+                <a:off x="-429217" y="2313016"/>
                 <a:ext cx="6096000" cy="830997"/>
               </a:xfrm>
               <a:prstGeom prst="rect">
@@ -10788,15 +11076,18 @@
                     </m:oMathParaPr>
                     <m:oMath xmlns:m="http://schemas.openxmlformats.org/officeDocument/2006/math">
                       <m:r>
-                        <a:rPr lang="en-US" sz="4800" b="1" i="1" smtClean="0">
+                        <m:rPr>
+                          <m:sty m:val="p"/>
+                        </m:rPr>
+                        <a:rPr lang="en-US" sz="4800" b="0" i="0" smtClean="0">
                           <a:latin typeface="Cambria Math" panose="02040503050406030204" pitchFamily="18" charset="0"/>
                         </a:rPr>
-                        <m:t>𝝐</m:t>
+                        <m:t>Ω</m:t>
                       </m:r>
                     </m:oMath>
                   </m:oMathPara>
                 </a14:m>
-                <a:endParaRPr lang="en-DK" sz="4800" b="1" dirty="0"/>
+                <a:endParaRPr lang="en-DK" sz="4800" dirty="0"/>
               </a:p>
             </p:txBody>
           </p:sp>
@@ -10818,8 +11109,176 @@
             </p:nvSpPr>
             <p:spPr>
               <a:xfrm>
-                <a:off x="-1446265" y="2348024"/>
+                <a:off x="-429217" y="2313016"/>
                 <a:ext cx="6096000" cy="830997"/>
+              </a:xfrm>
+              <a:prstGeom prst="rect">
+                <a:avLst/>
+              </a:prstGeom>
+              <a:blipFill>
+                <a:blip r:embed="rId2"/>
+                <a:stretch>
+                  <a:fillRect/>
+                </a:stretch>
+              </a:blipFill>
+            </p:spPr>
+            <p:txBody>
+              <a:bodyPr/>
+              <a:lstStyle/>
+              <a:p>
+                <a:r>
+                  <a:rPr lang="en-DK">
+                    <a:noFill/>
+                  </a:rPr>
+                  <a:t> </a:t>
+                </a:r>
+              </a:p>
+            </p:txBody>
+          </p:sp>
+        </mc:Fallback>
+      </mc:AlternateContent>
+      <p:sp>
+        <p:nvSpPr>
+          <p:cNvPr id="10" name="TextBox 9">
+            <a:extLst>
+              <a:ext uri="{FF2B5EF4-FFF2-40B4-BE49-F238E27FC236}">
+                <a16:creationId xmlns:a16="http://schemas.microsoft.com/office/drawing/2014/main" id="{F0D15A58-3DE7-3E51-5F4B-7D733DED2234}"/>
+              </a:ext>
+            </a:extLst>
+          </p:cNvPr>
+          <p:cNvSpPr txBox="1"/>
+          <p:nvPr/>
+        </p:nvSpPr>
+        <p:spPr>
+          <a:xfrm>
+            <a:off x="148415" y="3260961"/>
+            <a:ext cx="1287532" cy="646331"/>
+          </a:xfrm>
+          <a:prstGeom prst="rect">
+            <a:avLst/>
+          </a:prstGeom>
+          <a:noFill/>
+        </p:spPr>
+        <p:txBody>
+          <a:bodyPr wrap="none" rtlCol="0">
+            <a:spAutoFit/>
+          </a:bodyPr>
+          <a:lstStyle/>
+          <a:p>
+            <a:r>
+              <a:rPr lang="en-US" sz="3600" dirty="0"/>
+              <a:t>Qubit</a:t>
+            </a:r>
+            <a:endParaRPr lang="en-DK" sz="3600" dirty="0"/>
+          </a:p>
+        </p:txBody>
+      </p:sp>
+      <p:sp>
+        <p:nvSpPr>
+          <p:cNvPr id="11" name="TextBox 10">
+            <a:extLst>
+              <a:ext uri="{FF2B5EF4-FFF2-40B4-BE49-F238E27FC236}">
+                <a16:creationId xmlns:a16="http://schemas.microsoft.com/office/drawing/2014/main" id="{2A3D3EB8-A403-B7F1-1530-A15667B2DC7A}"/>
+              </a:ext>
+            </a:extLst>
+          </p:cNvPr>
+          <p:cNvSpPr txBox="1"/>
+          <p:nvPr/>
+        </p:nvSpPr>
+        <p:spPr>
+          <a:xfrm>
+            <a:off x="148415" y="4962728"/>
+            <a:ext cx="2313454" cy="646331"/>
+          </a:xfrm>
+          <a:prstGeom prst="rect">
+            <a:avLst/>
+          </a:prstGeom>
+          <a:noFill/>
+        </p:spPr>
+        <p:txBody>
+          <a:bodyPr wrap="none" rtlCol="0">
+            <a:spAutoFit/>
+          </a:bodyPr>
+          <a:lstStyle/>
+          <a:p>
+            <a:r>
+              <a:rPr lang="en-US" sz="3600" dirty="0"/>
+              <a:t>Resonator</a:t>
+            </a:r>
+            <a:endParaRPr lang="en-DK" sz="3600" dirty="0"/>
+          </a:p>
+        </p:txBody>
+      </p:sp>
+      <mc:AlternateContent xmlns:mc="http://schemas.openxmlformats.org/markup-compatibility/2006">
+        <mc:Choice xmlns:a14="http://schemas.microsoft.com/office/drawing/2010/main" Requires="a14">
+          <p:sp>
+            <p:nvSpPr>
+              <p:cNvPr id="12" name="TextBox 11">
+                <a:extLst>
+                  <a:ext uri="{FF2B5EF4-FFF2-40B4-BE49-F238E27FC236}">
+                    <a16:creationId xmlns:a16="http://schemas.microsoft.com/office/drawing/2014/main" id="{8AB39FF7-F7F9-CA04-0D59-0E1D6B4A7808}"/>
+                  </a:ext>
+                </a:extLst>
+              </p:cNvPr>
+              <p:cNvSpPr txBox="1"/>
+              <p:nvPr/>
+            </p:nvSpPr>
+            <p:spPr>
+              <a:xfrm>
+                <a:off x="1659253" y="3245721"/>
+                <a:ext cx="880369" cy="646331"/>
+              </a:xfrm>
+              <a:prstGeom prst="rect">
+                <a:avLst/>
+              </a:prstGeom>
+              <a:noFill/>
+            </p:spPr>
+            <p:txBody>
+              <a:bodyPr wrap="none" rtlCol="0">
+                <a:spAutoFit/>
+              </a:bodyPr>
+              <a:lstStyle/>
+              <a:p>
+                <a:pPr/>
+                <a14:m>
+                  <m:oMathPara xmlns:m="http://schemas.openxmlformats.org/officeDocument/2006/math">
+                    <m:oMathParaPr>
+                      <m:jc m:val="centerGroup"/>
+                    </m:oMathParaPr>
+                    <m:oMath xmlns:m="http://schemas.openxmlformats.org/officeDocument/2006/math">
+                      <m:r>
+                        <a:rPr lang="en-US" sz="3600" b="0" i="1" smtClean="0">
+                          <a:latin typeface="Cambria Math" panose="02040503050406030204" pitchFamily="18" charset="0"/>
+                        </a:rPr>
+                        <m:t>|0⟩</m:t>
+                      </m:r>
+                    </m:oMath>
+                  </m:oMathPara>
+                </a14:m>
+                <a:endParaRPr lang="en-DK" sz="3600" dirty="0"/>
+              </a:p>
+            </p:txBody>
+          </p:sp>
+        </mc:Choice>
+        <mc:Fallback>
+          <p:sp>
+            <p:nvSpPr>
+              <p:cNvPr id="12" name="TextBox 11">
+                <a:extLst>
+                  <a:ext uri="{FF2B5EF4-FFF2-40B4-BE49-F238E27FC236}">
+                    <a16:creationId xmlns:a16="http://schemas.microsoft.com/office/drawing/2014/main" id="{8AB39FF7-F7F9-CA04-0D59-0E1D6B4A7808}"/>
+                  </a:ext>
+                </a:extLst>
+              </p:cNvPr>
+              <p:cNvSpPr txBox="1">
+                <a:spLocks noRot="1" noChangeAspect="1" noMove="1" noResize="1" noEditPoints="1" noAdjustHandles="1" noChangeArrowheads="1" noChangeShapeType="1" noTextEdit="1"/>
+              </p:cNvSpPr>
+              <p:nvPr/>
+            </p:nvSpPr>
+            <p:spPr>
+              <a:xfrm>
+                <a:off x="1659253" y="3245721"/>
+                <a:ext cx="880369" cy="646331"/>
               </a:xfrm>
               <a:prstGeom prst="rect">
                 <a:avLst/>
@@ -10846,6 +11305,49 @@
           </p:sp>
         </mc:Fallback>
       </mc:AlternateContent>
+      <p:cxnSp>
+        <p:nvCxnSpPr>
+          <p:cNvPr id="13" name="Straight Connector 12">
+            <a:extLst>
+              <a:ext uri="{FF2B5EF4-FFF2-40B4-BE49-F238E27FC236}">
+                <a16:creationId xmlns:a16="http://schemas.microsoft.com/office/drawing/2014/main" id="{5651479D-4148-F973-5B35-A428B3F706DA}"/>
+              </a:ext>
+            </a:extLst>
+          </p:cNvPr>
+          <p:cNvCxnSpPr>
+            <a:cxnSpLocks/>
+          </p:cNvCxnSpPr>
+          <p:nvPr/>
+        </p:nvCxnSpPr>
+        <p:spPr>
+          <a:xfrm>
+            <a:off x="2618783" y="5341531"/>
+            <a:ext cx="7929922" cy="0"/>
+          </a:xfrm>
+          <a:prstGeom prst="line">
+            <a:avLst/>
+          </a:prstGeom>
+          <a:ln w="76200">
+            <a:solidFill>
+              <a:schemeClr val="tx1"/>
+            </a:solidFill>
+          </a:ln>
+        </p:spPr>
+        <p:style>
+          <a:lnRef idx="1">
+            <a:schemeClr val="accent1"/>
+          </a:lnRef>
+          <a:fillRef idx="0">
+            <a:schemeClr val="accent1"/>
+          </a:fillRef>
+          <a:effectRef idx="0">
+            <a:schemeClr val="accent1"/>
+          </a:effectRef>
+          <a:fontRef idx="minor">
+            <a:schemeClr val="tx1"/>
+          </a:fontRef>
+        </p:style>
+      </p:cxnSp>
     </p:spTree>
     <p:extLst>
       <p:ext uri="{BB962C8B-B14F-4D97-AF65-F5344CB8AC3E}">
@@ -10888,12 +11390,59 @@
           <a:chExt cx="0" cy="0"/>
         </a:xfrm>
       </p:grpSpPr>
+      <p:cxnSp>
+        <p:nvCxnSpPr>
+          <p:cNvPr id="13" name="Straight Connector 12">
+            <a:extLst>
+              <a:ext uri="{FF2B5EF4-FFF2-40B4-BE49-F238E27FC236}">
+                <a16:creationId xmlns:a16="http://schemas.microsoft.com/office/drawing/2014/main" id="{061099DF-BC20-A0E7-D519-7F32CDE8C83C}"/>
+              </a:ext>
+            </a:extLst>
+          </p:cNvPr>
+          <p:cNvCxnSpPr>
+            <a:stCxn id="6" idx="1"/>
+          </p:cNvCxnSpPr>
+          <p:nvPr/>
+        </p:nvCxnSpPr>
+        <p:spPr>
+          <a:xfrm flipV="1">
+            <a:off x="5433059" y="2459301"/>
+            <a:ext cx="0" cy="2298365"/>
+          </a:xfrm>
+          <a:prstGeom prst="line">
+            <a:avLst/>
+          </a:prstGeom>
+          <a:ln w="76200">
+            <a:solidFill>
+              <a:schemeClr val="tx1">
+                <a:lumMod val="50000"/>
+                <a:lumOff val="50000"/>
+              </a:schemeClr>
+            </a:solidFill>
+            <a:prstDash val="dash"/>
+          </a:ln>
+        </p:spPr>
+        <p:style>
+          <a:lnRef idx="1">
+            <a:schemeClr val="accent1"/>
+          </a:lnRef>
+          <a:fillRef idx="0">
+            <a:schemeClr val="accent1"/>
+          </a:fillRef>
+          <a:effectRef idx="0">
+            <a:schemeClr val="accent1"/>
+          </a:effectRef>
+          <a:fontRef idx="minor">
+            <a:schemeClr val="tx1"/>
+          </a:fontRef>
+        </p:style>
+      </p:cxnSp>
       <p:sp>
         <p:nvSpPr>
-          <p:cNvPr id="5" name="Rectangle 4">
+          <p:cNvPr id="2" name="Rectangle 1">
             <a:extLst>
               <a:ext uri="{FF2B5EF4-FFF2-40B4-BE49-F238E27FC236}">
-                <a16:creationId xmlns:a16="http://schemas.microsoft.com/office/drawing/2014/main" id="{27AC2383-6C4D-E861-681E-45BE55EB3CDA}"/>
+                <a16:creationId xmlns:a16="http://schemas.microsoft.com/office/drawing/2014/main" id="{C0EFE72D-3B55-866C-60B8-8F8DE8FFB30C}"/>
               </a:ext>
             </a:extLst>
           </p:cNvPr>
@@ -10902,7 +11451,7 @@
         </p:nvSpPr>
         <p:spPr>
           <a:xfrm>
-            <a:off x="2227162" y="2467009"/>
+            <a:off x="2676742" y="2459301"/>
             <a:ext cx="1213450" cy="1213450"/>
           </a:xfrm>
           <a:prstGeom prst="rect">
@@ -10976,8 +11525,8 @@
         </p:nvSpPr>
         <p:spPr>
           <a:xfrm>
-            <a:off x="4874916" y="2465529"/>
-            <a:ext cx="4926576" cy="1213450"/>
+            <a:off x="5433059" y="4150941"/>
+            <a:ext cx="4811337" cy="1213450"/>
           </a:xfrm>
           <a:prstGeom prst="rect">
             <a:avLst/>
@@ -11038,10 +11587,10 @@
       </p:sp>
       <p:cxnSp>
         <p:nvCxnSpPr>
-          <p:cNvPr id="4" name="Straight Connector 3">
+          <p:cNvPr id="3" name="Straight Connector 2">
             <a:extLst>
               <a:ext uri="{FF2B5EF4-FFF2-40B4-BE49-F238E27FC236}">
-                <a16:creationId xmlns:a16="http://schemas.microsoft.com/office/drawing/2014/main" id="{C4DA9E31-4BEE-8866-CA5F-E9AE4B73D6B6}"/>
+                <a16:creationId xmlns:a16="http://schemas.microsoft.com/office/drawing/2014/main" id="{CA021BD1-0D32-1182-6D37-16374E0B5D55}"/>
               </a:ext>
             </a:extLst>
           </p:cNvPr>
@@ -11052,8 +11601,8 @@
         </p:nvCxnSpPr>
         <p:spPr>
           <a:xfrm>
-            <a:off x="1529123" y="3678979"/>
-            <a:ext cx="8529277" cy="0"/>
+            <a:off x="2423929" y="5364391"/>
+            <a:ext cx="7929922" cy="0"/>
           </a:xfrm>
           <a:prstGeom prst="line">
             <a:avLst/>
@@ -11079,14 +11628,129 @@
           </a:fontRef>
         </p:style>
       </p:cxnSp>
-      <mc:AlternateContent xmlns:mc="http://schemas.openxmlformats.org/markup-compatibility/2006" xmlns:a14="http://schemas.microsoft.com/office/drawing/2010/main">
-        <mc:Choice Requires="a14">
+      <p:cxnSp>
+        <p:nvCxnSpPr>
+          <p:cNvPr id="4" name="Straight Connector 3">
+            <a:extLst>
+              <a:ext uri="{FF2B5EF4-FFF2-40B4-BE49-F238E27FC236}">
+                <a16:creationId xmlns:a16="http://schemas.microsoft.com/office/drawing/2014/main" id="{C4DA9E31-4BEE-8866-CA5F-E9AE4B73D6B6}"/>
+              </a:ext>
+            </a:extLst>
+          </p:cNvPr>
+          <p:cNvCxnSpPr>
+            <a:cxnSpLocks/>
+          </p:cNvCxnSpPr>
+          <p:nvPr/>
+        </p:nvCxnSpPr>
+        <p:spPr>
+          <a:xfrm>
+            <a:off x="2423929" y="3672751"/>
+            <a:ext cx="7929922" cy="0"/>
+          </a:xfrm>
+          <a:prstGeom prst="line">
+            <a:avLst/>
+          </a:prstGeom>
+          <a:ln w="76200">
+            <a:solidFill>
+              <a:schemeClr val="tx1"/>
+            </a:solidFill>
+          </a:ln>
+        </p:spPr>
+        <p:style>
+          <a:lnRef idx="1">
+            <a:schemeClr val="accent1"/>
+          </a:lnRef>
+          <a:fillRef idx="0">
+            <a:schemeClr val="accent1"/>
+          </a:fillRef>
+          <a:effectRef idx="0">
+            <a:schemeClr val="accent1"/>
+          </a:effectRef>
+          <a:fontRef idx="minor">
+            <a:schemeClr val="tx1"/>
+          </a:fontRef>
+        </p:style>
+      </p:cxnSp>
+      <p:sp>
+        <p:nvSpPr>
+          <p:cNvPr id="8" name="TextBox 7">
+            <a:extLst>
+              <a:ext uri="{FF2B5EF4-FFF2-40B4-BE49-F238E27FC236}">
+                <a16:creationId xmlns:a16="http://schemas.microsoft.com/office/drawing/2014/main" id="{EAFD8482-E56C-7FEB-6A6E-D58D3EED0B0C}"/>
+              </a:ext>
+            </a:extLst>
+          </p:cNvPr>
+          <p:cNvSpPr txBox="1"/>
+          <p:nvPr/>
+        </p:nvSpPr>
+        <p:spPr>
+          <a:xfrm>
+            <a:off x="164863" y="3254780"/>
+            <a:ext cx="1287532" cy="646331"/>
+          </a:xfrm>
+          <a:prstGeom prst="rect">
+            <a:avLst/>
+          </a:prstGeom>
+          <a:noFill/>
+        </p:spPr>
+        <p:txBody>
+          <a:bodyPr wrap="none" rtlCol="0">
+            <a:spAutoFit/>
+          </a:bodyPr>
+          <a:lstStyle/>
+          <a:p>
+            <a:r>
+              <a:rPr lang="en-US" sz="3600" dirty="0"/>
+              <a:t>Qubit</a:t>
+            </a:r>
+            <a:endParaRPr lang="en-DK" sz="3600" dirty="0"/>
+          </a:p>
+        </p:txBody>
+      </p:sp>
+      <p:sp>
+        <p:nvSpPr>
+          <p:cNvPr id="9" name="TextBox 8">
+            <a:extLst>
+              <a:ext uri="{FF2B5EF4-FFF2-40B4-BE49-F238E27FC236}">
+                <a16:creationId xmlns:a16="http://schemas.microsoft.com/office/drawing/2014/main" id="{53E21F6C-0702-D6A4-865B-77F276CABB89}"/>
+              </a:ext>
+            </a:extLst>
+          </p:cNvPr>
+          <p:cNvSpPr txBox="1"/>
+          <p:nvPr/>
+        </p:nvSpPr>
+        <p:spPr>
+          <a:xfrm>
+            <a:off x="110475" y="4934939"/>
+            <a:ext cx="2313454" cy="646331"/>
+          </a:xfrm>
+          <a:prstGeom prst="rect">
+            <a:avLst/>
+          </a:prstGeom>
+          <a:noFill/>
+        </p:spPr>
+        <p:txBody>
+          <a:bodyPr wrap="none" rtlCol="0">
+            <a:spAutoFit/>
+          </a:bodyPr>
+          <a:lstStyle/>
+          <a:p>
+            <a:r>
+              <a:rPr lang="en-US" sz="3600" dirty="0"/>
+              <a:t>Resonator</a:t>
+            </a:r>
+            <a:endParaRPr lang="en-DK" sz="3600" dirty="0"/>
+          </a:p>
+        </p:txBody>
+      </p:sp>
+      <mc:AlternateContent xmlns:mc="http://schemas.openxmlformats.org/markup-compatibility/2006">
+        <mc:Choice xmlns:a14="http://schemas.microsoft.com/office/drawing/2010/main" Requires="a14">
           <p:sp>
             <p:nvSpPr>
-              <p:cNvPr id="2" name="TextBox 1">
+              <p:cNvPr id="10" name="TextBox 9">
                 <a:extLst>
                   <a:ext uri="{FF2B5EF4-FFF2-40B4-BE49-F238E27FC236}">
-                    <a16:creationId xmlns:a16="http://schemas.microsoft.com/office/drawing/2014/main" id="{6D99F296-36DB-FD9B-7DFE-DE3F6F8CD24D}"/>
+                    <a16:creationId xmlns:a16="http://schemas.microsoft.com/office/drawing/2014/main" id="{CD70FD5E-DE0E-7DE6-4F82-5F3776A580BC}"/>
                   </a:ext>
                 </a:extLst>
               </p:cNvPr>
@@ -11095,8 +11759,8 @@
             </p:nvSpPr>
             <p:spPr>
               <a:xfrm>
-                <a:off x="460076" y="3179021"/>
-                <a:ext cx="1141659" cy="830997"/>
+                <a:off x="1452395" y="3254780"/>
+                <a:ext cx="880369" cy="646331"/>
               </a:xfrm>
               <a:prstGeom prst="rect">
                 <a:avLst/>
@@ -11117,38 +11781,26 @@
                     </m:oMathParaPr>
                     <m:oMath xmlns:m="http://schemas.openxmlformats.org/officeDocument/2006/math">
                       <m:r>
-                        <a:rPr lang="en-US" sz="4800" b="1" i="1" smtClean="0">
+                        <a:rPr lang="en-US" sz="3600" b="0" i="1" smtClean="0">
                           <a:latin typeface="Cambria Math" panose="02040503050406030204" pitchFamily="18" charset="0"/>
                         </a:rPr>
-                        <m:t>|</m:t>
-                      </m:r>
-                      <m:r>
-                        <a:rPr lang="en-US" sz="4800" b="1" i="1" smtClean="0">
-                          <a:latin typeface="Cambria Math" panose="02040503050406030204" pitchFamily="18" charset="0"/>
-                        </a:rPr>
-                        <m:t>𝟎</m:t>
-                      </m:r>
-                      <m:r>
-                        <a:rPr lang="en-US" sz="4800" b="1" i="1" smtClean="0">
-                          <a:latin typeface="Cambria Math" panose="02040503050406030204" pitchFamily="18" charset="0"/>
-                        </a:rPr>
-                        <m:t>⟩</m:t>
+                        <m:t>|0⟩</m:t>
                       </m:r>
                     </m:oMath>
                   </m:oMathPara>
                 </a14:m>
-                <a:endParaRPr lang="en-DK" sz="4800" b="1" dirty="0"/>
+                <a:endParaRPr lang="en-DK" sz="3600" dirty="0"/>
               </a:p>
             </p:txBody>
           </p:sp>
         </mc:Choice>
-        <mc:Fallback xmlns="">
+        <mc:Fallback>
           <p:sp>
             <p:nvSpPr>
-              <p:cNvPr id="2" name="TextBox 1">
+              <p:cNvPr id="10" name="TextBox 9">
                 <a:extLst>
                   <a:ext uri="{FF2B5EF4-FFF2-40B4-BE49-F238E27FC236}">
-                    <a16:creationId xmlns:a16="http://schemas.microsoft.com/office/drawing/2014/main" id="{6D99F296-36DB-FD9B-7DFE-DE3F6F8CD24D}"/>
+                    <a16:creationId xmlns:a16="http://schemas.microsoft.com/office/drawing/2014/main" id="{CD70FD5E-DE0E-7DE6-4F82-5F3776A580BC}"/>
                   </a:ext>
                 </a:extLst>
               </p:cNvPr>
@@ -11159,8 +11811,8 @@
             </p:nvSpPr>
             <p:spPr>
               <a:xfrm>
-                <a:off x="460076" y="3179021"/>
-                <a:ext cx="1141659" cy="830997"/>
+                <a:off x="1452395" y="3254780"/>
+                <a:ext cx="880369" cy="646331"/>
               </a:xfrm>
               <a:prstGeom prst="rect">
                 <a:avLst/>
@@ -11192,7 +11844,7 @@
           <p:cNvPr id="7" name="Right Brace 6">
             <a:extLst>
               <a:ext uri="{FF2B5EF4-FFF2-40B4-BE49-F238E27FC236}">
-                <a16:creationId xmlns:a16="http://schemas.microsoft.com/office/drawing/2014/main" id="{7FDD997D-EB34-044A-DED7-928C9AAE0EA4}"/>
+                <a16:creationId xmlns:a16="http://schemas.microsoft.com/office/drawing/2014/main" id="{81996FED-B48A-A56E-983A-2ACD0D2E2E45}"/>
               </a:ext>
             </a:extLst>
           </p:cNvPr>
@@ -11201,8 +11853,8 @@
         </p:nvSpPr>
         <p:spPr>
           <a:xfrm rot="16200000">
-            <a:off x="3907421" y="1371507"/>
-            <a:ext cx="500689" cy="1434304"/>
+            <a:off x="4411279" y="1290252"/>
+            <a:ext cx="500689" cy="1542864"/>
           </a:xfrm>
           <a:prstGeom prst="rightBrace">
             <a:avLst>
@@ -11239,14 +11891,14 @@
           </a:p>
         </p:txBody>
       </p:sp>
-      <mc:AlternateContent xmlns:mc="http://schemas.openxmlformats.org/markup-compatibility/2006" xmlns:a14="http://schemas.microsoft.com/office/drawing/2010/main">
-        <mc:Choice Requires="a14">
+      <mc:AlternateContent xmlns:mc="http://schemas.openxmlformats.org/markup-compatibility/2006">
+        <mc:Choice xmlns:a14="http://schemas.microsoft.com/office/drawing/2010/main" Requires="a14">
           <p:sp>
             <p:nvSpPr>
-              <p:cNvPr id="8" name="TextBox 7">
+              <p:cNvPr id="11" name="TextBox 10">
                 <a:extLst>
                   <a:ext uri="{FF2B5EF4-FFF2-40B4-BE49-F238E27FC236}">
-                    <a16:creationId xmlns:a16="http://schemas.microsoft.com/office/drawing/2014/main" id="{3754AAF7-FA55-D6CC-9FB7-C6E8177E1028}"/>
+                    <a16:creationId xmlns:a16="http://schemas.microsoft.com/office/drawing/2014/main" id="{1B19C28F-BF7A-7A85-6633-4D334D86F725}"/>
                   </a:ext>
                 </a:extLst>
               </p:cNvPr>
@@ -11255,7 +11907,7 @@
             </p:nvSpPr>
             <p:spPr>
               <a:xfrm>
-                <a:off x="3634596" y="941904"/>
+                <a:off x="3890191" y="833070"/>
                 <a:ext cx="1628844" cy="830997"/>
               </a:xfrm>
               <a:prstGeom prst="rect">
@@ -11309,13 +11961,13 @@
             </p:txBody>
           </p:sp>
         </mc:Choice>
-        <mc:Fallback xmlns="">
+        <mc:Fallback>
           <p:sp>
             <p:nvSpPr>
-              <p:cNvPr id="8" name="TextBox 7">
+              <p:cNvPr id="11" name="TextBox 10">
                 <a:extLst>
                   <a:ext uri="{FF2B5EF4-FFF2-40B4-BE49-F238E27FC236}">
-                    <a16:creationId xmlns:a16="http://schemas.microsoft.com/office/drawing/2014/main" id="{3754AAF7-FA55-D6CC-9FB7-C6E8177E1028}"/>
+                    <a16:creationId xmlns:a16="http://schemas.microsoft.com/office/drawing/2014/main" id="{1B19C28F-BF7A-7A85-6633-4D334D86F725}"/>
                   </a:ext>
                 </a:extLst>
               </p:cNvPr>
@@ -11326,7 +11978,7 @@
             </p:nvSpPr>
             <p:spPr>
               <a:xfrm>
-                <a:off x="3634596" y="941904"/>
+                <a:off x="3890191" y="833070"/>
                 <a:ext cx="1628844" cy="830997"/>
               </a:xfrm>
               <a:prstGeom prst="rect">
@@ -11357,7 +12009,7 @@
     </p:spTree>
     <p:extLst>
       <p:ext uri="{BB962C8B-B14F-4D97-AF65-F5344CB8AC3E}">
-        <p14:creationId xmlns:p14="http://schemas.microsoft.com/office/powerpoint/2010/main" val="3480871296"/>
+        <p14:creationId xmlns:p14="http://schemas.microsoft.com/office/powerpoint/2010/main" val="905087242"/>
       </p:ext>
     </p:extLst>
   </p:cSld>

</xml_diff>

<commit_message>
Updated cirucits and simulation figures
</commit_message>
<xml_diff>
--- a/Figs/circuits.pptx
+++ b/Figs/circuits.pptx
@@ -12,10 +12,10 @@
     <p:sldId id="261" r:id="rId3"/>
     <p:sldId id="268" r:id="rId4"/>
     <p:sldId id="269" r:id="rId5"/>
-    <p:sldId id="264" r:id="rId6"/>
+    <p:sldId id="270" r:id="rId6"/>
     <p:sldId id="265" r:id="rId7"/>
-    <p:sldId id="266" r:id="rId8"/>
-    <p:sldId id="267" r:id="rId9"/>
+    <p:sldId id="271" r:id="rId8"/>
+    <p:sldId id="272" r:id="rId9"/>
   </p:sldIdLst>
   <p:sldSz cx="12192000" cy="6858000"/>
   <p:notesSz cx="6858000" cy="9144000"/>
@@ -125,7 +125,7 @@
 <file path=ppt/revisionInfo.xml><?xml version="1.0" encoding="utf-8"?>
 <p1510:revInfo xmlns:a="http://schemas.openxmlformats.org/drawingml/2006/main" xmlns:r="http://schemas.openxmlformats.org/officeDocument/2006/relationships" xmlns:p1510="http://schemas.microsoft.com/office/powerpoint/2015/10/main">
   <p1510:revLst>
-    <p1510:client id="{C03BB677-E050-4623-A208-34D9F8363555}" v="27" dt="2023-10-18T13:10:01.946"/>
+    <p1510:client id="{C03BB677-E050-4623-A208-34D9F8363555}" v="42" dt="2023-10-20T07:08:05.269"/>
   </p1510:revLst>
 </p1510:revInfo>
 </file>
@@ -4519,12 +4519,12 @@
   <pc:docChgLst>
     <pc:chgData name="Johann Bock Severin" userId="3b36179260fc8001" providerId="LiveId" clId="{C03BB677-E050-4623-A208-34D9F8363555}"/>
     <pc:docChg chg="undo custSel addSld delSld modSld sldOrd">
-      <pc:chgData name="Johann Bock Severin" userId="3b36179260fc8001" providerId="LiveId" clId="{C03BB677-E050-4623-A208-34D9F8363555}" dt="2023-10-18T13:11:06.017" v="118" actId="47"/>
+      <pc:chgData name="Johann Bock Severin" userId="3b36179260fc8001" providerId="LiveId" clId="{C03BB677-E050-4623-A208-34D9F8363555}" dt="2023-10-20T07:12:27.405" v="246" actId="1076"/>
       <pc:docMkLst>
         <pc:docMk/>
       </pc:docMkLst>
       <pc:sldChg chg="addSp delSp modSp mod">
-        <pc:chgData name="Johann Bock Severin" userId="3b36179260fc8001" providerId="LiveId" clId="{C03BB677-E050-4623-A208-34D9F8363555}" dt="2023-10-18T13:06:38.061" v="57" actId="1076"/>
+        <pc:chgData name="Johann Bock Severin" userId="3b36179260fc8001" providerId="LiveId" clId="{C03BB677-E050-4623-A208-34D9F8363555}" dt="2023-10-19T07:38:20.567" v="157" actId="1076"/>
         <pc:sldMkLst>
           <pc:docMk/>
           <pc:sldMk cId="1287307258" sldId="261"/>
@@ -4538,7 +4538,7 @@
           </ac:spMkLst>
         </pc:spChg>
         <pc:spChg chg="mod">
-          <ac:chgData name="Johann Bock Severin" userId="3b36179260fc8001" providerId="LiveId" clId="{C03BB677-E050-4623-A208-34D9F8363555}" dt="2023-10-18T13:05:05.303" v="40" actId="1076"/>
+          <ac:chgData name="Johann Bock Severin" userId="3b36179260fc8001" providerId="LiveId" clId="{C03BB677-E050-4623-A208-34D9F8363555}" dt="2023-10-19T07:37:28.955" v="146" actId="1037"/>
           <ac:spMkLst>
             <pc:docMk/>
             <pc:sldMk cId="1287307258" sldId="261"/>
@@ -4546,7 +4546,7 @@
           </ac:spMkLst>
         </pc:spChg>
         <pc:spChg chg="mod">
-          <ac:chgData name="Johann Bock Severin" userId="3b36179260fc8001" providerId="LiveId" clId="{C03BB677-E050-4623-A208-34D9F8363555}" dt="2023-10-18T13:05:05.303" v="40" actId="1076"/>
+          <ac:chgData name="Johann Bock Severin" userId="3b36179260fc8001" providerId="LiveId" clId="{C03BB677-E050-4623-A208-34D9F8363555}" dt="2023-10-19T07:37:28.955" v="146" actId="1037"/>
           <ac:spMkLst>
             <pc:docMk/>
             <pc:sldMk cId="1287307258" sldId="261"/>
@@ -4562,7 +4562,7 @@
           </ac:spMkLst>
         </pc:spChg>
         <pc:spChg chg="add mod">
-          <ac:chgData name="Johann Bock Severin" userId="3b36179260fc8001" providerId="LiveId" clId="{C03BB677-E050-4623-A208-34D9F8363555}" dt="2023-10-18T13:06:38.061" v="57" actId="1076"/>
+          <ac:chgData name="Johann Bock Severin" userId="3b36179260fc8001" providerId="LiveId" clId="{C03BB677-E050-4623-A208-34D9F8363555}" dt="2023-10-19T07:38:09.023" v="154" actId="1076"/>
           <ac:spMkLst>
             <pc:docMk/>
             <pc:sldMk cId="1287307258" sldId="261"/>
@@ -4570,7 +4570,7 @@
           </ac:spMkLst>
         </pc:spChg>
         <pc:spChg chg="add mod">
-          <ac:chgData name="Johann Bock Severin" userId="3b36179260fc8001" providerId="LiveId" clId="{C03BB677-E050-4623-A208-34D9F8363555}" dt="2023-10-18T13:05:29.264" v="46" actId="1076"/>
+          <ac:chgData name="Johann Bock Severin" userId="3b36179260fc8001" providerId="LiveId" clId="{C03BB677-E050-4623-A208-34D9F8363555}" dt="2023-10-19T07:37:54.403" v="151" actId="1076"/>
           <ac:spMkLst>
             <pc:docMk/>
             <pc:sldMk cId="1287307258" sldId="261"/>
@@ -4578,7 +4578,7 @@
           </ac:spMkLst>
         </pc:spChg>
         <pc:spChg chg="add mod">
-          <ac:chgData name="Johann Bock Severin" userId="3b36179260fc8001" providerId="LiveId" clId="{C03BB677-E050-4623-A208-34D9F8363555}" dt="2023-10-18T13:06:10.029" v="54" actId="1076"/>
+          <ac:chgData name="Johann Bock Severin" userId="3b36179260fc8001" providerId="LiveId" clId="{C03BB677-E050-4623-A208-34D9F8363555}" dt="2023-10-19T07:38:20.567" v="157" actId="1076"/>
           <ac:spMkLst>
             <pc:docMk/>
             <pc:sldMk cId="1287307258" sldId="261"/>
@@ -4586,7 +4586,7 @@
           </ac:spMkLst>
         </pc:spChg>
         <pc:cxnChg chg="add mod">
-          <ac:chgData name="Johann Bock Severin" userId="3b36179260fc8001" providerId="LiveId" clId="{C03BB677-E050-4623-A208-34D9F8363555}" dt="2023-10-18T13:05:05.303" v="40" actId="1076"/>
+          <ac:chgData name="Johann Bock Severin" userId="3b36179260fc8001" providerId="LiveId" clId="{C03BB677-E050-4623-A208-34D9F8363555}" dt="2023-10-19T07:37:28.955" v="146" actId="1037"/>
           <ac:cxnSpMkLst>
             <pc:docMk/>
             <pc:sldMk cId="1287307258" sldId="261"/>
@@ -4594,7 +4594,7 @@
           </ac:cxnSpMkLst>
         </pc:cxnChg>
         <pc:cxnChg chg="mod ord">
-          <ac:chgData name="Johann Bock Severin" userId="3b36179260fc8001" providerId="LiveId" clId="{C03BB677-E050-4623-A208-34D9F8363555}" dt="2023-10-18T13:05:05.303" v="40" actId="1076"/>
+          <ac:chgData name="Johann Bock Severin" userId="3b36179260fc8001" providerId="LiveId" clId="{C03BB677-E050-4623-A208-34D9F8363555}" dt="2023-10-19T07:37:28.955" v="146" actId="1037"/>
           <ac:cxnSpMkLst>
             <pc:docMk/>
             <pc:sldMk cId="1287307258" sldId="261"/>
@@ -4649,8 +4649,29 @@
           </ac:cxnSpMkLst>
         </pc:cxnChg>
       </pc:sldChg>
+      <pc:sldChg chg="del">
+        <pc:chgData name="Johann Bock Severin" userId="3b36179260fc8001" providerId="LiveId" clId="{C03BB677-E050-4623-A208-34D9F8363555}" dt="2023-10-20T07:03:58.569" v="180" actId="47"/>
+        <pc:sldMkLst>
+          <pc:docMk/>
+          <pc:sldMk cId="4097513252" sldId="264"/>
+        </pc:sldMkLst>
+      </pc:sldChg>
+      <pc:sldChg chg="del">
+        <pc:chgData name="Johann Bock Severin" userId="3b36179260fc8001" providerId="LiveId" clId="{C03BB677-E050-4623-A208-34D9F8363555}" dt="2023-10-20T07:05:18.147" v="194" actId="47"/>
+        <pc:sldMkLst>
+          <pc:docMk/>
+          <pc:sldMk cId="4128625708" sldId="266"/>
+        </pc:sldMkLst>
+      </pc:sldChg>
+      <pc:sldChg chg="del">
+        <pc:chgData name="Johann Bock Severin" userId="3b36179260fc8001" providerId="LiveId" clId="{C03BB677-E050-4623-A208-34D9F8363555}" dt="2023-10-20T07:08:57.776" v="244" actId="47"/>
+        <pc:sldMkLst>
+          <pc:docMk/>
+          <pc:sldMk cId="2974111751" sldId="267"/>
+        </pc:sldMkLst>
+      </pc:sldChg>
       <pc:sldChg chg="addSp delSp modSp mod">
-        <pc:chgData name="Johann Bock Severin" userId="3b36179260fc8001" providerId="LiveId" clId="{C03BB677-E050-4623-A208-34D9F8363555}" dt="2023-10-18T13:08:52.216" v="91" actId="1076"/>
+        <pc:chgData name="Johann Bock Severin" userId="3b36179260fc8001" providerId="LiveId" clId="{C03BB677-E050-4623-A208-34D9F8363555}" dt="2023-10-19T07:38:52.616" v="166" actId="1076"/>
         <pc:sldMkLst>
           <pc:docMk/>
           <pc:sldMk cId="867113018" sldId="268"/>
@@ -4663,8 +4684,16 @@
             <ac:spMk id="2" creationId="{6D99F296-36DB-FD9B-7DFE-DE3F6F8CD24D}"/>
           </ac:spMkLst>
         </pc:spChg>
-        <pc:spChg chg="mod">
-          <ac:chgData name="Johann Bock Severin" userId="3b36179260fc8001" providerId="LiveId" clId="{C03BB677-E050-4623-A208-34D9F8363555}" dt="2023-10-18T13:07:21.258" v="67" actId="1076"/>
+        <pc:spChg chg="add mod">
+          <ac:chgData name="Johann Bock Severin" userId="3b36179260fc8001" providerId="LiveId" clId="{C03BB677-E050-4623-A208-34D9F8363555}" dt="2023-10-19T07:38:52.616" v="166" actId="1076"/>
+          <ac:spMkLst>
+            <pc:docMk/>
+            <pc:sldMk cId="867113018" sldId="268"/>
+            <ac:spMk id="2" creationId="{76B08D92-3725-FE63-D95B-49F4277D3B89}"/>
+          </ac:spMkLst>
+        </pc:spChg>
+        <pc:spChg chg="mod">
+          <ac:chgData name="Johann Bock Severin" userId="3b36179260fc8001" providerId="LiveId" clId="{C03BB677-E050-4623-A208-34D9F8363555}" dt="2023-10-19T07:38:31.414" v="158" actId="1076"/>
           <ac:spMkLst>
             <pc:docMk/>
             <pc:sldMk cId="867113018" sldId="268"/>
@@ -4672,7 +4701,7 @@
           </ac:spMkLst>
         </pc:spChg>
         <pc:spChg chg="mod">
-          <ac:chgData name="Johann Bock Severin" userId="3b36179260fc8001" providerId="LiveId" clId="{C03BB677-E050-4623-A208-34D9F8363555}" dt="2023-10-18T13:07:21.258" v="67" actId="1076"/>
+          <ac:chgData name="Johann Bock Severin" userId="3b36179260fc8001" providerId="LiveId" clId="{C03BB677-E050-4623-A208-34D9F8363555}" dt="2023-10-19T07:38:31.414" v="158" actId="1076"/>
           <ac:spMkLst>
             <pc:docMk/>
             <pc:sldMk cId="867113018" sldId="268"/>
@@ -4680,7 +4709,7 @@
           </ac:spMkLst>
         </pc:spChg>
         <pc:spChg chg="mod">
-          <ac:chgData name="Johann Bock Severin" userId="3b36179260fc8001" providerId="LiveId" clId="{C03BB677-E050-4623-A208-34D9F8363555}" dt="2023-10-18T13:07:43.611" v="71" actId="1076"/>
+          <ac:chgData name="Johann Bock Severin" userId="3b36179260fc8001" providerId="LiveId" clId="{C03BB677-E050-4623-A208-34D9F8363555}" dt="2023-10-19T07:38:31.414" v="158" actId="1076"/>
           <ac:spMkLst>
             <pc:docMk/>
             <pc:sldMk cId="867113018" sldId="268"/>
@@ -4695,14 +4724,30 @@
             <ac:spMk id="7" creationId="{69A9A65C-EE66-5FB5-4923-7710C87FB91A}"/>
           </ac:spMkLst>
         </pc:spChg>
-        <pc:spChg chg="mod">
-          <ac:chgData name="Johann Bock Severin" userId="3b36179260fc8001" providerId="LiveId" clId="{C03BB677-E050-4623-A208-34D9F8363555}" dt="2023-10-18T13:08:18.980" v="84" actId="1076"/>
+        <pc:spChg chg="add mod">
+          <ac:chgData name="Johann Bock Severin" userId="3b36179260fc8001" providerId="LiveId" clId="{C03BB677-E050-4623-A208-34D9F8363555}" dt="2023-10-19T07:38:52.616" v="166" actId="1076"/>
+          <ac:spMkLst>
+            <pc:docMk/>
+            <pc:sldMk cId="867113018" sldId="268"/>
+            <ac:spMk id="7" creationId="{929C95C0-A615-5D85-D7D4-0FCE9912EBAF}"/>
+          </ac:spMkLst>
+        </pc:spChg>
+        <pc:spChg chg="mod">
+          <ac:chgData name="Johann Bock Severin" userId="3b36179260fc8001" providerId="LiveId" clId="{C03BB677-E050-4623-A208-34D9F8363555}" dt="2023-10-19T07:38:46.668" v="163" actId="1076"/>
           <ac:spMkLst>
             <pc:docMk/>
             <pc:sldMk cId="867113018" sldId="268"/>
             <ac:spMk id="8" creationId="{BB3D137A-251E-A06D-7546-DFFC008C6B49}"/>
           </ac:spMkLst>
         </pc:spChg>
+        <pc:spChg chg="add mod">
+          <ac:chgData name="Johann Bock Severin" userId="3b36179260fc8001" providerId="LiveId" clId="{C03BB677-E050-4623-A208-34D9F8363555}" dt="2023-10-19T07:38:52.616" v="166" actId="1076"/>
+          <ac:spMkLst>
+            <pc:docMk/>
+            <pc:sldMk cId="867113018" sldId="268"/>
+            <ac:spMk id="9" creationId="{45B1DF8A-59A8-F169-95AE-7225A43E82DF}"/>
+          </ac:spMkLst>
+        </pc:spChg>
         <pc:spChg chg="add del mod">
           <ac:chgData name="Johann Bock Severin" userId="3b36179260fc8001" providerId="LiveId" clId="{C03BB677-E050-4623-A208-34D9F8363555}" dt="2023-10-18T13:06:50.519" v="60"/>
           <ac:spMkLst>
@@ -4711,24 +4756,24 @@
             <ac:spMk id="9" creationId="{D62DEE56-8A74-7B0D-FD97-140ADE74564A}"/>
           </ac:spMkLst>
         </pc:spChg>
-        <pc:spChg chg="add mod">
-          <ac:chgData name="Johann Bock Severin" userId="3b36179260fc8001" providerId="LiveId" clId="{C03BB677-E050-4623-A208-34D9F8363555}" dt="2023-10-18T13:08:43.874" v="89" actId="1076"/>
+        <pc:spChg chg="add del mod">
+          <ac:chgData name="Johann Bock Severin" userId="3b36179260fc8001" providerId="LiveId" clId="{C03BB677-E050-4623-A208-34D9F8363555}" dt="2023-10-19T07:38:48.991" v="164" actId="478"/>
           <ac:spMkLst>
             <pc:docMk/>
             <pc:sldMk cId="867113018" sldId="268"/>
             <ac:spMk id="10" creationId="{F0D15A58-3DE7-3E51-5F4B-7D733DED2234}"/>
           </ac:spMkLst>
         </pc:spChg>
-        <pc:spChg chg="add mod">
-          <ac:chgData name="Johann Bock Severin" userId="3b36179260fc8001" providerId="LiveId" clId="{C03BB677-E050-4623-A208-34D9F8363555}" dt="2023-10-18T13:08:27.895" v="86" actId="1076"/>
+        <pc:spChg chg="add del mod">
+          <ac:chgData name="Johann Bock Severin" userId="3b36179260fc8001" providerId="LiveId" clId="{C03BB677-E050-4623-A208-34D9F8363555}" dt="2023-10-19T07:38:48.991" v="164" actId="478"/>
           <ac:spMkLst>
             <pc:docMk/>
             <pc:sldMk cId="867113018" sldId="268"/>
             <ac:spMk id="11" creationId="{2A3D3EB8-A403-B7F1-1530-A15667B2DC7A}"/>
           </ac:spMkLst>
         </pc:spChg>
-        <pc:spChg chg="add mod">
-          <ac:chgData name="Johann Bock Severin" userId="3b36179260fc8001" providerId="LiveId" clId="{C03BB677-E050-4623-A208-34D9F8363555}" dt="2023-10-18T13:08:52.216" v="91" actId="1076"/>
+        <pc:spChg chg="add del mod">
+          <ac:chgData name="Johann Bock Severin" userId="3b36179260fc8001" providerId="LiveId" clId="{C03BB677-E050-4623-A208-34D9F8363555}" dt="2023-10-19T07:38:48.991" v="164" actId="478"/>
           <ac:spMkLst>
             <pc:docMk/>
             <pc:sldMk cId="867113018" sldId="268"/>
@@ -4736,7 +4781,7 @@
           </ac:spMkLst>
         </pc:spChg>
         <pc:cxnChg chg="mod">
-          <ac:chgData name="Johann Bock Severin" userId="3b36179260fc8001" providerId="LiveId" clId="{C03BB677-E050-4623-A208-34D9F8363555}" dt="2023-10-18T13:07:21.258" v="67" actId="1076"/>
+          <ac:chgData name="Johann Bock Severin" userId="3b36179260fc8001" providerId="LiveId" clId="{C03BB677-E050-4623-A208-34D9F8363555}" dt="2023-10-19T07:38:31.414" v="158" actId="1076"/>
           <ac:cxnSpMkLst>
             <pc:docMk/>
             <pc:sldMk cId="867113018" sldId="268"/>
@@ -4744,7 +4789,7 @@
           </ac:cxnSpMkLst>
         </pc:cxnChg>
         <pc:cxnChg chg="add mod">
-          <ac:chgData name="Johann Bock Severin" userId="3b36179260fc8001" providerId="LiveId" clId="{C03BB677-E050-4623-A208-34D9F8363555}" dt="2023-10-18T13:07:29.650" v="69" actId="1076"/>
+          <ac:chgData name="Johann Bock Severin" userId="3b36179260fc8001" providerId="LiveId" clId="{C03BB677-E050-4623-A208-34D9F8363555}" dt="2023-10-19T07:38:31.414" v="158" actId="1076"/>
           <ac:cxnSpMkLst>
             <pc:docMk/>
             <pc:sldMk cId="867113018" sldId="268"/>
@@ -4753,13 +4798,13 @@
         </pc:cxnChg>
       </pc:sldChg>
       <pc:sldChg chg="addSp delSp modSp add mod ord">
-        <pc:chgData name="Johann Bock Severin" userId="3b36179260fc8001" providerId="LiveId" clId="{C03BB677-E050-4623-A208-34D9F8363555}" dt="2023-10-18T13:10:55.213" v="117" actId="208"/>
+        <pc:chgData name="Johann Bock Severin" userId="3b36179260fc8001" providerId="LiveId" clId="{C03BB677-E050-4623-A208-34D9F8363555}" dt="2023-10-19T07:39:06.758" v="170" actId="1076"/>
         <pc:sldMkLst>
           <pc:docMk/>
           <pc:sldMk cId="905087242" sldId="269"/>
         </pc:sldMkLst>
         <pc:spChg chg="add mod ord">
-          <ac:chgData name="Johann Bock Severin" userId="3b36179260fc8001" providerId="LiveId" clId="{C03BB677-E050-4623-A208-34D9F8363555}" dt="2023-10-18T13:09:54.797" v="105" actId="1076"/>
+          <ac:chgData name="Johann Bock Severin" userId="3b36179260fc8001" providerId="LiveId" clId="{C03BB677-E050-4623-A208-34D9F8363555}" dt="2023-10-19T07:39:00.730" v="167" actId="1076"/>
           <ac:spMkLst>
             <pc:docMk/>
             <pc:sldMk cId="905087242" sldId="269"/>
@@ -4774,8 +4819,16 @@
             <ac:spMk id="5" creationId="{27AC2383-6C4D-E861-681E-45BE55EB3CDA}"/>
           </ac:spMkLst>
         </pc:spChg>
-        <pc:spChg chg="mod">
-          <ac:chgData name="Johann Bock Severin" userId="3b36179260fc8001" providerId="LiveId" clId="{C03BB677-E050-4623-A208-34D9F8363555}" dt="2023-10-18T13:09:52.897" v="104" actId="1076"/>
+        <pc:spChg chg="add mod">
+          <ac:chgData name="Johann Bock Severin" userId="3b36179260fc8001" providerId="LiveId" clId="{C03BB677-E050-4623-A208-34D9F8363555}" dt="2023-10-19T07:39:06.758" v="170" actId="1076"/>
+          <ac:spMkLst>
+            <pc:docMk/>
+            <pc:sldMk cId="905087242" sldId="269"/>
+            <ac:spMk id="5" creationId="{36F7574C-8A1C-01B9-EC8F-B382C22EEE6D}"/>
+          </ac:spMkLst>
+        </pc:spChg>
+        <pc:spChg chg="mod">
+          <ac:chgData name="Johann Bock Severin" userId="3b36179260fc8001" providerId="LiveId" clId="{C03BB677-E050-4623-A208-34D9F8363555}" dt="2023-10-19T07:39:00.730" v="167" actId="1076"/>
           <ac:spMkLst>
             <pc:docMk/>
             <pc:sldMk cId="905087242" sldId="269"/>
@@ -4783,27 +4836,344 @@
           </ac:spMkLst>
         </pc:spChg>
         <pc:spChg chg="add mod">
-          <ac:chgData name="Johann Bock Severin" userId="3b36179260fc8001" providerId="LiveId" clId="{C03BB677-E050-4623-A208-34D9F8363555}" dt="2023-10-18T13:10:41.626" v="115" actId="14100"/>
+          <ac:chgData name="Johann Bock Severin" userId="3b36179260fc8001" providerId="LiveId" clId="{C03BB677-E050-4623-A208-34D9F8363555}" dt="2023-10-19T07:39:00.730" v="167" actId="1076"/>
           <ac:spMkLst>
             <pc:docMk/>
             <pc:sldMk cId="905087242" sldId="269"/>
             <ac:spMk id="7" creationId="{81996FED-B48A-A56E-983A-2ACD0D2E2E45}"/>
           </ac:spMkLst>
         </pc:spChg>
+        <pc:spChg chg="del">
+          <ac:chgData name="Johann Bock Severin" userId="3b36179260fc8001" providerId="LiveId" clId="{C03BB677-E050-4623-A208-34D9F8363555}" dt="2023-10-19T07:39:02.807" v="168" actId="478"/>
+          <ac:spMkLst>
+            <pc:docMk/>
+            <pc:sldMk cId="905087242" sldId="269"/>
+            <ac:spMk id="8" creationId="{EAFD8482-E56C-7FEB-6A6E-D58D3EED0B0C}"/>
+          </ac:spMkLst>
+        </pc:spChg>
+        <pc:spChg chg="del">
+          <ac:chgData name="Johann Bock Severin" userId="3b36179260fc8001" providerId="LiveId" clId="{C03BB677-E050-4623-A208-34D9F8363555}" dt="2023-10-19T07:39:02.807" v="168" actId="478"/>
+          <ac:spMkLst>
+            <pc:docMk/>
+            <pc:sldMk cId="905087242" sldId="269"/>
+            <ac:spMk id="9" creationId="{53E21F6C-0702-D6A4-865B-77F276CABB89}"/>
+          </ac:spMkLst>
+        </pc:spChg>
+        <pc:spChg chg="del">
+          <ac:chgData name="Johann Bock Severin" userId="3b36179260fc8001" providerId="LiveId" clId="{C03BB677-E050-4623-A208-34D9F8363555}" dt="2023-10-19T07:39:02.807" v="168" actId="478"/>
+          <ac:spMkLst>
+            <pc:docMk/>
+            <pc:sldMk cId="905087242" sldId="269"/>
+            <ac:spMk id="10" creationId="{CD70FD5E-DE0E-7DE6-4F82-5F3776A580BC}"/>
+          </ac:spMkLst>
+        </pc:spChg>
         <pc:spChg chg="add mod">
-          <ac:chgData name="Johann Bock Severin" userId="3b36179260fc8001" providerId="LiveId" clId="{C03BB677-E050-4623-A208-34D9F8363555}" dt="2023-10-18T13:10:45.413" v="116" actId="1076"/>
+          <ac:chgData name="Johann Bock Severin" userId="3b36179260fc8001" providerId="LiveId" clId="{C03BB677-E050-4623-A208-34D9F8363555}" dt="2023-10-19T07:39:00.730" v="167" actId="1076"/>
           <ac:spMkLst>
             <pc:docMk/>
             <pc:sldMk cId="905087242" sldId="269"/>
             <ac:spMk id="11" creationId="{1B19C28F-BF7A-7A85-6633-4D334D86F725}"/>
           </ac:spMkLst>
         </pc:spChg>
+        <pc:spChg chg="add mod">
+          <ac:chgData name="Johann Bock Severin" userId="3b36179260fc8001" providerId="LiveId" clId="{C03BB677-E050-4623-A208-34D9F8363555}" dt="2023-10-19T07:39:06.758" v="170" actId="1076"/>
+          <ac:spMkLst>
+            <pc:docMk/>
+            <pc:sldMk cId="905087242" sldId="269"/>
+            <ac:spMk id="12" creationId="{70EB4BAE-AC17-C333-A926-02A015BC6D4A}"/>
+          </ac:spMkLst>
+        </pc:spChg>
+        <pc:spChg chg="add mod">
+          <ac:chgData name="Johann Bock Severin" userId="3b36179260fc8001" providerId="LiveId" clId="{C03BB677-E050-4623-A208-34D9F8363555}" dt="2023-10-19T07:39:06.758" v="170" actId="1076"/>
+          <ac:spMkLst>
+            <pc:docMk/>
+            <pc:sldMk cId="905087242" sldId="269"/>
+            <ac:spMk id="14" creationId="{6ACD28DD-E622-4C66-7DE4-C5C94AF68EFF}"/>
+          </ac:spMkLst>
+        </pc:spChg>
+        <pc:cxnChg chg="mod">
+          <ac:chgData name="Johann Bock Severin" userId="3b36179260fc8001" providerId="LiveId" clId="{C03BB677-E050-4623-A208-34D9F8363555}" dt="2023-10-19T07:39:00.730" v="167" actId="1076"/>
+          <ac:cxnSpMkLst>
+            <pc:docMk/>
+            <pc:sldMk cId="905087242" sldId="269"/>
+            <ac:cxnSpMk id="3" creationId="{CA021BD1-0D32-1182-6D37-16374E0B5D55}"/>
+          </ac:cxnSpMkLst>
+        </pc:cxnChg>
+        <pc:cxnChg chg="mod">
+          <ac:chgData name="Johann Bock Severin" userId="3b36179260fc8001" providerId="LiveId" clId="{C03BB677-E050-4623-A208-34D9F8363555}" dt="2023-10-19T07:39:00.730" v="167" actId="1076"/>
+          <ac:cxnSpMkLst>
+            <pc:docMk/>
+            <pc:sldMk cId="905087242" sldId="269"/>
+            <ac:cxnSpMk id="4" creationId="{C4DA9E31-4BEE-8866-CA5F-E9AE4B73D6B6}"/>
+          </ac:cxnSpMkLst>
+        </pc:cxnChg>
         <pc:cxnChg chg="add mod ord">
-          <ac:chgData name="Johann Bock Severin" userId="3b36179260fc8001" providerId="LiveId" clId="{C03BB677-E050-4623-A208-34D9F8363555}" dt="2023-10-18T13:10:55.213" v="117" actId="208"/>
+          <ac:chgData name="Johann Bock Severin" userId="3b36179260fc8001" providerId="LiveId" clId="{C03BB677-E050-4623-A208-34D9F8363555}" dt="2023-10-19T07:39:00.730" v="167" actId="1076"/>
           <ac:cxnSpMkLst>
             <pc:docMk/>
             <pc:sldMk cId="905087242" sldId="269"/>
             <ac:cxnSpMk id="13" creationId="{061099DF-BC20-A0E7-D519-7F32CDE8C83C}"/>
+          </ac:cxnSpMkLst>
+        </pc:cxnChg>
+      </pc:sldChg>
+      <pc:sldChg chg="addSp delSp modSp add mod">
+        <pc:chgData name="Johann Bock Severin" userId="3b36179260fc8001" providerId="LiveId" clId="{C03BB677-E050-4623-A208-34D9F8363555}" dt="2023-10-20T07:03:45.048" v="179" actId="167"/>
+        <pc:sldMkLst>
+          <pc:docMk/>
+          <pc:sldMk cId="2174260723" sldId="270"/>
+        </pc:sldMkLst>
+        <pc:spChg chg="del">
+          <ac:chgData name="Johann Bock Severin" userId="3b36179260fc8001" providerId="LiveId" clId="{C03BB677-E050-4623-A208-34D9F8363555}" dt="2023-10-20T07:03:18.728" v="172" actId="478"/>
+          <ac:spMkLst>
+            <pc:docMk/>
+            <pc:sldMk cId="2174260723" sldId="270"/>
+            <ac:spMk id="2" creationId="{C0EFE72D-3B55-866C-60B8-8F8DE8FFB30C}"/>
+          </ac:spMkLst>
+        </pc:spChg>
+        <pc:spChg chg="mod">
+          <ac:chgData name="Johann Bock Severin" userId="3b36179260fc8001" providerId="LiveId" clId="{C03BB677-E050-4623-A208-34D9F8363555}" dt="2023-10-20T07:03:38.100" v="178" actId="14100"/>
+          <ac:spMkLst>
+            <pc:docMk/>
+            <pc:sldMk cId="2174260723" sldId="270"/>
+            <ac:spMk id="6" creationId="{D9C95B52-2144-BCB7-B719-A4282C7626B6}"/>
+          </ac:spMkLst>
+        </pc:spChg>
+        <pc:spChg chg="del">
+          <ac:chgData name="Johann Bock Severin" userId="3b36179260fc8001" providerId="LiveId" clId="{C03BB677-E050-4623-A208-34D9F8363555}" dt="2023-10-20T07:03:18.728" v="172" actId="478"/>
+          <ac:spMkLst>
+            <pc:docMk/>
+            <pc:sldMk cId="2174260723" sldId="270"/>
+            <ac:spMk id="7" creationId="{81996FED-B48A-A56E-983A-2ACD0D2E2E45}"/>
+          </ac:spMkLst>
+        </pc:spChg>
+        <pc:spChg chg="add mod ord">
+          <ac:chgData name="Johann Bock Severin" userId="3b36179260fc8001" providerId="LiveId" clId="{C03BB677-E050-4623-A208-34D9F8363555}" dt="2023-10-20T07:03:45.048" v="179" actId="167"/>
+          <ac:spMkLst>
+            <pc:docMk/>
+            <pc:sldMk cId="2174260723" sldId="270"/>
+            <ac:spMk id="8" creationId="{21653ABA-7CAC-A4E1-B569-FB94394954A8}"/>
+          </ac:spMkLst>
+        </pc:spChg>
+        <pc:spChg chg="add mod ord">
+          <ac:chgData name="Johann Bock Severin" userId="3b36179260fc8001" providerId="LiveId" clId="{C03BB677-E050-4623-A208-34D9F8363555}" dt="2023-10-20T07:03:45.048" v="179" actId="167"/>
+          <ac:spMkLst>
+            <pc:docMk/>
+            <pc:sldMk cId="2174260723" sldId="270"/>
+            <ac:spMk id="9" creationId="{04FAFA5A-24EE-DDDB-CDBE-ADF2DB15F93C}"/>
+          </ac:spMkLst>
+        </pc:spChg>
+        <pc:spChg chg="add del mod">
+          <ac:chgData name="Johann Bock Severin" userId="3b36179260fc8001" providerId="LiveId" clId="{C03BB677-E050-4623-A208-34D9F8363555}" dt="2023-10-20T07:03:35.506" v="177" actId="478"/>
+          <ac:spMkLst>
+            <pc:docMk/>
+            <pc:sldMk cId="2174260723" sldId="270"/>
+            <ac:spMk id="10" creationId="{B9350559-B948-820D-148D-99D16D93429F}"/>
+          </ac:spMkLst>
+        </pc:spChg>
+        <pc:spChg chg="del">
+          <ac:chgData name="Johann Bock Severin" userId="3b36179260fc8001" providerId="LiveId" clId="{C03BB677-E050-4623-A208-34D9F8363555}" dt="2023-10-20T07:03:30.458" v="175" actId="478"/>
+          <ac:spMkLst>
+            <pc:docMk/>
+            <pc:sldMk cId="2174260723" sldId="270"/>
+            <ac:spMk id="11" creationId="{1B19C28F-BF7A-7A85-6633-4D334D86F725}"/>
+          </ac:spMkLst>
+        </pc:spChg>
+        <pc:spChg chg="add mod ord">
+          <ac:chgData name="Johann Bock Severin" userId="3b36179260fc8001" providerId="LiveId" clId="{C03BB677-E050-4623-A208-34D9F8363555}" dt="2023-10-20T07:03:45.048" v="179" actId="167"/>
+          <ac:spMkLst>
+            <pc:docMk/>
+            <pc:sldMk cId="2174260723" sldId="270"/>
+            <ac:spMk id="15" creationId="{CF3D54C0-3099-BAB4-7A17-B7E607A04931}"/>
+          </ac:spMkLst>
+        </pc:spChg>
+        <pc:spChg chg="add mod">
+          <ac:chgData name="Johann Bock Severin" userId="3b36179260fc8001" providerId="LiveId" clId="{C03BB677-E050-4623-A208-34D9F8363555}" dt="2023-10-20T07:03:26.874" v="174" actId="1076"/>
+          <ac:spMkLst>
+            <pc:docMk/>
+            <pc:sldMk cId="2174260723" sldId="270"/>
+            <ac:spMk id="16" creationId="{8D8CB28F-B2E2-40B7-0A75-524BA8D8CACF}"/>
+          </ac:spMkLst>
+        </pc:spChg>
+        <pc:cxnChg chg="del mod">
+          <ac:chgData name="Johann Bock Severin" userId="3b36179260fc8001" providerId="LiveId" clId="{C03BB677-E050-4623-A208-34D9F8363555}" dt="2023-10-20T07:03:31.594" v="176" actId="478"/>
+          <ac:cxnSpMkLst>
+            <pc:docMk/>
+            <pc:sldMk cId="2174260723" sldId="270"/>
+            <ac:cxnSpMk id="13" creationId="{061099DF-BC20-A0E7-D519-7F32CDE8C83C}"/>
+          </ac:cxnSpMkLst>
+        </pc:cxnChg>
+      </pc:sldChg>
+      <pc:sldChg chg="addSp delSp modSp add mod ord">
+        <pc:chgData name="Johann Bock Severin" userId="3b36179260fc8001" providerId="LiveId" clId="{C03BB677-E050-4623-A208-34D9F8363555}" dt="2023-10-20T07:11:55.027" v="245" actId="1076"/>
+        <pc:sldMkLst>
+          <pc:docMk/>
+          <pc:sldMk cId="1306240863" sldId="271"/>
+        </pc:sldMkLst>
+        <pc:spChg chg="add mod ord">
+          <ac:chgData name="Johann Bock Severin" userId="3b36179260fc8001" providerId="LiveId" clId="{C03BB677-E050-4623-A208-34D9F8363555}" dt="2023-10-20T07:11:55.027" v="245" actId="1076"/>
+          <ac:spMkLst>
+            <pc:docMk/>
+            <pc:sldMk cId="1306240863" sldId="271"/>
+            <ac:spMk id="2" creationId="{CA489DA5-A4AD-814A-42FC-372DF3CCF599}"/>
+          </ac:spMkLst>
+        </pc:spChg>
+        <pc:spChg chg="del">
+          <ac:chgData name="Johann Bock Severin" userId="3b36179260fc8001" providerId="LiveId" clId="{C03BB677-E050-4623-A208-34D9F8363555}" dt="2023-10-20T07:04:34.140" v="184" actId="478"/>
+          <ac:spMkLst>
+            <pc:docMk/>
+            <pc:sldMk cId="1306240863" sldId="271"/>
+            <ac:spMk id="5" creationId="{27AC2383-6C4D-E861-681E-45BE55EB3CDA}"/>
+          </ac:spMkLst>
+        </pc:spChg>
+        <pc:spChg chg="del">
+          <ac:chgData name="Johann Bock Severin" userId="3b36179260fc8001" providerId="LiveId" clId="{C03BB677-E050-4623-A208-34D9F8363555}" dt="2023-10-20T07:04:43.523" v="188" actId="478"/>
+          <ac:spMkLst>
+            <pc:docMk/>
+            <pc:sldMk cId="1306240863" sldId="271"/>
+            <ac:spMk id="6" creationId="{D9C95B52-2144-BCB7-B719-A4282C7626B6}"/>
+          </ac:spMkLst>
+        </pc:spChg>
+        <pc:spChg chg="add mod ord">
+          <ac:chgData name="Johann Bock Severin" userId="3b36179260fc8001" providerId="LiveId" clId="{C03BB677-E050-4623-A208-34D9F8363555}" dt="2023-10-20T07:08:33.351" v="242" actId="1076"/>
+          <ac:spMkLst>
+            <pc:docMk/>
+            <pc:sldMk cId="1306240863" sldId="271"/>
+            <ac:spMk id="7" creationId="{3441FB18-FFCA-EEC5-406F-C47F60C7081A}"/>
+          </ac:spMkLst>
+        </pc:spChg>
+        <pc:spChg chg="add mod ord">
+          <ac:chgData name="Johann Bock Severin" userId="3b36179260fc8001" providerId="LiveId" clId="{C03BB677-E050-4623-A208-34D9F8363555}" dt="2023-10-20T07:08:33.351" v="242" actId="1076"/>
+          <ac:spMkLst>
+            <pc:docMk/>
+            <pc:sldMk cId="1306240863" sldId="271"/>
+            <ac:spMk id="11" creationId="{F3B2A22A-ACAB-EFFA-52F8-CA548FC2030E}"/>
+          </ac:spMkLst>
+        </pc:spChg>
+        <pc:cxnChg chg="mod">
+          <ac:chgData name="Johann Bock Severin" userId="3b36179260fc8001" providerId="LiveId" clId="{C03BB677-E050-4623-A208-34D9F8363555}" dt="2023-10-20T07:08:33.351" v="242" actId="1076"/>
+          <ac:cxnSpMkLst>
+            <pc:docMk/>
+            <pc:sldMk cId="1306240863" sldId="271"/>
+            <ac:cxnSpMk id="3" creationId="{CA021BD1-0D32-1182-6D37-16374E0B5D55}"/>
+          </ac:cxnSpMkLst>
+        </pc:cxnChg>
+      </pc:sldChg>
+      <pc:sldChg chg="addSp delSp modSp add mod">
+        <pc:chgData name="Johann Bock Severin" userId="3b36179260fc8001" providerId="LiveId" clId="{C03BB677-E050-4623-A208-34D9F8363555}" dt="2023-10-20T07:12:27.405" v="246" actId="1076"/>
+        <pc:sldMkLst>
+          <pc:docMk/>
+          <pc:sldMk cId="3275447184" sldId="272"/>
+        </pc:sldMkLst>
+        <pc:spChg chg="del">
+          <ac:chgData name="Johann Bock Severin" userId="3b36179260fc8001" providerId="LiveId" clId="{C03BB677-E050-4623-A208-34D9F8363555}" dt="2023-10-20T07:05:27.315" v="196" actId="478"/>
+          <ac:spMkLst>
+            <pc:docMk/>
+            <pc:sldMk cId="3275447184" sldId="272"/>
+            <ac:spMk id="2" creationId="{CA489DA5-A4AD-814A-42FC-372DF3CCF599}"/>
+          </ac:spMkLst>
+        </pc:spChg>
+        <pc:spChg chg="add mod ord">
+          <ac:chgData name="Johann Bock Severin" userId="3b36179260fc8001" providerId="LiveId" clId="{C03BB677-E050-4623-A208-34D9F8363555}" dt="2023-10-20T07:08:02.905" v="236" actId="1076"/>
+          <ac:spMkLst>
+            <pc:docMk/>
+            <pc:sldMk cId="3275447184" sldId="272"/>
+            <ac:spMk id="5" creationId="{EB6E3266-7E7E-3BBF-63E4-90DCE73D59E9}"/>
+          </ac:spMkLst>
+        </pc:spChg>
+        <pc:spChg chg="add mod ord">
+          <ac:chgData name="Johann Bock Severin" userId="3b36179260fc8001" providerId="LiveId" clId="{C03BB677-E050-4623-A208-34D9F8363555}" dt="2023-10-20T07:07:08.327" v="222" actId="1076"/>
+          <ac:spMkLst>
+            <pc:docMk/>
+            <pc:sldMk cId="3275447184" sldId="272"/>
+            <ac:spMk id="6" creationId="{F0E7A0F5-F772-1664-A8EA-198A5C54D406}"/>
+          </ac:spMkLst>
+        </pc:spChg>
+        <pc:spChg chg="del">
+          <ac:chgData name="Johann Bock Severin" userId="3b36179260fc8001" providerId="LiveId" clId="{C03BB677-E050-4623-A208-34D9F8363555}" dt="2023-10-20T07:05:45.560" v="201" actId="478"/>
+          <ac:spMkLst>
+            <pc:docMk/>
+            <pc:sldMk cId="3275447184" sldId="272"/>
+            <ac:spMk id="7" creationId="{3441FB18-FFCA-EEC5-406F-C47F60C7081A}"/>
+          </ac:spMkLst>
+        </pc:spChg>
+        <pc:spChg chg="del">
+          <ac:chgData name="Johann Bock Severin" userId="3b36179260fc8001" providerId="LiveId" clId="{C03BB677-E050-4623-A208-34D9F8363555}" dt="2023-10-20T07:05:45.560" v="201" actId="478"/>
+          <ac:spMkLst>
+            <pc:docMk/>
+            <pc:sldMk cId="3275447184" sldId="272"/>
+            <ac:spMk id="11" creationId="{F3B2A22A-ACAB-EFFA-52F8-CA548FC2030E}"/>
+          </ac:spMkLst>
+        </pc:spChg>
+        <pc:spChg chg="add mod ord">
+          <ac:chgData name="Johann Bock Severin" userId="3b36179260fc8001" providerId="LiveId" clId="{C03BB677-E050-4623-A208-34D9F8363555}" dt="2023-10-20T07:08:41.645" v="243" actId="1076"/>
+          <ac:spMkLst>
+            <pc:docMk/>
+            <pc:sldMk cId="3275447184" sldId="272"/>
+            <ac:spMk id="12" creationId="{B0174089-D9E5-A5ED-5FAB-03D8BC57E727}"/>
+          </ac:spMkLst>
+        </pc:spChg>
+        <pc:spChg chg="add mod ord">
+          <ac:chgData name="Johann Bock Severin" userId="3b36179260fc8001" providerId="LiveId" clId="{C03BB677-E050-4623-A208-34D9F8363555}" dt="2023-10-20T07:08:41.645" v="243" actId="1076"/>
+          <ac:spMkLst>
+            <pc:docMk/>
+            <pc:sldMk cId="3275447184" sldId="272"/>
+            <ac:spMk id="13" creationId="{868D9FA5-8010-B0F7-0BD9-509391014915}"/>
+          </ac:spMkLst>
+        </pc:spChg>
+        <pc:spChg chg="add del mod">
+          <ac:chgData name="Johann Bock Severin" userId="3b36179260fc8001" providerId="LiveId" clId="{C03BB677-E050-4623-A208-34D9F8363555}" dt="2023-10-20T07:06:41.482" v="215" actId="478"/>
+          <ac:spMkLst>
+            <pc:docMk/>
+            <pc:sldMk cId="3275447184" sldId="272"/>
+            <ac:spMk id="18" creationId="{6F5D2D18-7BD9-C7F9-D150-A73F91E3307E}"/>
+          </ac:spMkLst>
+        </pc:spChg>
+        <pc:cxnChg chg="mod">
+          <ac:chgData name="Johann Bock Severin" userId="3b36179260fc8001" providerId="LiveId" clId="{C03BB677-E050-4623-A208-34D9F8363555}" dt="2023-10-20T07:08:41.645" v="243" actId="1076"/>
+          <ac:cxnSpMkLst>
+            <pc:docMk/>
+            <pc:sldMk cId="3275447184" sldId="272"/>
+            <ac:cxnSpMk id="3" creationId="{CA021BD1-0D32-1182-6D37-16374E0B5D55}"/>
+          </ac:cxnSpMkLst>
+        </pc:cxnChg>
+        <pc:cxnChg chg="del mod">
+          <ac:chgData name="Johann Bock Severin" userId="3b36179260fc8001" providerId="LiveId" clId="{C03BB677-E050-4623-A208-34D9F8363555}" dt="2023-10-20T07:06:47.137" v="217" actId="478"/>
+          <ac:cxnSpMkLst>
+            <pc:docMk/>
+            <pc:sldMk cId="3275447184" sldId="272"/>
+            <ac:cxnSpMk id="4" creationId="{C4DA9E31-4BEE-8866-CA5F-E9AE4B73D6B6}"/>
+          </ac:cxnSpMkLst>
+        </pc:cxnChg>
+        <pc:cxnChg chg="add mod">
+          <ac:chgData name="Johann Bock Severin" userId="3b36179260fc8001" providerId="LiveId" clId="{C03BB677-E050-4623-A208-34D9F8363555}" dt="2023-10-20T07:06:58.838" v="218" actId="1076"/>
+          <ac:cxnSpMkLst>
+            <pc:docMk/>
+            <pc:sldMk cId="3275447184" sldId="272"/>
+            <ac:cxnSpMk id="19" creationId="{1F05FB26-CD98-08A8-88ED-32B34915DA95}"/>
+          </ac:cxnSpMkLst>
+        </pc:cxnChg>
+        <pc:cxnChg chg="add mod ord">
+          <ac:chgData name="Johann Bock Severin" userId="3b36179260fc8001" providerId="LiveId" clId="{C03BB677-E050-4623-A208-34D9F8363555}" dt="2023-10-20T07:07:50.260" v="231" actId="167"/>
+          <ac:cxnSpMkLst>
+            <pc:docMk/>
+            <pc:sldMk cId="3275447184" sldId="272"/>
+            <ac:cxnSpMk id="20" creationId="{893D57FB-15A6-E2DF-23B8-B6CC6518A683}"/>
+          </ac:cxnSpMkLst>
+        </pc:cxnChg>
+        <pc:cxnChg chg="add mod ord">
+          <ac:chgData name="Johann Bock Severin" userId="3b36179260fc8001" providerId="LiveId" clId="{C03BB677-E050-4623-A208-34D9F8363555}" dt="2023-10-20T07:08:00.735" v="235" actId="1076"/>
+          <ac:cxnSpMkLst>
+            <pc:docMk/>
+            <pc:sldMk cId="3275447184" sldId="272"/>
+            <ac:cxnSpMk id="21" creationId="{A21B8F96-82EF-A392-4A3A-BB2B7E45ED29}"/>
+          </ac:cxnSpMkLst>
+        </pc:cxnChg>
+        <pc:cxnChg chg="add mod ord">
+          <ac:chgData name="Johann Bock Severin" userId="3b36179260fc8001" providerId="LiveId" clId="{C03BB677-E050-4623-A208-34D9F8363555}" dt="2023-10-20T07:12:27.405" v="246" actId="1076"/>
+          <ac:cxnSpMkLst>
+            <pc:docMk/>
+            <pc:sldMk cId="3275447184" sldId="272"/>
+            <ac:cxnSpMk id="22" creationId="{A3D7D116-D705-26EC-9A30-D5239C20CF15}"/>
           </ac:cxnSpMkLst>
         </pc:cxnChg>
       </pc:sldChg>
@@ -5523,7 +5893,7 @@
           <a:p>
             <a:fld id="{53BF19A1-7C9B-4536-8619-E606248327B6}" type="datetimeFigureOut">
               <a:rPr lang="en-DK" smtClean="0"/>
-              <a:t>18/10/2023</a:t>
+              <a:t>19/10/2023</a:t>
             </a:fld>
             <a:endParaRPr lang="en-DK"/>
           </a:p>
@@ -5940,7 +6310,7 @@
           <a:p>
             <a:fld id="{B21175D6-FCE9-4988-8B6E-5CB52F8DC15C}" type="datetimeFigureOut">
               <a:rPr lang="en-DK" smtClean="0"/>
-              <a:t>18/10/2023</a:t>
+              <a:t>19/10/2023</a:t>
             </a:fld>
             <a:endParaRPr lang="en-DK"/>
           </a:p>
@@ -6140,7 +6510,7 @@
           <a:p>
             <a:fld id="{B21175D6-FCE9-4988-8B6E-5CB52F8DC15C}" type="datetimeFigureOut">
               <a:rPr lang="en-DK" smtClean="0"/>
-              <a:t>18/10/2023</a:t>
+              <a:t>19/10/2023</a:t>
             </a:fld>
             <a:endParaRPr lang="en-DK"/>
           </a:p>
@@ -6350,7 +6720,7 @@
           <a:p>
             <a:fld id="{B21175D6-FCE9-4988-8B6E-5CB52F8DC15C}" type="datetimeFigureOut">
               <a:rPr lang="en-DK" smtClean="0"/>
-              <a:t>18/10/2023</a:t>
+              <a:t>19/10/2023</a:t>
             </a:fld>
             <a:endParaRPr lang="en-DK"/>
           </a:p>
@@ -6550,7 +6920,7 @@
           <a:p>
             <a:fld id="{B21175D6-FCE9-4988-8B6E-5CB52F8DC15C}" type="datetimeFigureOut">
               <a:rPr lang="en-DK" smtClean="0"/>
-              <a:t>18/10/2023</a:t>
+              <a:t>19/10/2023</a:t>
             </a:fld>
             <a:endParaRPr lang="en-DK"/>
           </a:p>
@@ -6826,7 +7196,7 @@
           <a:p>
             <a:fld id="{B21175D6-FCE9-4988-8B6E-5CB52F8DC15C}" type="datetimeFigureOut">
               <a:rPr lang="en-DK" smtClean="0"/>
-              <a:t>18/10/2023</a:t>
+              <a:t>19/10/2023</a:t>
             </a:fld>
             <a:endParaRPr lang="en-DK"/>
           </a:p>
@@ -7094,7 +7464,7 @@
           <a:p>
             <a:fld id="{B21175D6-FCE9-4988-8B6E-5CB52F8DC15C}" type="datetimeFigureOut">
               <a:rPr lang="en-DK" smtClean="0"/>
-              <a:t>18/10/2023</a:t>
+              <a:t>19/10/2023</a:t>
             </a:fld>
             <a:endParaRPr lang="en-DK"/>
           </a:p>
@@ -7509,7 +7879,7 @@
           <a:p>
             <a:fld id="{B21175D6-FCE9-4988-8B6E-5CB52F8DC15C}" type="datetimeFigureOut">
               <a:rPr lang="en-DK" smtClean="0"/>
-              <a:t>18/10/2023</a:t>
+              <a:t>19/10/2023</a:t>
             </a:fld>
             <a:endParaRPr lang="en-DK"/>
           </a:p>
@@ -7651,7 +8021,7 @@
           <a:p>
             <a:fld id="{B21175D6-FCE9-4988-8B6E-5CB52F8DC15C}" type="datetimeFigureOut">
               <a:rPr lang="en-DK" smtClean="0"/>
-              <a:t>18/10/2023</a:t>
+              <a:t>19/10/2023</a:t>
             </a:fld>
             <a:endParaRPr lang="en-DK"/>
           </a:p>
@@ -7764,7 +8134,7 @@
           <a:p>
             <a:fld id="{B21175D6-FCE9-4988-8B6E-5CB52F8DC15C}" type="datetimeFigureOut">
               <a:rPr lang="en-DK" smtClean="0"/>
-              <a:t>18/10/2023</a:t>
+              <a:t>19/10/2023</a:t>
             </a:fld>
             <a:endParaRPr lang="en-DK"/>
           </a:p>
@@ -8077,7 +8447,7 @@
           <a:p>
             <a:fld id="{B21175D6-FCE9-4988-8B6E-5CB52F8DC15C}" type="datetimeFigureOut">
               <a:rPr lang="en-DK" smtClean="0"/>
-              <a:t>18/10/2023</a:t>
+              <a:t>19/10/2023</a:t>
             </a:fld>
             <a:endParaRPr lang="en-DK"/>
           </a:p>
@@ -8366,7 +8736,7 @@
           <a:p>
             <a:fld id="{B21175D6-FCE9-4988-8B6E-5CB52F8DC15C}" type="datetimeFigureOut">
               <a:rPr lang="en-DK" smtClean="0"/>
-              <a:t>18/10/2023</a:t>
+              <a:t>19/10/2023</a:t>
             </a:fld>
             <a:endParaRPr lang="en-DK"/>
           </a:p>
@@ -8609,7 +8979,7 @@
           <a:p>
             <a:fld id="{B21175D6-FCE9-4988-8B6E-5CB52F8DC15C}" type="datetimeFigureOut">
               <a:rPr lang="en-DK" smtClean="0"/>
-              <a:t>18/10/2023</a:t>
+              <a:t>19/10/2023</a:t>
             </a:fld>
             <a:endParaRPr lang="en-DK"/>
           </a:p>
@@ -10394,7 +10764,7 @@
         </p:nvSpPr>
         <p:spPr>
           <a:xfrm>
-            <a:off x="4952061" y="4149462"/>
+            <a:off x="6152211" y="4149462"/>
             <a:ext cx="4926576" cy="1213450"/>
           </a:xfrm>
           <a:prstGeom prst="rect">
@@ -10468,7 +10838,7 @@
         </p:nvSpPr>
         <p:spPr>
           <a:xfrm>
-            <a:off x="3121968" y="2460781"/>
+            <a:off x="4322118" y="2460781"/>
             <a:ext cx="1213450" cy="1213450"/>
           </a:xfrm>
           <a:prstGeom prst="rect">
@@ -10535,7 +10905,7 @@
         </p:nvCxnSpPr>
         <p:spPr>
           <a:xfrm>
-            <a:off x="2423929" y="5364391"/>
+            <a:off x="3624079" y="5364391"/>
             <a:ext cx="7929922" cy="0"/>
           </a:xfrm>
           <a:prstGeom prst="line">
@@ -10578,7 +10948,7 @@
         </p:nvCxnSpPr>
         <p:spPr>
           <a:xfrm>
-            <a:off x="2423929" y="3672751"/>
+            <a:off x="3624079" y="3672751"/>
             <a:ext cx="7929922" cy="0"/>
           </a:xfrm>
           <a:prstGeom prst="line">
@@ -10619,8 +10989,8 @@
         </p:nvSpPr>
         <p:spPr>
           <a:xfrm>
-            <a:off x="164863" y="3254780"/>
-            <a:ext cx="1287532" cy="646331"/>
+            <a:off x="351188" y="3305536"/>
+            <a:ext cx="1657826" cy="830997"/>
           </a:xfrm>
           <a:prstGeom prst="rect">
             <a:avLst/>
@@ -10634,10 +11004,10 @@
           <a:lstStyle/>
           <a:p>
             <a:r>
-              <a:rPr lang="en-US" sz="3600" dirty="0"/>
+              <a:rPr lang="en-US" sz="4800" dirty="0"/>
               <a:t>Qubit</a:t>
             </a:r>
-            <a:endParaRPr lang="en-DK" sz="3600" dirty="0"/>
+            <a:endParaRPr lang="en-DK" sz="4800" dirty="0"/>
           </a:p>
         </p:txBody>
       </p:sp>
@@ -10655,8 +11025,8 @@
         </p:nvSpPr>
         <p:spPr>
           <a:xfrm>
-            <a:off x="110475" y="4934939"/>
-            <a:ext cx="2313454" cy="646331"/>
+            <a:off x="345556" y="4947413"/>
+            <a:ext cx="3028393" cy="830997"/>
           </a:xfrm>
           <a:prstGeom prst="rect">
             <a:avLst/>
@@ -10670,10 +11040,10 @@
           <a:lstStyle/>
           <a:p>
             <a:r>
-              <a:rPr lang="en-US" sz="3600" dirty="0"/>
+              <a:rPr lang="en-US" sz="4800" dirty="0"/>
               <a:t>Resonator</a:t>
             </a:r>
-            <a:endParaRPr lang="en-DK" sz="3600" dirty="0"/>
+            <a:endParaRPr lang="en-DK" sz="4800" dirty="0"/>
           </a:p>
         </p:txBody>
       </p:sp>
@@ -10693,8 +11063,8 @@
             </p:nvSpPr>
             <p:spPr>
               <a:xfrm>
-                <a:off x="1452395" y="3254780"/>
-                <a:ext cx="880369" cy="646331"/>
+                <a:off x="2259541" y="3247853"/>
+                <a:ext cx="1114408" cy="830997"/>
               </a:xfrm>
               <a:prstGeom prst="rect">
                 <a:avLst/>
@@ -10715,7 +11085,7 @@
                     </m:oMathParaPr>
                     <m:oMath xmlns:m="http://schemas.openxmlformats.org/officeDocument/2006/math">
                       <m:r>
-                        <a:rPr lang="en-US" sz="3600" b="0" i="1" smtClean="0">
+                        <a:rPr lang="en-US" sz="4800" b="0" i="1" smtClean="0">
                           <a:latin typeface="Cambria Math" panose="02040503050406030204" pitchFamily="18" charset="0"/>
                         </a:rPr>
                         <m:t>|0⟩</m:t>
@@ -10723,7 +11093,7 @@
                     </m:oMath>
                   </m:oMathPara>
                 </a14:m>
-                <a:endParaRPr lang="en-DK" sz="3600" dirty="0"/>
+                <a:endParaRPr lang="en-DK" sz="4800" dirty="0"/>
               </a:p>
             </p:txBody>
           </p:sp>
@@ -10745,8 +11115,8 @@
             </p:nvSpPr>
             <p:spPr>
               <a:xfrm>
-                <a:off x="1452395" y="3254780"/>
-                <a:ext cx="880369" cy="646331"/>
+                <a:off x="2259541" y="3247853"/>
+                <a:ext cx="1114408" cy="830997"/>
               </a:xfrm>
               <a:prstGeom prst="rect">
                 <a:avLst/>
@@ -10829,7 +11199,7 @@
         </p:nvSpPr>
         <p:spPr>
           <a:xfrm>
-            <a:off x="3569972" y="1996955"/>
+            <a:off x="4732022" y="2063630"/>
             <a:ext cx="769830" cy="1631641"/>
           </a:xfrm>
           <a:prstGeom prst="rect">
@@ -10886,7 +11256,7 @@
         </p:nvSpPr>
         <p:spPr>
           <a:xfrm>
-            <a:off x="5004312" y="4128081"/>
+            <a:off x="6166362" y="4194756"/>
             <a:ext cx="4926576" cy="1213450"/>
           </a:xfrm>
           <a:prstGeom prst="rect">
@@ -10962,7 +11332,7 @@
         </p:nvCxnSpPr>
         <p:spPr>
           <a:xfrm>
-            <a:off x="2618783" y="3628596"/>
+            <a:off x="3780833" y="3695271"/>
             <a:ext cx="7929922" cy="0"/>
           </a:xfrm>
           <a:prstGeom prst="line">
@@ -11003,7 +11373,7 @@
         </p:nvSpPr>
         <p:spPr>
           <a:xfrm flipH="1">
-            <a:off x="2908481" y="1996954"/>
+            <a:off x="4070531" y="2063629"/>
             <a:ext cx="557842" cy="1631641"/>
           </a:xfrm>
           <a:prstGeom prst="rightBrace">
@@ -11054,8 +11424,8 @@
             </p:nvSpPr>
             <p:spPr>
               <a:xfrm>
-                <a:off x="-429217" y="2313016"/>
-                <a:ext cx="6096000" cy="830997"/>
+                <a:off x="3296138" y="2414724"/>
+                <a:ext cx="960289" cy="830997"/>
               </a:xfrm>
               <a:prstGeom prst="rect">
                 <a:avLst/>
@@ -11109,182 +11479,14 @@
             </p:nvSpPr>
             <p:spPr>
               <a:xfrm>
-                <a:off x="-429217" y="2313016"/>
-                <a:ext cx="6096000" cy="830997"/>
+                <a:off x="3296138" y="2414724"/>
+                <a:ext cx="960289" cy="830997"/>
               </a:xfrm>
               <a:prstGeom prst="rect">
                 <a:avLst/>
               </a:prstGeom>
               <a:blipFill>
                 <a:blip r:embed="rId2"/>
-                <a:stretch>
-                  <a:fillRect/>
-                </a:stretch>
-              </a:blipFill>
-            </p:spPr>
-            <p:txBody>
-              <a:bodyPr/>
-              <a:lstStyle/>
-              <a:p>
-                <a:r>
-                  <a:rPr lang="en-DK">
-                    <a:noFill/>
-                  </a:rPr>
-                  <a:t> </a:t>
-                </a:r>
-              </a:p>
-            </p:txBody>
-          </p:sp>
-        </mc:Fallback>
-      </mc:AlternateContent>
-      <p:sp>
-        <p:nvSpPr>
-          <p:cNvPr id="10" name="TextBox 9">
-            <a:extLst>
-              <a:ext uri="{FF2B5EF4-FFF2-40B4-BE49-F238E27FC236}">
-                <a16:creationId xmlns:a16="http://schemas.microsoft.com/office/drawing/2014/main" id="{F0D15A58-3DE7-3E51-5F4B-7D733DED2234}"/>
-              </a:ext>
-            </a:extLst>
-          </p:cNvPr>
-          <p:cNvSpPr txBox="1"/>
-          <p:nvPr/>
-        </p:nvSpPr>
-        <p:spPr>
-          <a:xfrm>
-            <a:off x="148415" y="3260961"/>
-            <a:ext cx="1287532" cy="646331"/>
-          </a:xfrm>
-          <a:prstGeom prst="rect">
-            <a:avLst/>
-          </a:prstGeom>
-          <a:noFill/>
-        </p:spPr>
-        <p:txBody>
-          <a:bodyPr wrap="none" rtlCol="0">
-            <a:spAutoFit/>
-          </a:bodyPr>
-          <a:lstStyle/>
-          <a:p>
-            <a:r>
-              <a:rPr lang="en-US" sz="3600" dirty="0"/>
-              <a:t>Qubit</a:t>
-            </a:r>
-            <a:endParaRPr lang="en-DK" sz="3600" dirty="0"/>
-          </a:p>
-        </p:txBody>
-      </p:sp>
-      <p:sp>
-        <p:nvSpPr>
-          <p:cNvPr id="11" name="TextBox 10">
-            <a:extLst>
-              <a:ext uri="{FF2B5EF4-FFF2-40B4-BE49-F238E27FC236}">
-                <a16:creationId xmlns:a16="http://schemas.microsoft.com/office/drawing/2014/main" id="{2A3D3EB8-A403-B7F1-1530-A15667B2DC7A}"/>
-              </a:ext>
-            </a:extLst>
-          </p:cNvPr>
-          <p:cNvSpPr txBox="1"/>
-          <p:nvPr/>
-        </p:nvSpPr>
-        <p:spPr>
-          <a:xfrm>
-            <a:off x="148415" y="4962728"/>
-            <a:ext cx="2313454" cy="646331"/>
-          </a:xfrm>
-          <a:prstGeom prst="rect">
-            <a:avLst/>
-          </a:prstGeom>
-          <a:noFill/>
-        </p:spPr>
-        <p:txBody>
-          <a:bodyPr wrap="none" rtlCol="0">
-            <a:spAutoFit/>
-          </a:bodyPr>
-          <a:lstStyle/>
-          <a:p>
-            <a:r>
-              <a:rPr lang="en-US" sz="3600" dirty="0"/>
-              <a:t>Resonator</a:t>
-            </a:r>
-            <a:endParaRPr lang="en-DK" sz="3600" dirty="0"/>
-          </a:p>
-        </p:txBody>
-      </p:sp>
-      <mc:AlternateContent xmlns:mc="http://schemas.openxmlformats.org/markup-compatibility/2006">
-        <mc:Choice xmlns:a14="http://schemas.microsoft.com/office/drawing/2010/main" Requires="a14">
-          <p:sp>
-            <p:nvSpPr>
-              <p:cNvPr id="12" name="TextBox 11">
-                <a:extLst>
-                  <a:ext uri="{FF2B5EF4-FFF2-40B4-BE49-F238E27FC236}">
-                    <a16:creationId xmlns:a16="http://schemas.microsoft.com/office/drawing/2014/main" id="{8AB39FF7-F7F9-CA04-0D59-0E1D6B4A7808}"/>
-                  </a:ext>
-                </a:extLst>
-              </p:cNvPr>
-              <p:cNvSpPr txBox="1"/>
-              <p:nvPr/>
-            </p:nvSpPr>
-            <p:spPr>
-              <a:xfrm>
-                <a:off x="1659253" y="3245721"/>
-                <a:ext cx="880369" cy="646331"/>
-              </a:xfrm>
-              <a:prstGeom prst="rect">
-                <a:avLst/>
-              </a:prstGeom>
-              <a:noFill/>
-            </p:spPr>
-            <p:txBody>
-              <a:bodyPr wrap="none" rtlCol="0">
-                <a:spAutoFit/>
-              </a:bodyPr>
-              <a:lstStyle/>
-              <a:p>
-                <a:pPr/>
-                <a14:m>
-                  <m:oMathPara xmlns:m="http://schemas.openxmlformats.org/officeDocument/2006/math">
-                    <m:oMathParaPr>
-                      <m:jc m:val="centerGroup"/>
-                    </m:oMathParaPr>
-                    <m:oMath xmlns:m="http://schemas.openxmlformats.org/officeDocument/2006/math">
-                      <m:r>
-                        <a:rPr lang="en-US" sz="3600" b="0" i="1" smtClean="0">
-                          <a:latin typeface="Cambria Math" panose="02040503050406030204" pitchFamily="18" charset="0"/>
-                        </a:rPr>
-                        <m:t>|0⟩</m:t>
-                      </m:r>
-                    </m:oMath>
-                  </m:oMathPara>
-                </a14:m>
-                <a:endParaRPr lang="en-DK" sz="3600" dirty="0"/>
-              </a:p>
-            </p:txBody>
-          </p:sp>
-        </mc:Choice>
-        <mc:Fallback>
-          <p:sp>
-            <p:nvSpPr>
-              <p:cNvPr id="12" name="TextBox 11">
-                <a:extLst>
-                  <a:ext uri="{FF2B5EF4-FFF2-40B4-BE49-F238E27FC236}">
-                    <a16:creationId xmlns:a16="http://schemas.microsoft.com/office/drawing/2014/main" id="{8AB39FF7-F7F9-CA04-0D59-0E1D6B4A7808}"/>
-                  </a:ext>
-                </a:extLst>
-              </p:cNvPr>
-              <p:cNvSpPr txBox="1">
-                <a:spLocks noRot="1" noChangeAspect="1" noMove="1" noResize="1" noEditPoints="1" noAdjustHandles="1" noChangeArrowheads="1" noChangeShapeType="1" noTextEdit="1"/>
-              </p:cNvSpPr>
-              <p:nvPr/>
-            </p:nvSpPr>
-            <p:spPr>
-              <a:xfrm>
-                <a:off x="1659253" y="3245721"/>
-                <a:ext cx="880369" cy="646331"/>
-              </a:xfrm>
-              <a:prstGeom prst="rect">
-                <a:avLst/>
-              </a:prstGeom>
-              <a:blipFill>
-                <a:blip r:embed="rId3"/>
                 <a:stretch>
                   <a:fillRect/>
                 </a:stretch>
@@ -11321,7 +11523,7 @@
         </p:nvCxnSpPr>
         <p:spPr>
           <a:xfrm>
-            <a:off x="2618783" y="5341531"/>
+            <a:off x="3780833" y="5408206"/>
             <a:ext cx="7929922" cy="0"/>
           </a:xfrm>
           <a:prstGeom prst="line">
@@ -11348,6 +11550,174 @@
           </a:fontRef>
         </p:style>
       </p:cxnSp>
+      <p:sp>
+        <p:nvSpPr>
+          <p:cNvPr id="2" name="TextBox 1">
+            <a:extLst>
+              <a:ext uri="{FF2B5EF4-FFF2-40B4-BE49-F238E27FC236}">
+                <a16:creationId xmlns:a16="http://schemas.microsoft.com/office/drawing/2014/main" id="{76B08D92-3725-FE63-D95B-49F4277D3B89}"/>
+              </a:ext>
+            </a:extLst>
+          </p:cNvPr>
+          <p:cNvSpPr txBox="1"/>
+          <p:nvPr/>
+        </p:nvSpPr>
+        <p:spPr>
+          <a:xfrm>
+            <a:off x="565669" y="3303404"/>
+            <a:ext cx="1657826" cy="830997"/>
+          </a:xfrm>
+          <a:prstGeom prst="rect">
+            <a:avLst/>
+          </a:prstGeom>
+          <a:noFill/>
+        </p:spPr>
+        <p:txBody>
+          <a:bodyPr wrap="none" rtlCol="0">
+            <a:spAutoFit/>
+          </a:bodyPr>
+          <a:lstStyle/>
+          <a:p>
+            <a:r>
+              <a:rPr lang="en-US" sz="4800" dirty="0"/>
+              <a:t>Qubit</a:t>
+            </a:r>
+            <a:endParaRPr lang="en-DK" sz="4800" dirty="0"/>
+          </a:p>
+        </p:txBody>
+      </p:sp>
+      <p:sp>
+        <p:nvSpPr>
+          <p:cNvPr id="7" name="TextBox 6">
+            <a:extLst>
+              <a:ext uri="{FF2B5EF4-FFF2-40B4-BE49-F238E27FC236}">
+                <a16:creationId xmlns:a16="http://schemas.microsoft.com/office/drawing/2014/main" id="{929C95C0-A615-5D85-D7D4-0FCE9912EBAF}"/>
+              </a:ext>
+            </a:extLst>
+          </p:cNvPr>
+          <p:cNvSpPr txBox="1"/>
+          <p:nvPr/>
+        </p:nvSpPr>
+        <p:spPr>
+          <a:xfrm>
+            <a:off x="560037" y="4945281"/>
+            <a:ext cx="3028393" cy="830997"/>
+          </a:xfrm>
+          <a:prstGeom prst="rect">
+            <a:avLst/>
+          </a:prstGeom>
+          <a:noFill/>
+        </p:spPr>
+        <p:txBody>
+          <a:bodyPr wrap="none" rtlCol="0">
+            <a:spAutoFit/>
+          </a:bodyPr>
+          <a:lstStyle/>
+          <a:p>
+            <a:r>
+              <a:rPr lang="en-US" sz="4800" dirty="0"/>
+              <a:t>Resonator</a:t>
+            </a:r>
+            <a:endParaRPr lang="en-DK" sz="4800" dirty="0"/>
+          </a:p>
+        </p:txBody>
+      </p:sp>
+      <mc:AlternateContent xmlns:mc="http://schemas.openxmlformats.org/markup-compatibility/2006">
+        <mc:Choice xmlns:a14="http://schemas.microsoft.com/office/drawing/2010/main" Requires="a14">
+          <p:sp>
+            <p:nvSpPr>
+              <p:cNvPr id="9" name="TextBox 8">
+                <a:extLst>
+                  <a:ext uri="{FF2B5EF4-FFF2-40B4-BE49-F238E27FC236}">
+                    <a16:creationId xmlns:a16="http://schemas.microsoft.com/office/drawing/2014/main" id="{45B1DF8A-59A8-F169-95AE-7225A43E82DF}"/>
+                  </a:ext>
+                </a:extLst>
+              </p:cNvPr>
+              <p:cNvSpPr txBox="1"/>
+              <p:nvPr/>
+            </p:nvSpPr>
+            <p:spPr>
+              <a:xfrm>
+                <a:off x="2474022" y="3245721"/>
+                <a:ext cx="1114408" cy="830997"/>
+              </a:xfrm>
+              <a:prstGeom prst="rect">
+                <a:avLst/>
+              </a:prstGeom>
+              <a:noFill/>
+            </p:spPr>
+            <p:txBody>
+              <a:bodyPr wrap="none" rtlCol="0">
+                <a:spAutoFit/>
+              </a:bodyPr>
+              <a:lstStyle/>
+              <a:p>
+                <a:pPr/>
+                <a14:m>
+                  <m:oMathPara xmlns:m="http://schemas.openxmlformats.org/officeDocument/2006/math">
+                    <m:oMathParaPr>
+                      <m:jc m:val="centerGroup"/>
+                    </m:oMathParaPr>
+                    <m:oMath xmlns:m="http://schemas.openxmlformats.org/officeDocument/2006/math">
+                      <m:r>
+                        <a:rPr lang="en-US" sz="4800" b="0" i="1" smtClean="0">
+                          <a:latin typeface="Cambria Math" panose="02040503050406030204" pitchFamily="18" charset="0"/>
+                        </a:rPr>
+                        <m:t>|0⟩</m:t>
+                      </m:r>
+                    </m:oMath>
+                  </m:oMathPara>
+                </a14:m>
+                <a:endParaRPr lang="en-DK" sz="4800" dirty="0"/>
+              </a:p>
+            </p:txBody>
+          </p:sp>
+        </mc:Choice>
+        <mc:Fallback>
+          <p:sp>
+            <p:nvSpPr>
+              <p:cNvPr id="9" name="TextBox 8">
+                <a:extLst>
+                  <a:ext uri="{FF2B5EF4-FFF2-40B4-BE49-F238E27FC236}">
+                    <a16:creationId xmlns:a16="http://schemas.microsoft.com/office/drawing/2014/main" id="{45B1DF8A-59A8-F169-95AE-7225A43E82DF}"/>
+                  </a:ext>
+                </a:extLst>
+              </p:cNvPr>
+              <p:cNvSpPr txBox="1">
+                <a:spLocks noRot="1" noChangeAspect="1" noMove="1" noResize="1" noEditPoints="1" noAdjustHandles="1" noChangeArrowheads="1" noChangeShapeType="1" noTextEdit="1"/>
+              </p:cNvSpPr>
+              <p:nvPr/>
+            </p:nvSpPr>
+            <p:spPr>
+              <a:xfrm>
+                <a:off x="2474022" y="3245721"/>
+                <a:ext cx="1114408" cy="830997"/>
+              </a:xfrm>
+              <a:prstGeom prst="rect">
+                <a:avLst/>
+              </a:prstGeom>
+              <a:blipFill>
+                <a:blip r:embed="rId3"/>
+                <a:stretch>
+                  <a:fillRect/>
+                </a:stretch>
+              </a:blipFill>
+            </p:spPr>
+            <p:txBody>
+              <a:bodyPr/>
+              <a:lstStyle/>
+              <a:p>
+                <a:r>
+                  <a:rPr lang="en-DK">
+                    <a:noFill/>
+                  </a:rPr>
+                  <a:t> </a:t>
+                </a:r>
+              </a:p>
+            </p:txBody>
+          </p:sp>
+        </mc:Fallback>
+      </mc:AlternateContent>
     </p:spTree>
     <p:extLst>
       <p:ext uri="{BB962C8B-B14F-4D97-AF65-F5344CB8AC3E}">
@@ -11406,7 +11776,7 @@
         </p:nvCxnSpPr>
         <p:spPr>
           <a:xfrm flipV="1">
-            <a:off x="5433059" y="2459301"/>
+            <a:off x="6720591" y="2525976"/>
             <a:ext cx="0" cy="2298365"/>
           </a:xfrm>
           <a:prstGeom prst="line">
@@ -11451,7 +11821,7 @@
         </p:nvSpPr>
         <p:spPr>
           <a:xfrm>
-            <a:off x="2676742" y="2459301"/>
+            <a:off x="3964274" y="2525976"/>
             <a:ext cx="1213450" cy="1213450"/>
           </a:xfrm>
           <a:prstGeom prst="rect">
@@ -11525,7 +11895,7 @@
         </p:nvSpPr>
         <p:spPr>
           <a:xfrm>
-            <a:off x="5433059" y="4150941"/>
+            <a:off x="6720591" y="4217616"/>
             <a:ext cx="4811337" cy="1213450"/>
           </a:xfrm>
           <a:prstGeom prst="rect">
@@ -11601,7 +11971,7 @@
         </p:nvCxnSpPr>
         <p:spPr>
           <a:xfrm>
-            <a:off x="2423929" y="5364391"/>
+            <a:off x="3711461" y="5431066"/>
             <a:ext cx="7929922" cy="0"/>
           </a:xfrm>
           <a:prstGeom prst="line">
@@ -11644,7 +12014,7 @@
         </p:nvCxnSpPr>
         <p:spPr>
           <a:xfrm>
-            <a:off x="2423929" y="3672751"/>
+            <a:off x="3711461" y="3739426"/>
             <a:ext cx="7929922" cy="0"/>
           </a:xfrm>
           <a:prstGeom prst="line">
@@ -11673,174 +12043,6 @@
       </p:cxnSp>
       <p:sp>
         <p:nvSpPr>
-          <p:cNvPr id="8" name="TextBox 7">
-            <a:extLst>
-              <a:ext uri="{FF2B5EF4-FFF2-40B4-BE49-F238E27FC236}">
-                <a16:creationId xmlns:a16="http://schemas.microsoft.com/office/drawing/2014/main" id="{EAFD8482-E56C-7FEB-6A6E-D58D3EED0B0C}"/>
-              </a:ext>
-            </a:extLst>
-          </p:cNvPr>
-          <p:cNvSpPr txBox="1"/>
-          <p:nvPr/>
-        </p:nvSpPr>
-        <p:spPr>
-          <a:xfrm>
-            <a:off x="164863" y="3254780"/>
-            <a:ext cx="1287532" cy="646331"/>
-          </a:xfrm>
-          <a:prstGeom prst="rect">
-            <a:avLst/>
-          </a:prstGeom>
-          <a:noFill/>
-        </p:spPr>
-        <p:txBody>
-          <a:bodyPr wrap="none" rtlCol="0">
-            <a:spAutoFit/>
-          </a:bodyPr>
-          <a:lstStyle/>
-          <a:p>
-            <a:r>
-              <a:rPr lang="en-US" sz="3600" dirty="0"/>
-              <a:t>Qubit</a:t>
-            </a:r>
-            <a:endParaRPr lang="en-DK" sz="3600" dirty="0"/>
-          </a:p>
-        </p:txBody>
-      </p:sp>
-      <p:sp>
-        <p:nvSpPr>
-          <p:cNvPr id="9" name="TextBox 8">
-            <a:extLst>
-              <a:ext uri="{FF2B5EF4-FFF2-40B4-BE49-F238E27FC236}">
-                <a16:creationId xmlns:a16="http://schemas.microsoft.com/office/drawing/2014/main" id="{53E21F6C-0702-D6A4-865B-77F276CABB89}"/>
-              </a:ext>
-            </a:extLst>
-          </p:cNvPr>
-          <p:cNvSpPr txBox="1"/>
-          <p:nvPr/>
-        </p:nvSpPr>
-        <p:spPr>
-          <a:xfrm>
-            <a:off x="110475" y="4934939"/>
-            <a:ext cx="2313454" cy="646331"/>
-          </a:xfrm>
-          <a:prstGeom prst="rect">
-            <a:avLst/>
-          </a:prstGeom>
-          <a:noFill/>
-        </p:spPr>
-        <p:txBody>
-          <a:bodyPr wrap="none" rtlCol="0">
-            <a:spAutoFit/>
-          </a:bodyPr>
-          <a:lstStyle/>
-          <a:p>
-            <a:r>
-              <a:rPr lang="en-US" sz="3600" dirty="0"/>
-              <a:t>Resonator</a:t>
-            </a:r>
-            <a:endParaRPr lang="en-DK" sz="3600" dirty="0"/>
-          </a:p>
-        </p:txBody>
-      </p:sp>
-      <mc:AlternateContent xmlns:mc="http://schemas.openxmlformats.org/markup-compatibility/2006">
-        <mc:Choice xmlns:a14="http://schemas.microsoft.com/office/drawing/2010/main" Requires="a14">
-          <p:sp>
-            <p:nvSpPr>
-              <p:cNvPr id="10" name="TextBox 9">
-                <a:extLst>
-                  <a:ext uri="{FF2B5EF4-FFF2-40B4-BE49-F238E27FC236}">
-                    <a16:creationId xmlns:a16="http://schemas.microsoft.com/office/drawing/2014/main" id="{CD70FD5E-DE0E-7DE6-4F82-5F3776A580BC}"/>
-                  </a:ext>
-                </a:extLst>
-              </p:cNvPr>
-              <p:cNvSpPr txBox="1"/>
-              <p:nvPr/>
-            </p:nvSpPr>
-            <p:spPr>
-              <a:xfrm>
-                <a:off x="1452395" y="3254780"/>
-                <a:ext cx="880369" cy="646331"/>
-              </a:xfrm>
-              <a:prstGeom prst="rect">
-                <a:avLst/>
-              </a:prstGeom>
-              <a:noFill/>
-            </p:spPr>
-            <p:txBody>
-              <a:bodyPr wrap="none" rtlCol="0">
-                <a:spAutoFit/>
-              </a:bodyPr>
-              <a:lstStyle/>
-              <a:p>
-                <a:pPr/>
-                <a14:m>
-                  <m:oMathPara xmlns:m="http://schemas.openxmlformats.org/officeDocument/2006/math">
-                    <m:oMathParaPr>
-                      <m:jc m:val="centerGroup"/>
-                    </m:oMathParaPr>
-                    <m:oMath xmlns:m="http://schemas.openxmlformats.org/officeDocument/2006/math">
-                      <m:r>
-                        <a:rPr lang="en-US" sz="3600" b="0" i="1" smtClean="0">
-                          <a:latin typeface="Cambria Math" panose="02040503050406030204" pitchFamily="18" charset="0"/>
-                        </a:rPr>
-                        <m:t>|0⟩</m:t>
-                      </m:r>
-                    </m:oMath>
-                  </m:oMathPara>
-                </a14:m>
-                <a:endParaRPr lang="en-DK" sz="3600" dirty="0"/>
-              </a:p>
-            </p:txBody>
-          </p:sp>
-        </mc:Choice>
-        <mc:Fallback>
-          <p:sp>
-            <p:nvSpPr>
-              <p:cNvPr id="10" name="TextBox 9">
-                <a:extLst>
-                  <a:ext uri="{FF2B5EF4-FFF2-40B4-BE49-F238E27FC236}">
-                    <a16:creationId xmlns:a16="http://schemas.microsoft.com/office/drawing/2014/main" id="{CD70FD5E-DE0E-7DE6-4F82-5F3776A580BC}"/>
-                  </a:ext>
-                </a:extLst>
-              </p:cNvPr>
-              <p:cNvSpPr txBox="1">
-                <a:spLocks noRot="1" noChangeAspect="1" noMove="1" noResize="1" noEditPoints="1" noAdjustHandles="1" noChangeArrowheads="1" noChangeShapeType="1" noTextEdit="1"/>
-              </p:cNvSpPr>
-              <p:nvPr/>
-            </p:nvSpPr>
-            <p:spPr>
-              <a:xfrm>
-                <a:off x="1452395" y="3254780"/>
-                <a:ext cx="880369" cy="646331"/>
-              </a:xfrm>
-              <a:prstGeom prst="rect">
-                <a:avLst/>
-              </a:prstGeom>
-              <a:blipFill>
-                <a:blip r:embed="rId2"/>
-                <a:stretch>
-                  <a:fillRect/>
-                </a:stretch>
-              </a:blipFill>
-            </p:spPr>
-            <p:txBody>
-              <a:bodyPr/>
-              <a:lstStyle/>
-              <a:p>
-                <a:r>
-                  <a:rPr lang="en-DK">
-                    <a:noFill/>
-                  </a:rPr>
-                  <a:t> </a:t>
-                </a:r>
-              </a:p>
-            </p:txBody>
-          </p:sp>
-        </mc:Fallback>
-      </mc:AlternateContent>
-      <p:sp>
-        <p:nvSpPr>
           <p:cNvPr id="7" name="Right Brace 6">
             <a:extLst>
               <a:ext uri="{FF2B5EF4-FFF2-40B4-BE49-F238E27FC236}">
@@ -11853,7 +12055,7 @@
         </p:nvSpPr>
         <p:spPr>
           <a:xfrm rot="16200000">
-            <a:off x="4411279" y="1290252"/>
+            <a:off x="5698811" y="1356927"/>
             <a:ext cx="500689" cy="1542864"/>
           </a:xfrm>
           <a:prstGeom prst="rightBrace">
@@ -11907,7 +12109,7 @@
             </p:nvSpPr>
             <p:spPr>
               <a:xfrm>
-                <a:off x="3890191" y="833070"/>
+                <a:off x="5177723" y="899745"/>
                 <a:ext cx="1628844" cy="830997"/>
               </a:xfrm>
               <a:prstGeom prst="rect">
@@ -11978,8 +12180,176 @@
             </p:nvSpPr>
             <p:spPr>
               <a:xfrm>
-                <a:off x="3890191" y="833070"/>
+                <a:off x="5177723" y="899745"/>
                 <a:ext cx="1628844" cy="830997"/>
+              </a:xfrm>
+              <a:prstGeom prst="rect">
+                <a:avLst/>
+              </a:prstGeom>
+              <a:blipFill>
+                <a:blip r:embed="rId2"/>
+                <a:stretch>
+                  <a:fillRect/>
+                </a:stretch>
+              </a:blipFill>
+            </p:spPr>
+            <p:txBody>
+              <a:bodyPr/>
+              <a:lstStyle/>
+              <a:p>
+                <a:r>
+                  <a:rPr lang="en-DK">
+                    <a:noFill/>
+                  </a:rPr>
+                  <a:t> </a:t>
+                </a:r>
+              </a:p>
+            </p:txBody>
+          </p:sp>
+        </mc:Fallback>
+      </mc:AlternateContent>
+      <p:sp>
+        <p:nvSpPr>
+          <p:cNvPr id="5" name="TextBox 4">
+            <a:extLst>
+              <a:ext uri="{FF2B5EF4-FFF2-40B4-BE49-F238E27FC236}">
+                <a16:creationId xmlns:a16="http://schemas.microsoft.com/office/drawing/2014/main" id="{36F7574C-8A1C-01B9-EC8F-B382C22EEE6D}"/>
+              </a:ext>
+            </a:extLst>
+          </p:cNvPr>
+          <p:cNvSpPr txBox="1"/>
+          <p:nvPr/>
+        </p:nvSpPr>
+        <p:spPr>
+          <a:xfrm>
+            <a:off x="400690" y="3373690"/>
+            <a:ext cx="1657826" cy="830997"/>
+          </a:xfrm>
+          <a:prstGeom prst="rect">
+            <a:avLst/>
+          </a:prstGeom>
+          <a:noFill/>
+        </p:spPr>
+        <p:txBody>
+          <a:bodyPr wrap="none" rtlCol="0">
+            <a:spAutoFit/>
+          </a:bodyPr>
+          <a:lstStyle/>
+          <a:p>
+            <a:r>
+              <a:rPr lang="en-US" sz="4800" dirty="0"/>
+              <a:t>Qubit</a:t>
+            </a:r>
+            <a:endParaRPr lang="en-DK" sz="4800" dirty="0"/>
+          </a:p>
+        </p:txBody>
+      </p:sp>
+      <p:sp>
+        <p:nvSpPr>
+          <p:cNvPr id="12" name="TextBox 11">
+            <a:extLst>
+              <a:ext uri="{FF2B5EF4-FFF2-40B4-BE49-F238E27FC236}">
+                <a16:creationId xmlns:a16="http://schemas.microsoft.com/office/drawing/2014/main" id="{70EB4BAE-AC17-C333-A926-02A015BC6D4A}"/>
+              </a:ext>
+            </a:extLst>
+          </p:cNvPr>
+          <p:cNvSpPr txBox="1"/>
+          <p:nvPr/>
+        </p:nvSpPr>
+        <p:spPr>
+          <a:xfrm>
+            <a:off x="395058" y="5015567"/>
+            <a:ext cx="3028393" cy="830997"/>
+          </a:xfrm>
+          <a:prstGeom prst="rect">
+            <a:avLst/>
+          </a:prstGeom>
+          <a:noFill/>
+        </p:spPr>
+        <p:txBody>
+          <a:bodyPr wrap="none" rtlCol="0">
+            <a:spAutoFit/>
+          </a:bodyPr>
+          <a:lstStyle/>
+          <a:p>
+            <a:r>
+              <a:rPr lang="en-US" sz="4800" dirty="0"/>
+              <a:t>Resonator</a:t>
+            </a:r>
+            <a:endParaRPr lang="en-DK" sz="4800" dirty="0"/>
+          </a:p>
+        </p:txBody>
+      </p:sp>
+      <mc:AlternateContent xmlns:mc="http://schemas.openxmlformats.org/markup-compatibility/2006">
+        <mc:Choice xmlns:a14="http://schemas.microsoft.com/office/drawing/2010/main" Requires="a14">
+          <p:sp>
+            <p:nvSpPr>
+              <p:cNvPr id="14" name="TextBox 13">
+                <a:extLst>
+                  <a:ext uri="{FF2B5EF4-FFF2-40B4-BE49-F238E27FC236}">
+                    <a16:creationId xmlns:a16="http://schemas.microsoft.com/office/drawing/2014/main" id="{6ACD28DD-E622-4C66-7DE4-C5C94AF68EFF}"/>
+                  </a:ext>
+                </a:extLst>
+              </p:cNvPr>
+              <p:cNvSpPr txBox="1"/>
+              <p:nvPr/>
+            </p:nvSpPr>
+            <p:spPr>
+              <a:xfrm>
+                <a:off x="2309043" y="3316007"/>
+                <a:ext cx="1114408" cy="830997"/>
+              </a:xfrm>
+              <a:prstGeom prst="rect">
+                <a:avLst/>
+              </a:prstGeom>
+              <a:noFill/>
+            </p:spPr>
+            <p:txBody>
+              <a:bodyPr wrap="none" rtlCol="0">
+                <a:spAutoFit/>
+              </a:bodyPr>
+              <a:lstStyle/>
+              <a:p>
+                <a:pPr/>
+                <a14:m>
+                  <m:oMathPara xmlns:m="http://schemas.openxmlformats.org/officeDocument/2006/math">
+                    <m:oMathParaPr>
+                      <m:jc m:val="centerGroup"/>
+                    </m:oMathParaPr>
+                    <m:oMath xmlns:m="http://schemas.openxmlformats.org/officeDocument/2006/math">
+                      <m:r>
+                        <a:rPr lang="en-US" sz="4800" b="0" i="1" smtClean="0">
+                          <a:latin typeface="Cambria Math" panose="02040503050406030204" pitchFamily="18" charset="0"/>
+                        </a:rPr>
+                        <m:t>|0⟩</m:t>
+                      </m:r>
+                    </m:oMath>
+                  </m:oMathPara>
+                </a14:m>
+                <a:endParaRPr lang="en-DK" sz="4800" dirty="0"/>
+              </a:p>
+            </p:txBody>
+          </p:sp>
+        </mc:Choice>
+        <mc:Fallback>
+          <p:sp>
+            <p:nvSpPr>
+              <p:cNvPr id="14" name="TextBox 13">
+                <a:extLst>
+                  <a:ext uri="{FF2B5EF4-FFF2-40B4-BE49-F238E27FC236}">
+                    <a16:creationId xmlns:a16="http://schemas.microsoft.com/office/drawing/2014/main" id="{6ACD28DD-E622-4C66-7DE4-C5C94AF68EFF}"/>
+                  </a:ext>
+                </a:extLst>
+              </p:cNvPr>
+              <p:cNvSpPr txBox="1">
+                <a:spLocks noRot="1" noChangeAspect="1" noMove="1" noResize="1" noEditPoints="1" noAdjustHandles="1" noChangeArrowheads="1" noChangeShapeType="1" noTextEdit="1"/>
+              </p:cNvSpPr>
+              <p:nvPr/>
+            </p:nvSpPr>
+            <p:spPr>
+              <a:xfrm>
+                <a:off x="2309043" y="3316007"/>
+                <a:ext cx="1114408" cy="830997"/>
               </a:xfrm>
               <a:prstGeom prst="rect">
                 <a:avLst/>
@@ -12048,14 +12418,14 @@
           <a:chExt cx="0" cy="0"/>
         </a:xfrm>
       </p:grpSpPr>
-      <mc:AlternateContent xmlns:mc="http://schemas.openxmlformats.org/markup-compatibility/2006" xmlns:a14="http://schemas.microsoft.com/office/drawing/2010/main">
-        <mc:Choice Requires="a14">
+      <mc:AlternateContent xmlns:mc="http://schemas.openxmlformats.org/markup-compatibility/2006">
+        <mc:Choice xmlns:a14="http://schemas.microsoft.com/office/drawing/2010/main" Requires="a14">
           <p:sp>
             <p:nvSpPr>
-              <p:cNvPr id="10" name="Rectangle 9">
+              <p:cNvPr id="8" name="Rectangle 7">
                 <a:extLst>
                   <a:ext uri="{FF2B5EF4-FFF2-40B4-BE49-F238E27FC236}">
-                    <a16:creationId xmlns:a16="http://schemas.microsoft.com/office/drawing/2014/main" id="{9F239877-7C06-BB99-1621-35194AA15DCE}"/>
+                    <a16:creationId xmlns:a16="http://schemas.microsoft.com/office/drawing/2014/main" id="{21653ABA-7CAC-A4E1-B569-FB94394954A8}"/>
                   </a:ext>
                 </a:extLst>
               </p:cNvPr>
@@ -12064,7 +12434,7 @@
             </p:nvSpPr>
             <p:spPr>
               <a:xfrm>
-                <a:off x="4431538" y="2465529"/>
+                <a:off x="6460363" y="2511849"/>
                 <a:ext cx="1213450" cy="1213450"/>
               </a:xfrm>
               <a:prstGeom prst="rect">
@@ -12163,13 +12533,13 @@
             </p:txBody>
           </p:sp>
         </mc:Choice>
-        <mc:Fallback xmlns="">
+        <mc:Fallback>
           <p:sp>
             <p:nvSpPr>
-              <p:cNvPr id="10" name="Rectangle 9">
+              <p:cNvPr id="8" name="Rectangle 7">
                 <a:extLst>
                   <a:ext uri="{FF2B5EF4-FFF2-40B4-BE49-F238E27FC236}">
-                    <a16:creationId xmlns:a16="http://schemas.microsoft.com/office/drawing/2014/main" id="{9F239877-7C06-BB99-1621-35194AA15DCE}"/>
+                    <a16:creationId xmlns:a16="http://schemas.microsoft.com/office/drawing/2014/main" id="{21653ABA-7CAC-A4E1-B569-FB94394954A8}"/>
                   </a:ext>
                 </a:extLst>
               </p:cNvPr>
@@ -12180,7 +12550,7 @@
             </p:nvSpPr>
             <p:spPr>
               <a:xfrm>
-                <a:off x="4431538" y="2465529"/>
+                <a:off x="6460363" y="2511849"/>
                 <a:ext cx="1213450" cy="1213450"/>
               </a:xfrm>
               <a:prstGeom prst="rect">
@@ -12189,7 +12559,7 @@
               <a:blipFill>
                 <a:blip r:embed="rId2"/>
                 <a:stretch>
-                  <a:fillRect l="-472" b="-5634"/>
+                  <a:fillRect l="-472" b="-6132"/>
                 </a:stretch>
               </a:blipFill>
               <a:ln w="76200">
@@ -12223,14 +12593,14 @@
           </p:sp>
         </mc:Fallback>
       </mc:AlternateContent>
-      <mc:AlternateContent xmlns:mc="http://schemas.openxmlformats.org/markup-compatibility/2006" xmlns:a14="http://schemas.microsoft.com/office/drawing/2010/main">
-        <mc:Choice Requires="a14">
+      <mc:AlternateContent xmlns:mc="http://schemas.openxmlformats.org/markup-compatibility/2006">
+        <mc:Choice xmlns:a14="http://schemas.microsoft.com/office/drawing/2010/main" Requires="a14">
           <p:sp>
             <p:nvSpPr>
-              <p:cNvPr id="5" name="Rectangle 4">
+              <p:cNvPr id="9" name="Rectangle 8">
                 <a:extLst>
                   <a:ext uri="{FF2B5EF4-FFF2-40B4-BE49-F238E27FC236}">
-                    <a16:creationId xmlns:a16="http://schemas.microsoft.com/office/drawing/2014/main" id="{27AC2383-6C4D-E861-681E-45BE55EB3CDA}"/>
+                    <a16:creationId xmlns:a16="http://schemas.microsoft.com/office/drawing/2014/main" id="{04FAFA5A-24EE-DDDB-CDBE-ADF2DB15F93C}"/>
                   </a:ext>
                 </a:extLst>
               </p:cNvPr>
@@ -12239,7 +12609,7 @@
             </p:nvSpPr>
             <p:spPr>
               <a:xfrm>
-                <a:off x="1783783" y="2465529"/>
+                <a:off x="3812608" y="2511849"/>
                 <a:ext cx="1213450" cy="1213450"/>
               </a:xfrm>
               <a:prstGeom prst="rect">
@@ -12338,13 +12708,13 @@
             </p:txBody>
           </p:sp>
         </mc:Choice>
-        <mc:Fallback xmlns="">
+        <mc:Fallback>
           <p:sp>
             <p:nvSpPr>
-              <p:cNvPr id="5" name="Rectangle 4">
+              <p:cNvPr id="9" name="Rectangle 8">
                 <a:extLst>
                   <a:ext uri="{FF2B5EF4-FFF2-40B4-BE49-F238E27FC236}">
-                    <a16:creationId xmlns:a16="http://schemas.microsoft.com/office/drawing/2014/main" id="{27AC2383-6C4D-E861-681E-45BE55EB3CDA}"/>
+                    <a16:creationId xmlns:a16="http://schemas.microsoft.com/office/drawing/2014/main" id="{04FAFA5A-24EE-DDDB-CDBE-ADF2DB15F93C}"/>
                   </a:ext>
                 </a:extLst>
               </p:cNvPr>
@@ -12355,7 +12725,7 @@
             </p:nvSpPr>
             <p:spPr>
               <a:xfrm>
-                <a:off x="1783783" y="2465529"/>
+                <a:off x="3812608" y="2511849"/>
                 <a:ext cx="1213450" cy="1213450"/>
               </a:xfrm>
               <a:prstGeom prst="rect">
@@ -12364,7 +12734,7 @@
               <a:blipFill>
                 <a:blip r:embed="rId3"/>
                 <a:stretch>
-                  <a:fillRect l="-472" b="-5634"/>
+                  <a:fillRect b="-6132"/>
                 </a:stretch>
               </a:blipFill>
               <a:ln w="76200">
@@ -12400,6 +12770,58 @@
       </mc:AlternateContent>
       <p:sp>
         <p:nvSpPr>
+          <p:cNvPr id="15" name="Right Brace 14">
+            <a:extLst>
+              <a:ext uri="{FF2B5EF4-FFF2-40B4-BE49-F238E27FC236}">
+                <a16:creationId xmlns:a16="http://schemas.microsoft.com/office/drawing/2014/main" id="{CF3D54C0-3099-BAB4-7A17-B7E607A04931}"/>
+              </a:ext>
+            </a:extLst>
+          </p:cNvPr>
+          <p:cNvSpPr/>
+          <p:nvPr/>
+        </p:nvSpPr>
+        <p:spPr>
+          <a:xfrm rot="16200000">
+            <a:off x="5492866" y="1420695"/>
+            <a:ext cx="500689" cy="1434304"/>
+          </a:xfrm>
+          <a:prstGeom prst="rightBrace">
+            <a:avLst>
+              <a:gd name="adj1" fmla="val 57925"/>
+              <a:gd name="adj2" fmla="val 50000"/>
+            </a:avLst>
+          </a:prstGeom>
+          <a:ln w="76200">
+            <a:solidFill>
+              <a:schemeClr val="tx1"/>
+            </a:solidFill>
+          </a:ln>
+        </p:spPr>
+        <p:style>
+          <a:lnRef idx="1">
+            <a:schemeClr val="accent1"/>
+          </a:lnRef>
+          <a:fillRef idx="0">
+            <a:schemeClr val="accent1"/>
+          </a:fillRef>
+          <a:effectRef idx="0">
+            <a:schemeClr val="accent1"/>
+          </a:effectRef>
+          <a:fontRef idx="minor">
+            <a:schemeClr val="tx1"/>
+          </a:fontRef>
+        </p:style>
+        <p:txBody>
+          <a:bodyPr rtlCol="0" anchor="ctr"/>
+          <a:lstStyle/>
+          <a:p>
+            <a:pPr algn="ctr"/>
+            <a:endParaRPr lang="en-DK"/>
+          </a:p>
+        </p:txBody>
+      </p:sp>
+      <p:sp>
+        <p:nvSpPr>
           <p:cNvPr id="6" name="Rectangle 5">
             <a:extLst>
               <a:ext uri="{FF2B5EF4-FFF2-40B4-BE49-F238E27FC236}">
@@ -12412,8 +12834,8 @@
         </p:nvSpPr>
         <p:spPr>
           <a:xfrm>
-            <a:off x="6096000" y="2465529"/>
-            <a:ext cx="4926576" cy="1213450"/>
+            <a:off x="8105775" y="4217616"/>
+            <a:ext cx="3426153" cy="1213450"/>
           </a:xfrm>
           <a:prstGeom prst="rect">
             <a:avLst/>
@@ -12474,10 +12896,10 @@
       </p:sp>
       <p:cxnSp>
         <p:nvCxnSpPr>
-          <p:cNvPr id="4" name="Straight Connector 3">
+          <p:cNvPr id="3" name="Straight Connector 2">
             <a:extLst>
               <a:ext uri="{FF2B5EF4-FFF2-40B4-BE49-F238E27FC236}">
-                <a16:creationId xmlns:a16="http://schemas.microsoft.com/office/drawing/2014/main" id="{C4DA9E31-4BEE-8866-CA5F-E9AE4B73D6B6}"/>
+                <a16:creationId xmlns:a16="http://schemas.microsoft.com/office/drawing/2014/main" id="{CA021BD1-0D32-1182-6D37-16374E0B5D55}"/>
               </a:ext>
             </a:extLst>
           </p:cNvPr>
@@ -12488,8 +12910,8 @@
         </p:nvCxnSpPr>
         <p:spPr>
           <a:xfrm>
-            <a:off x="1529123" y="3678979"/>
-            <a:ext cx="10231556" cy="0"/>
+            <a:off x="3711461" y="5431066"/>
+            <a:ext cx="7929922" cy="0"/>
           </a:xfrm>
           <a:prstGeom prst="line">
             <a:avLst/>
@@ -12515,14 +12937,129 @@
           </a:fontRef>
         </p:style>
       </p:cxnSp>
-      <mc:AlternateContent xmlns:mc="http://schemas.openxmlformats.org/markup-compatibility/2006" xmlns:a14="http://schemas.microsoft.com/office/drawing/2010/main">
-        <mc:Choice Requires="a14">
+      <p:cxnSp>
+        <p:nvCxnSpPr>
+          <p:cNvPr id="4" name="Straight Connector 3">
+            <a:extLst>
+              <a:ext uri="{FF2B5EF4-FFF2-40B4-BE49-F238E27FC236}">
+                <a16:creationId xmlns:a16="http://schemas.microsoft.com/office/drawing/2014/main" id="{C4DA9E31-4BEE-8866-CA5F-E9AE4B73D6B6}"/>
+              </a:ext>
+            </a:extLst>
+          </p:cNvPr>
+          <p:cNvCxnSpPr>
+            <a:cxnSpLocks/>
+          </p:cNvCxnSpPr>
+          <p:nvPr/>
+        </p:nvCxnSpPr>
+        <p:spPr>
+          <a:xfrm>
+            <a:off x="3711461" y="3739426"/>
+            <a:ext cx="7929922" cy="0"/>
+          </a:xfrm>
+          <a:prstGeom prst="line">
+            <a:avLst/>
+          </a:prstGeom>
+          <a:ln w="76200">
+            <a:solidFill>
+              <a:schemeClr val="tx1"/>
+            </a:solidFill>
+          </a:ln>
+        </p:spPr>
+        <p:style>
+          <a:lnRef idx="1">
+            <a:schemeClr val="accent1"/>
+          </a:lnRef>
+          <a:fillRef idx="0">
+            <a:schemeClr val="accent1"/>
+          </a:fillRef>
+          <a:effectRef idx="0">
+            <a:schemeClr val="accent1"/>
+          </a:effectRef>
+          <a:fontRef idx="minor">
+            <a:schemeClr val="tx1"/>
+          </a:fontRef>
+        </p:style>
+      </p:cxnSp>
+      <p:sp>
+        <p:nvSpPr>
+          <p:cNvPr id="5" name="TextBox 4">
+            <a:extLst>
+              <a:ext uri="{FF2B5EF4-FFF2-40B4-BE49-F238E27FC236}">
+                <a16:creationId xmlns:a16="http://schemas.microsoft.com/office/drawing/2014/main" id="{36F7574C-8A1C-01B9-EC8F-B382C22EEE6D}"/>
+              </a:ext>
+            </a:extLst>
+          </p:cNvPr>
+          <p:cNvSpPr txBox="1"/>
+          <p:nvPr/>
+        </p:nvSpPr>
+        <p:spPr>
+          <a:xfrm>
+            <a:off x="400690" y="3373690"/>
+            <a:ext cx="1657826" cy="830997"/>
+          </a:xfrm>
+          <a:prstGeom prst="rect">
+            <a:avLst/>
+          </a:prstGeom>
+          <a:noFill/>
+        </p:spPr>
+        <p:txBody>
+          <a:bodyPr wrap="none" rtlCol="0">
+            <a:spAutoFit/>
+          </a:bodyPr>
+          <a:lstStyle/>
+          <a:p>
+            <a:r>
+              <a:rPr lang="en-US" sz="4800" dirty="0"/>
+              <a:t>Qubit</a:t>
+            </a:r>
+            <a:endParaRPr lang="en-DK" sz="4800" dirty="0"/>
+          </a:p>
+        </p:txBody>
+      </p:sp>
+      <p:sp>
+        <p:nvSpPr>
+          <p:cNvPr id="12" name="TextBox 11">
+            <a:extLst>
+              <a:ext uri="{FF2B5EF4-FFF2-40B4-BE49-F238E27FC236}">
+                <a16:creationId xmlns:a16="http://schemas.microsoft.com/office/drawing/2014/main" id="{70EB4BAE-AC17-C333-A926-02A015BC6D4A}"/>
+              </a:ext>
+            </a:extLst>
+          </p:cNvPr>
+          <p:cNvSpPr txBox="1"/>
+          <p:nvPr/>
+        </p:nvSpPr>
+        <p:spPr>
+          <a:xfrm>
+            <a:off x="395058" y="5015567"/>
+            <a:ext cx="3028393" cy="830997"/>
+          </a:xfrm>
+          <a:prstGeom prst="rect">
+            <a:avLst/>
+          </a:prstGeom>
+          <a:noFill/>
+        </p:spPr>
+        <p:txBody>
+          <a:bodyPr wrap="none" rtlCol="0">
+            <a:spAutoFit/>
+          </a:bodyPr>
+          <a:lstStyle/>
+          <a:p>
+            <a:r>
+              <a:rPr lang="en-US" sz="4800" dirty="0"/>
+              <a:t>Resonator</a:t>
+            </a:r>
+            <a:endParaRPr lang="en-DK" sz="4800" dirty="0"/>
+          </a:p>
+        </p:txBody>
+      </p:sp>
+      <mc:AlternateContent xmlns:mc="http://schemas.openxmlformats.org/markup-compatibility/2006">
+        <mc:Choice xmlns:a14="http://schemas.microsoft.com/office/drawing/2010/main" Requires="a14">
           <p:sp>
             <p:nvSpPr>
-              <p:cNvPr id="2" name="TextBox 1">
+              <p:cNvPr id="14" name="TextBox 13">
                 <a:extLst>
                   <a:ext uri="{FF2B5EF4-FFF2-40B4-BE49-F238E27FC236}">
-                    <a16:creationId xmlns:a16="http://schemas.microsoft.com/office/drawing/2014/main" id="{6D99F296-36DB-FD9B-7DFE-DE3F6F8CD24D}"/>
+                    <a16:creationId xmlns:a16="http://schemas.microsoft.com/office/drawing/2014/main" id="{6ACD28DD-E622-4C66-7DE4-C5C94AF68EFF}"/>
                   </a:ext>
                 </a:extLst>
               </p:cNvPr>
@@ -12531,8 +13068,8 @@
             </p:nvSpPr>
             <p:spPr>
               <a:xfrm>
-                <a:off x="460076" y="3179021"/>
-                <a:ext cx="1141659" cy="830997"/>
+                <a:off x="2309043" y="3316007"/>
+                <a:ext cx="1114408" cy="830997"/>
               </a:xfrm>
               <a:prstGeom prst="rect">
                 <a:avLst/>
@@ -12553,38 +13090,26 @@
                     </m:oMathParaPr>
                     <m:oMath xmlns:m="http://schemas.openxmlformats.org/officeDocument/2006/math">
                       <m:r>
-                        <a:rPr lang="en-US" sz="4800" b="1" i="1" smtClean="0">
+                        <a:rPr lang="en-US" sz="4800" b="0" i="1" smtClean="0">
                           <a:latin typeface="Cambria Math" panose="02040503050406030204" pitchFamily="18" charset="0"/>
                         </a:rPr>
-                        <m:t>|</m:t>
-                      </m:r>
-                      <m:r>
-                        <a:rPr lang="en-US" sz="4800" b="1" i="1" smtClean="0">
-                          <a:latin typeface="Cambria Math" panose="02040503050406030204" pitchFamily="18" charset="0"/>
-                        </a:rPr>
-                        <m:t>𝟎</m:t>
-                      </m:r>
-                      <m:r>
-                        <a:rPr lang="en-US" sz="4800" b="1" i="1" smtClean="0">
-                          <a:latin typeface="Cambria Math" panose="02040503050406030204" pitchFamily="18" charset="0"/>
-                        </a:rPr>
-                        <m:t>⟩</m:t>
+                        <m:t>|0⟩</m:t>
                       </m:r>
                     </m:oMath>
                   </m:oMathPara>
                 </a14:m>
-                <a:endParaRPr lang="en-DK" sz="4800" b="1" dirty="0"/>
+                <a:endParaRPr lang="en-DK" sz="4800" dirty="0"/>
               </a:p>
             </p:txBody>
           </p:sp>
         </mc:Choice>
-        <mc:Fallback xmlns="">
+        <mc:Fallback>
           <p:sp>
             <p:nvSpPr>
-              <p:cNvPr id="2" name="TextBox 1">
+              <p:cNvPr id="14" name="TextBox 13">
                 <a:extLst>
                   <a:ext uri="{FF2B5EF4-FFF2-40B4-BE49-F238E27FC236}">
-                    <a16:creationId xmlns:a16="http://schemas.microsoft.com/office/drawing/2014/main" id="{6D99F296-36DB-FD9B-7DFE-DE3F6F8CD24D}"/>
+                    <a16:creationId xmlns:a16="http://schemas.microsoft.com/office/drawing/2014/main" id="{6ACD28DD-E622-4C66-7DE4-C5C94AF68EFF}"/>
                   </a:ext>
                 </a:extLst>
               </p:cNvPr>
@@ -12595,8 +13120,8 @@
             </p:nvSpPr>
             <p:spPr>
               <a:xfrm>
-                <a:off x="460076" y="3179021"/>
-                <a:ext cx="1141659" cy="830997"/>
+                <a:off x="2309043" y="3316007"/>
+                <a:ext cx="1114408" cy="830997"/>
               </a:xfrm>
               <a:prstGeom prst="rect">
                 <a:avLst/>
@@ -12623,66 +13148,14 @@
           </p:sp>
         </mc:Fallback>
       </mc:AlternateContent>
-      <p:sp>
-        <p:nvSpPr>
-          <p:cNvPr id="7" name="Right Brace 6">
-            <a:extLst>
-              <a:ext uri="{FF2B5EF4-FFF2-40B4-BE49-F238E27FC236}">
-                <a16:creationId xmlns:a16="http://schemas.microsoft.com/office/drawing/2014/main" id="{7FDD997D-EB34-044A-DED7-928C9AAE0EA4}"/>
-              </a:ext>
-            </a:extLst>
-          </p:cNvPr>
-          <p:cNvSpPr/>
-          <p:nvPr/>
-        </p:nvSpPr>
-        <p:spPr>
-          <a:xfrm rot="16200000">
-            <a:off x="3464041" y="1374375"/>
-            <a:ext cx="500689" cy="1434304"/>
-          </a:xfrm>
-          <a:prstGeom prst="rightBrace">
-            <a:avLst>
-              <a:gd name="adj1" fmla="val 57925"/>
-              <a:gd name="adj2" fmla="val 50000"/>
-            </a:avLst>
-          </a:prstGeom>
-          <a:ln w="76200">
-            <a:solidFill>
-              <a:schemeClr val="tx1"/>
-            </a:solidFill>
-          </a:ln>
-        </p:spPr>
-        <p:style>
-          <a:lnRef idx="1">
-            <a:schemeClr val="accent1"/>
-          </a:lnRef>
-          <a:fillRef idx="0">
-            <a:schemeClr val="accent1"/>
-          </a:fillRef>
-          <a:effectRef idx="0">
-            <a:schemeClr val="accent1"/>
-          </a:effectRef>
-          <a:fontRef idx="minor">
-            <a:schemeClr val="tx1"/>
-          </a:fontRef>
-        </p:style>
-        <p:txBody>
-          <a:bodyPr rtlCol="0" anchor="ctr"/>
-          <a:lstStyle/>
-          <a:p>
-            <a:pPr algn="ctr"/>
-            <a:endParaRPr lang="en-DK"/>
-          </a:p>
-        </p:txBody>
-      </p:sp>
-      <mc:AlternateContent xmlns:mc="http://schemas.openxmlformats.org/markup-compatibility/2006" xmlns:a14="http://schemas.microsoft.com/office/drawing/2010/main">
-        <mc:Choice Requires="a14">
+      <mc:AlternateContent xmlns:mc="http://schemas.openxmlformats.org/markup-compatibility/2006">
+        <mc:Choice xmlns:a14="http://schemas.microsoft.com/office/drawing/2010/main" Requires="a14">
           <p:sp>
             <p:nvSpPr>
-              <p:cNvPr id="8" name="TextBox 7">
+              <p:cNvPr id="16" name="TextBox 15">
                 <a:extLst>
                   <a:ext uri="{FF2B5EF4-FFF2-40B4-BE49-F238E27FC236}">
-                    <a16:creationId xmlns:a16="http://schemas.microsoft.com/office/drawing/2014/main" id="{3754AAF7-FA55-D6CC-9FB7-C6E8177E1028}"/>
+                    <a16:creationId xmlns:a16="http://schemas.microsoft.com/office/drawing/2014/main" id="{8D8CB28F-B2E2-40B7-0A75-524BA8D8CACF}"/>
                   </a:ext>
                 </a:extLst>
               </p:cNvPr>
@@ -12691,7 +13164,7 @@
             </p:nvSpPr>
             <p:spPr>
               <a:xfrm>
-                <a:off x="2899963" y="886528"/>
+                <a:off x="4928788" y="932848"/>
                 <a:ext cx="1628844" cy="830997"/>
               </a:xfrm>
               <a:prstGeom prst="rect">
@@ -12745,13 +13218,13 @@
             </p:txBody>
           </p:sp>
         </mc:Choice>
-        <mc:Fallback xmlns="">
+        <mc:Fallback>
           <p:sp>
             <p:nvSpPr>
-              <p:cNvPr id="8" name="TextBox 7">
+              <p:cNvPr id="16" name="TextBox 15">
                 <a:extLst>
                   <a:ext uri="{FF2B5EF4-FFF2-40B4-BE49-F238E27FC236}">
-                    <a16:creationId xmlns:a16="http://schemas.microsoft.com/office/drawing/2014/main" id="{3754AAF7-FA55-D6CC-9FB7-C6E8177E1028}"/>
+                    <a16:creationId xmlns:a16="http://schemas.microsoft.com/office/drawing/2014/main" id="{8D8CB28F-B2E2-40B7-0A75-524BA8D8CACF}"/>
                   </a:ext>
                 </a:extLst>
               </p:cNvPr>
@@ -12762,7 +13235,7 @@
             </p:nvSpPr>
             <p:spPr>
               <a:xfrm>
-                <a:off x="2899963" y="886528"/>
+                <a:off x="4928788" y="932848"/>
                 <a:ext cx="1628844" cy="830997"/>
               </a:xfrm>
               <a:prstGeom prst="rect">
@@ -12793,7 +13266,7 @@
     </p:spTree>
     <p:extLst>
       <p:ext uri="{BB962C8B-B14F-4D97-AF65-F5344CB8AC3E}">
-        <p14:creationId xmlns:p14="http://schemas.microsoft.com/office/powerpoint/2010/main" val="4097513252"/>
+        <p14:creationId xmlns:p14="http://schemas.microsoft.com/office/powerpoint/2010/main" val="2174260723"/>
       </p:ext>
     </p:extLst>
   </p:cSld>
@@ -14064,10 +14537,10 @@
       </p:grpSpPr>
       <p:sp>
         <p:nvSpPr>
-          <p:cNvPr id="3" name="Rectangle 2">
+          <p:cNvPr id="7" name="Rectangle 6">
             <a:extLst>
               <a:ext uri="{FF2B5EF4-FFF2-40B4-BE49-F238E27FC236}">
-                <a16:creationId xmlns:a16="http://schemas.microsoft.com/office/drawing/2014/main" id="{E0C39E51-6475-D048-63B7-ED279A217F3D}"/>
+                <a16:creationId xmlns:a16="http://schemas.microsoft.com/office/drawing/2014/main" id="{3441FB18-FFCA-EEC5-406F-C47F60C7081A}"/>
               </a:ext>
             </a:extLst>
           </p:cNvPr>
@@ -14076,7 +14549,7 @@
         </p:nvSpPr>
         <p:spPr>
           <a:xfrm>
-            <a:off x="1869057" y="3683105"/>
+            <a:off x="3840732" y="4217616"/>
             <a:ext cx="4081020" cy="1213450"/>
           </a:xfrm>
           <a:prstGeom prst="rect">
@@ -14138,10 +14611,10 @@
       </p:sp>
       <p:sp>
         <p:nvSpPr>
-          <p:cNvPr id="5" name="Rectangle 4">
+          <p:cNvPr id="11" name="Rectangle 10">
             <a:extLst>
               <a:ext uri="{FF2B5EF4-FFF2-40B4-BE49-F238E27FC236}">
-                <a16:creationId xmlns:a16="http://schemas.microsoft.com/office/drawing/2014/main" id="{27AC2383-6C4D-E861-681E-45BE55EB3CDA}"/>
+                <a16:creationId xmlns:a16="http://schemas.microsoft.com/office/drawing/2014/main" id="{F3B2A22A-ACAB-EFFA-52F8-CA548FC2030E}"/>
               </a:ext>
             </a:extLst>
           </p:cNvPr>
@@ -14150,72 +14623,7 @@
         </p:nvSpPr>
         <p:spPr>
           <a:xfrm>
-            <a:off x="4736627" y="2467593"/>
-            <a:ext cx="1213450" cy="1213450"/>
-          </a:xfrm>
-          <a:prstGeom prst="rect">
-            <a:avLst/>
-          </a:prstGeom>
-          <a:noFill/>
-          <a:ln w="76200">
-            <a:solidFill>
-              <a:schemeClr val="accent1"/>
-            </a:solidFill>
-            <a:prstDash val="solid"/>
-          </a:ln>
-        </p:spPr>
-        <p:style>
-          <a:lnRef idx="2">
-            <a:schemeClr val="accent1">
-              <a:shade val="15000"/>
-            </a:schemeClr>
-          </a:lnRef>
-          <a:fillRef idx="1">
-            <a:schemeClr val="accent1"/>
-          </a:fillRef>
-          <a:effectRef idx="0">
-            <a:schemeClr val="accent1"/>
-          </a:effectRef>
-          <a:fontRef idx="minor">
-            <a:schemeClr val="lt1"/>
-          </a:fontRef>
-        </p:style>
-        <p:txBody>
-          <a:bodyPr rtlCol="0" anchor="ctr"/>
-          <a:lstStyle/>
-          <a:p>
-            <a:pPr algn="ctr"/>
-            <a:r>
-              <a:rPr lang="en-US" sz="4800" b="1" dirty="0">
-                <a:solidFill>
-                  <a:schemeClr val="tx1"/>
-                </a:solidFill>
-              </a:rPr>
-              <a:t>X</a:t>
-            </a:r>
-            <a:endParaRPr lang="en-DK" sz="4800" b="1" dirty="0">
-              <a:solidFill>
-                <a:schemeClr val="tx1"/>
-              </a:solidFill>
-            </a:endParaRPr>
-          </a:p>
-        </p:txBody>
-      </p:sp>
-      <p:sp>
-        <p:nvSpPr>
-          <p:cNvPr id="6" name="Rectangle 5">
-            <a:extLst>
-              <a:ext uri="{FF2B5EF4-FFF2-40B4-BE49-F238E27FC236}">
-                <a16:creationId xmlns:a16="http://schemas.microsoft.com/office/drawing/2014/main" id="{D9C95B52-2144-BCB7-B719-A4282C7626B6}"/>
-              </a:ext>
-            </a:extLst>
-          </p:cNvPr>
-          <p:cNvSpPr/>
-          <p:nvPr/>
-        </p:nvSpPr>
-        <p:spPr>
-          <a:xfrm>
-            <a:off x="6314534" y="3683105"/>
+            <a:off x="8314784" y="4217616"/>
             <a:ext cx="3101643" cy="1213450"/>
           </a:xfrm>
           <a:prstGeom prst="rect">
@@ -14275,12 +14683,77 @@
           </a:p>
         </p:txBody>
       </p:sp>
+      <p:sp>
+        <p:nvSpPr>
+          <p:cNvPr id="2" name="Rectangle 1">
+            <a:extLst>
+              <a:ext uri="{FF2B5EF4-FFF2-40B4-BE49-F238E27FC236}">
+                <a16:creationId xmlns:a16="http://schemas.microsoft.com/office/drawing/2014/main" id="{CA489DA5-A4AD-814A-42FC-372DF3CCF599}"/>
+              </a:ext>
+            </a:extLst>
+          </p:cNvPr>
+          <p:cNvSpPr/>
+          <p:nvPr/>
+        </p:nvSpPr>
+        <p:spPr>
+          <a:xfrm>
+            <a:off x="6708302" y="2449901"/>
+            <a:ext cx="1213450" cy="1213450"/>
+          </a:xfrm>
+          <a:prstGeom prst="rect">
+            <a:avLst/>
+          </a:prstGeom>
+          <a:noFill/>
+          <a:ln w="76200">
+            <a:solidFill>
+              <a:schemeClr val="accent1"/>
+            </a:solidFill>
+            <a:prstDash val="solid"/>
+          </a:ln>
+        </p:spPr>
+        <p:style>
+          <a:lnRef idx="2">
+            <a:schemeClr val="accent1">
+              <a:shade val="15000"/>
+            </a:schemeClr>
+          </a:lnRef>
+          <a:fillRef idx="1">
+            <a:schemeClr val="accent1"/>
+          </a:fillRef>
+          <a:effectRef idx="0">
+            <a:schemeClr val="accent1"/>
+          </a:effectRef>
+          <a:fontRef idx="minor">
+            <a:schemeClr val="lt1"/>
+          </a:fontRef>
+        </p:style>
+        <p:txBody>
+          <a:bodyPr rtlCol="0" anchor="ctr"/>
+          <a:lstStyle/>
+          <a:p>
+            <a:pPr algn="ctr"/>
+            <a:r>
+              <a:rPr lang="en-US" sz="4800" b="1" dirty="0">
+                <a:solidFill>
+                  <a:schemeClr val="tx1"/>
+                </a:solidFill>
+              </a:rPr>
+              <a:t>X</a:t>
+            </a:r>
+            <a:endParaRPr lang="en-DK" sz="4800" b="1" dirty="0">
+              <a:solidFill>
+                <a:schemeClr val="tx1"/>
+              </a:solidFill>
+            </a:endParaRPr>
+          </a:p>
+        </p:txBody>
+      </p:sp>
       <p:cxnSp>
         <p:nvCxnSpPr>
-          <p:cNvPr id="4" name="Straight Connector 3">
+          <p:cNvPr id="3" name="Straight Connector 2">
             <a:extLst>
               <a:ext uri="{FF2B5EF4-FFF2-40B4-BE49-F238E27FC236}">
-                <a16:creationId xmlns:a16="http://schemas.microsoft.com/office/drawing/2014/main" id="{C4DA9E31-4BEE-8866-CA5F-E9AE4B73D6B6}"/>
+                <a16:creationId xmlns:a16="http://schemas.microsoft.com/office/drawing/2014/main" id="{CA021BD1-0D32-1182-6D37-16374E0B5D55}"/>
               </a:ext>
             </a:extLst>
           </p:cNvPr>
@@ -14291,7 +14764,7 @@
         </p:nvCxnSpPr>
         <p:spPr>
           <a:xfrm>
-            <a:off x="1529123" y="3678979"/>
+            <a:off x="3614554" y="5431066"/>
             <a:ext cx="7929922" cy="0"/>
           </a:xfrm>
           <a:prstGeom prst="line">
@@ -14318,14 +14791,129 @@
           </a:fontRef>
         </p:style>
       </p:cxnSp>
-      <mc:AlternateContent xmlns:mc="http://schemas.openxmlformats.org/markup-compatibility/2006" xmlns:a14="http://schemas.microsoft.com/office/drawing/2010/main">
-        <mc:Choice Requires="a14">
+      <p:cxnSp>
+        <p:nvCxnSpPr>
+          <p:cNvPr id="4" name="Straight Connector 3">
+            <a:extLst>
+              <a:ext uri="{FF2B5EF4-FFF2-40B4-BE49-F238E27FC236}">
+                <a16:creationId xmlns:a16="http://schemas.microsoft.com/office/drawing/2014/main" id="{C4DA9E31-4BEE-8866-CA5F-E9AE4B73D6B6}"/>
+              </a:ext>
+            </a:extLst>
+          </p:cNvPr>
+          <p:cNvCxnSpPr>
+            <a:cxnSpLocks/>
+          </p:cNvCxnSpPr>
+          <p:nvPr/>
+        </p:nvCxnSpPr>
+        <p:spPr>
+          <a:xfrm>
+            <a:off x="3624079" y="3672751"/>
+            <a:ext cx="7929922" cy="0"/>
+          </a:xfrm>
+          <a:prstGeom prst="line">
+            <a:avLst/>
+          </a:prstGeom>
+          <a:ln w="76200">
+            <a:solidFill>
+              <a:schemeClr val="tx1"/>
+            </a:solidFill>
+          </a:ln>
+        </p:spPr>
+        <p:style>
+          <a:lnRef idx="1">
+            <a:schemeClr val="accent1"/>
+          </a:lnRef>
+          <a:fillRef idx="0">
+            <a:schemeClr val="accent1"/>
+          </a:fillRef>
+          <a:effectRef idx="0">
+            <a:schemeClr val="accent1"/>
+          </a:effectRef>
+          <a:fontRef idx="minor">
+            <a:schemeClr val="tx1"/>
+          </a:fontRef>
+        </p:style>
+      </p:cxnSp>
+      <p:sp>
+        <p:nvSpPr>
+          <p:cNvPr id="8" name="TextBox 7">
+            <a:extLst>
+              <a:ext uri="{FF2B5EF4-FFF2-40B4-BE49-F238E27FC236}">
+                <a16:creationId xmlns:a16="http://schemas.microsoft.com/office/drawing/2014/main" id="{EAFD8482-E56C-7FEB-6A6E-D58D3EED0B0C}"/>
+              </a:ext>
+            </a:extLst>
+          </p:cNvPr>
+          <p:cNvSpPr txBox="1"/>
+          <p:nvPr/>
+        </p:nvSpPr>
+        <p:spPr>
+          <a:xfrm>
+            <a:off x="351188" y="3305536"/>
+            <a:ext cx="1657826" cy="830997"/>
+          </a:xfrm>
+          <a:prstGeom prst="rect">
+            <a:avLst/>
+          </a:prstGeom>
+          <a:noFill/>
+        </p:spPr>
+        <p:txBody>
+          <a:bodyPr wrap="none" rtlCol="0">
+            <a:spAutoFit/>
+          </a:bodyPr>
+          <a:lstStyle/>
+          <a:p>
+            <a:r>
+              <a:rPr lang="en-US" sz="4800" dirty="0"/>
+              <a:t>Qubit</a:t>
+            </a:r>
+            <a:endParaRPr lang="en-DK" sz="4800" dirty="0"/>
+          </a:p>
+        </p:txBody>
+      </p:sp>
+      <p:sp>
+        <p:nvSpPr>
+          <p:cNvPr id="9" name="TextBox 8">
+            <a:extLst>
+              <a:ext uri="{FF2B5EF4-FFF2-40B4-BE49-F238E27FC236}">
+                <a16:creationId xmlns:a16="http://schemas.microsoft.com/office/drawing/2014/main" id="{53E21F6C-0702-D6A4-865B-77F276CABB89}"/>
+              </a:ext>
+            </a:extLst>
+          </p:cNvPr>
+          <p:cNvSpPr txBox="1"/>
+          <p:nvPr/>
+        </p:nvSpPr>
+        <p:spPr>
+          <a:xfrm>
+            <a:off x="345556" y="4947413"/>
+            <a:ext cx="3028393" cy="830997"/>
+          </a:xfrm>
+          <a:prstGeom prst="rect">
+            <a:avLst/>
+          </a:prstGeom>
+          <a:noFill/>
+        </p:spPr>
+        <p:txBody>
+          <a:bodyPr wrap="none" rtlCol="0">
+            <a:spAutoFit/>
+          </a:bodyPr>
+          <a:lstStyle/>
+          <a:p>
+            <a:r>
+              <a:rPr lang="en-US" sz="4800" dirty="0"/>
+              <a:t>Resonator</a:t>
+            </a:r>
+            <a:endParaRPr lang="en-DK" sz="4800" dirty="0"/>
+          </a:p>
+        </p:txBody>
+      </p:sp>
+      <mc:AlternateContent xmlns:mc="http://schemas.openxmlformats.org/markup-compatibility/2006">
+        <mc:Choice xmlns:a14="http://schemas.microsoft.com/office/drawing/2010/main" Requires="a14">
           <p:sp>
             <p:nvSpPr>
-              <p:cNvPr id="2" name="TextBox 1">
+              <p:cNvPr id="10" name="TextBox 9">
                 <a:extLst>
                   <a:ext uri="{FF2B5EF4-FFF2-40B4-BE49-F238E27FC236}">
-                    <a16:creationId xmlns:a16="http://schemas.microsoft.com/office/drawing/2014/main" id="{6D99F296-36DB-FD9B-7DFE-DE3F6F8CD24D}"/>
+                    <a16:creationId xmlns:a16="http://schemas.microsoft.com/office/drawing/2014/main" id="{CD70FD5E-DE0E-7DE6-4F82-5F3776A580BC}"/>
                   </a:ext>
                 </a:extLst>
               </p:cNvPr>
@@ -14334,8 +14922,8 @@
             </p:nvSpPr>
             <p:spPr>
               <a:xfrm>
-                <a:off x="460076" y="3179021"/>
-                <a:ext cx="1141658" cy="830997"/>
+                <a:off x="2259541" y="3247853"/>
+                <a:ext cx="1114408" cy="830997"/>
               </a:xfrm>
               <a:prstGeom prst="rect">
                 <a:avLst/>
@@ -14356,38 +14944,26 @@
                     </m:oMathParaPr>
                     <m:oMath xmlns:m="http://schemas.openxmlformats.org/officeDocument/2006/math">
                       <m:r>
-                        <a:rPr lang="en-US" sz="4800" b="1" i="1" smtClean="0">
+                        <a:rPr lang="en-US" sz="4800" b="0" i="1" smtClean="0">
                           <a:latin typeface="Cambria Math" panose="02040503050406030204" pitchFamily="18" charset="0"/>
                         </a:rPr>
-                        <m:t>|</m:t>
-                      </m:r>
-                      <m:r>
-                        <a:rPr lang="en-US" sz="4800" b="1" i="1" smtClean="0">
-                          <a:latin typeface="Cambria Math" panose="02040503050406030204" pitchFamily="18" charset="0"/>
-                        </a:rPr>
-                        <m:t>𝟎</m:t>
-                      </m:r>
-                      <m:r>
-                        <a:rPr lang="en-US" sz="4800" b="1" i="1" smtClean="0">
-                          <a:latin typeface="Cambria Math" panose="02040503050406030204" pitchFamily="18" charset="0"/>
-                        </a:rPr>
-                        <m:t>⟩</m:t>
+                        <m:t>|0⟩</m:t>
                       </m:r>
                     </m:oMath>
                   </m:oMathPara>
                 </a14:m>
-                <a:endParaRPr lang="en-DK" sz="4800" b="1" dirty="0"/>
+                <a:endParaRPr lang="en-DK" sz="4800" dirty="0"/>
               </a:p>
             </p:txBody>
           </p:sp>
         </mc:Choice>
-        <mc:Fallback xmlns="">
+        <mc:Fallback>
           <p:sp>
             <p:nvSpPr>
-              <p:cNvPr id="2" name="TextBox 1">
+              <p:cNvPr id="10" name="TextBox 9">
                 <a:extLst>
                   <a:ext uri="{FF2B5EF4-FFF2-40B4-BE49-F238E27FC236}">
-                    <a16:creationId xmlns:a16="http://schemas.microsoft.com/office/drawing/2014/main" id="{6D99F296-36DB-FD9B-7DFE-DE3F6F8CD24D}"/>
+                    <a16:creationId xmlns:a16="http://schemas.microsoft.com/office/drawing/2014/main" id="{CD70FD5E-DE0E-7DE6-4F82-5F3776A580BC}"/>
                   </a:ext>
                 </a:extLst>
               </p:cNvPr>
@@ -14398,8 +14974,8 @@
             </p:nvSpPr>
             <p:spPr>
               <a:xfrm>
-                <a:off x="460076" y="3179021"/>
-                <a:ext cx="1141658" cy="830997"/>
+                <a:off x="2259541" y="3247853"/>
+                <a:ext cx="1114408" cy="830997"/>
               </a:xfrm>
               <a:prstGeom prst="rect">
                 <a:avLst/>
@@ -14429,7 +15005,7 @@
     </p:spTree>
     <p:extLst>
       <p:ext uri="{BB962C8B-B14F-4D97-AF65-F5344CB8AC3E}">
-        <p14:creationId xmlns:p14="http://schemas.microsoft.com/office/powerpoint/2010/main" val="4128625708"/>
+        <p14:creationId xmlns:p14="http://schemas.microsoft.com/office/powerpoint/2010/main" val="1306240863"/>
       </p:ext>
     </p:extLst>
   </p:cSld>
@@ -14468,14 +15044,297 @@
           <a:chExt cx="0" cy="0"/>
         </a:xfrm>
       </p:grpSpPr>
-      <mc:AlternateContent xmlns:mc="http://schemas.openxmlformats.org/markup-compatibility/2006" xmlns:a14="http://schemas.microsoft.com/office/drawing/2010/main">
-        <mc:Choice Requires="a14">
+      <p:cxnSp>
+        <p:nvCxnSpPr>
+          <p:cNvPr id="22" name="Straight Connector 21">
+            <a:extLst>
+              <a:ext uri="{FF2B5EF4-FFF2-40B4-BE49-F238E27FC236}">
+                <a16:creationId xmlns:a16="http://schemas.microsoft.com/office/drawing/2014/main" id="{A3D7D116-D705-26EC-9A30-D5239C20CF15}"/>
+              </a:ext>
+            </a:extLst>
+          </p:cNvPr>
+          <p:cNvCxnSpPr/>
+          <p:nvPr/>
+        </p:nvCxnSpPr>
+        <p:spPr>
+          <a:xfrm flipV="1">
+            <a:off x="9007344" y="2857515"/>
+            <a:ext cx="0" cy="2298365"/>
+          </a:xfrm>
+          <a:prstGeom prst="line">
+            <a:avLst/>
+          </a:prstGeom>
+          <a:ln w="76200">
+            <a:solidFill>
+              <a:schemeClr val="tx1">
+                <a:lumMod val="50000"/>
+                <a:lumOff val="50000"/>
+              </a:schemeClr>
+            </a:solidFill>
+            <a:prstDash val="sysDot"/>
+          </a:ln>
+        </p:spPr>
+        <p:style>
+          <a:lnRef idx="1">
+            <a:schemeClr val="accent1"/>
+          </a:lnRef>
+          <a:fillRef idx="0">
+            <a:schemeClr val="accent1"/>
+          </a:fillRef>
+          <a:effectRef idx="0">
+            <a:schemeClr val="accent1"/>
+          </a:effectRef>
+          <a:fontRef idx="minor">
+            <a:schemeClr val="tx1"/>
+          </a:fontRef>
+        </p:style>
+      </p:cxnSp>
+      <p:cxnSp>
+        <p:nvCxnSpPr>
+          <p:cNvPr id="21" name="Straight Connector 20">
+            <a:extLst>
+              <a:ext uri="{FF2B5EF4-FFF2-40B4-BE49-F238E27FC236}">
+                <a16:creationId xmlns:a16="http://schemas.microsoft.com/office/drawing/2014/main" id="{A21B8F96-82EF-A392-4A3A-BB2B7E45ED29}"/>
+              </a:ext>
+            </a:extLst>
+          </p:cNvPr>
+          <p:cNvCxnSpPr/>
+          <p:nvPr/>
+        </p:nvCxnSpPr>
+        <p:spPr>
+          <a:xfrm flipV="1">
+            <a:off x="7793895" y="2857515"/>
+            <a:ext cx="0" cy="2298365"/>
+          </a:xfrm>
+          <a:prstGeom prst="line">
+            <a:avLst/>
+          </a:prstGeom>
+          <a:ln w="76200">
+            <a:solidFill>
+              <a:schemeClr val="tx1">
+                <a:lumMod val="50000"/>
+                <a:lumOff val="50000"/>
+              </a:schemeClr>
+            </a:solidFill>
+            <a:prstDash val="sysDot"/>
+          </a:ln>
+        </p:spPr>
+        <p:style>
+          <a:lnRef idx="1">
+            <a:schemeClr val="accent1"/>
+          </a:lnRef>
+          <a:fillRef idx="0">
+            <a:schemeClr val="accent1"/>
+          </a:fillRef>
+          <a:effectRef idx="0">
+            <a:schemeClr val="accent1"/>
+          </a:effectRef>
+          <a:fontRef idx="minor">
+            <a:schemeClr val="tx1"/>
+          </a:fontRef>
+        </p:style>
+      </p:cxnSp>
+      <p:cxnSp>
+        <p:nvCxnSpPr>
+          <p:cNvPr id="20" name="Straight Connector 19">
+            <a:extLst>
+              <a:ext uri="{FF2B5EF4-FFF2-40B4-BE49-F238E27FC236}">
+                <a16:creationId xmlns:a16="http://schemas.microsoft.com/office/drawing/2014/main" id="{893D57FB-15A6-E2DF-23B8-B6CC6518A683}"/>
+              </a:ext>
+            </a:extLst>
+          </p:cNvPr>
+          <p:cNvCxnSpPr/>
+          <p:nvPr/>
+        </p:nvCxnSpPr>
+        <p:spPr>
+          <a:xfrm flipV="1">
+            <a:off x="5110354" y="2725829"/>
+            <a:ext cx="0" cy="2298365"/>
+          </a:xfrm>
+          <a:prstGeom prst="line">
+            <a:avLst/>
+          </a:prstGeom>
+          <a:ln w="76200">
+            <a:solidFill>
+              <a:schemeClr val="tx1">
+                <a:lumMod val="50000"/>
+                <a:lumOff val="50000"/>
+              </a:schemeClr>
+            </a:solidFill>
+            <a:prstDash val="sysDot"/>
+          </a:ln>
+        </p:spPr>
+        <p:style>
+          <a:lnRef idx="1">
+            <a:schemeClr val="accent1"/>
+          </a:lnRef>
+          <a:fillRef idx="0">
+            <a:schemeClr val="accent1"/>
+          </a:fillRef>
+          <a:effectRef idx="0">
+            <a:schemeClr val="accent1"/>
+          </a:effectRef>
+          <a:fontRef idx="minor">
+            <a:schemeClr val="tx1"/>
+          </a:fontRef>
+        </p:style>
+      </p:cxnSp>
+      <p:sp>
+        <p:nvSpPr>
+          <p:cNvPr id="12" name="Rectangle 11">
+            <a:extLst>
+              <a:ext uri="{FF2B5EF4-FFF2-40B4-BE49-F238E27FC236}">
+                <a16:creationId xmlns:a16="http://schemas.microsoft.com/office/drawing/2014/main" id="{B0174089-D9E5-A5ED-5FAB-03D8BC57E727}"/>
+              </a:ext>
+            </a:extLst>
+          </p:cNvPr>
+          <p:cNvSpPr/>
+          <p:nvPr/>
+        </p:nvSpPr>
+        <p:spPr>
+          <a:xfrm>
+            <a:off x="9007344" y="4340688"/>
+            <a:ext cx="2683541" cy="1213450"/>
+          </a:xfrm>
+          <a:prstGeom prst="rect">
+            <a:avLst/>
+          </a:prstGeom>
+          <a:noFill/>
+          <a:ln w="76200">
+            <a:solidFill>
+              <a:schemeClr val="accent5"/>
+            </a:solidFill>
+            <a:prstDash val="solid"/>
+            <a:extLst>
+              <a:ext uri="{C807C97D-BFC1-408E-A445-0C87EB9F89A2}">
+                <ask:lineSketchStyleProps xmlns:ask="http://schemas.microsoft.com/office/drawing/2018/sketchyshapes">
+                  <ask:type>
+                    <ask:lineSketchNone/>
+                  </ask:type>
+                </ask:lineSketchStyleProps>
+              </a:ext>
+            </a:extLst>
+          </a:ln>
+        </p:spPr>
+        <p:style>
+          <a:lnRef idx="2">
+            <a:schemeClr val="accent1">
+              <a:shade val="15000"/>
+            </a:schemeClr>
+          </a:lnRef>
+          <a:fillRef idx="1">
+            <a:schemeClr val="accent1"/>
+          </a:fillRef>
+          <a:effectRef idx="0">
+            <a:schemeClr val="accent1"/>
+          </a:effectRef>
+          <a:fontRef idx="minor">
+            <a:schemeClr val="lt1"/>
+          </a:fontRef>
+        </p:style>
+        <p:txBody>
+          <a:bodyPr rtlCol="0" anchor="ctr"/>
+          <a:lstStyle/>
+          <a:p>
+            <a:pPr algn="ctr"/>
+            <a:r>
+              <a:rPr lang="en-US" sz="3600" b="1">
+                <a:solidFill>
+                  <a:schemeClr val="tx1"/>
+                </a:solidFill>
+              </a:rPr>
+              <a:t>Readout</a:t>
+            </a:r>
+            <a:endParaRPr lang="en-DK" sz="3600" b="1" dirty="0">
+              <a:solidFill>
+                <a:schemeClr val="tx1"/>
+              </a:solidFill>
+            </a:endParaRPr>
+          </a:p>
+        </p:txBody>
+      </p:sp>
+      <p:sp>
+        <p:nvSpPr>
+          <p:cNvPr id="13" name="Rectangle 12">
+            <a:extLst>
+              <a:ext uri="{FF2B5EF4-FFF2-40B4-BE49-F238E27FC236}">
+                <a16:creationId xmlns:a16="http://schemas.microsoft.com/office/drawing/2014/main" id="{868D9FA5-8010-B0F7-0BD9-509391014915}"/>
+              </a:ext>
+            </a:extLst>
+          </p:cNvPr>
+          <p:cNvSpPr/>
+          <p:nvPr/>
+        </p:nvSpPr>
+        <p:spPr>
+          <a:xfrm>
+            <a:off x="5110354" y="4350213"/>
+            <a:ext cx="2683541" cy="1213450"/>
+          </a:xfrm>
+          <a:prstGeom prst="rect">
+            <a:avLst/>
+          </a:prstGeom>
+          <a:noFill/>
+          <a:ln w="76200">
+            <a:solidFill>
+              <a:schemeClr val="accent5"/>
+            </a:solidFill>
+            <a:prstDash val="solid"/>
+            <a:extLst>
+              <a:ext uri="{C807C97D-BFC1-408E-A445-0C87EB9F89A2}">
+                <ask:lineSketchStyleProps xmlns:ask="http://schemas.microsoft.com/office/drawing/2018/sketchyshapes">
+                  <ask:type>
+                    <ask:lineSketchNone/>
+                  </ask:type>
+                </ask:lineSketchStyleProps>
+              </a:ext>
+            </a:extLst>
+          </a:ln>
+        </p:spPr>
+        <p:style>
+          <a:lnRef idx="2">
+            <a:schemeClr val="accent1">
+              <a:shade val="15000"/>
+            </a:schemeClr>
+          </a:lnRef>
+          <a:fillRef idx="1">
+            <a:schemeClr val="accent1"/>
+          </a:fillRef>
+          <a:effectRef idx="0">
+            <a:schemeClr val="accent1"/>
+          </a:effectRef>
+          <a:fontRef idx="minor">
+            <a:schemeClr val="lt1"/>
+          </a:fontRef>
+        </p:style>
+        <p:txBody>
+          <a:bodyPr rtlCol="0" anchor="ctr"/>
+          <a:lstStyle/>
+          <a:p>
+            <a:pPr algn="ctr"/>
+            <a:r>
+              <a:rPr lang="en-US" sz="3600" b="1" dirty="0">
+                <a:solidFill>
+                  <a:schemeClr val="tx1"/>
+                </a:solidFill>
+              </a:rPr>
+              <a:t>“Readout”</a:t>
+            </a:r>
+            <a:endParaRPr lang="en-DK" sz="3600" b="1" dirty="0">
+              <a:solidFill>
+                <a:schemeClr val="tx1"/>
+              </a:solidFill>
+            </a:endParaRPr>
+          </a:p>
+        </p:txBody>
+      </p:sp>
+      <mc:AlternateContent xmlns:mc="http://schemas.openxmlformats.org/markup-compatibility/2006">
+        <mc:Choice xmlns:a14="http://schemas.microsoft.com/office/drawing/2010/main" Requires="a14">
           <p:sp>
             <p:nvSpPr>
-              <p:cNvPr id="9" name="Rectangle 8">
+              <p:cNvPr id="5" name="Rectangle 4">
                 <a:extLst>
                   <a:ext uri="{FF2B5EF4-FFF2-40B4-BE49-F238E27FC236}">
-                    <a16:creationId xmlns:a16="http://schemas.microsoft.com/office/drawing/2014/main" id="{18F0C339-F809-BBE4-3DE0-F6917FABA899}"/>
+                    <a16:creationId xmlns:a16="http://schemas.microsoft.com/office/drawing/2014/main" id="{EB6E3266-7E7E-3BBF-63E4-90DCE73D59E9}"/>
                   </a:ext>
                 </a:extLst>
               </p:cNvPr>
@@ -14484,7 +15343,7 @@
             </p:nvSpPr>
             <p:spPr>
               <a:xfrm>
-                <a:off x="5773947" y="2454027"/>
+                <a:off x="7793894" y="2429528"/>
                 <a:ext cx="1213450" cy="1213450"/>
               </a:xfrm>
               <a:prstGeom prst="rect">
@@ -14591,13 +15450,13 @@
             </p:txBody>
           </p:sp>
         </mc:Choice>
-        <mc:Fallback xmlns="">
+        <mc:Fallback>
           <p:sp>
             <p:nvSpPr>
-              <p:cNvPr id="9" name="Rectangle 8">
+              <p:cNvPr id="5" name="Rectangle 4">
                 <a:extLst>
                   <a:ext uri="{FF2B5EF4-FFF2-40B4-BE49-F238E27FC236}">
-                    <a16:creationId xmlns:a16="http://schemas.microsoft.com/office/drawing/2014/main" id="{18F0C339-F809-BBE4-3DE0-F6917FABA899}"/>
+                    <a16:creationId xmlns:a16="http://schemas.microsoft.com/office/drawing/2014/main" id="{EB6E3266-7E7E-3BBF-63E4-90DCE73D59E9}"/>
                   </a:ext>
                 </a:extLst>
               </p:cNvPr>
@@ -14608,7 +15467,7 @@
             </p:nvSpPr>
             <p:spPr>
               <a:xfrm>
-                <a:off x="5773947" y="2454027"/>
+                <a:off x="7793894" y="2429528"/>
                 <a:ext cx="1213450" cy="1213450"/>
               </a:xfrm>
               <a:prstGeom prst="rect">
@@ -14651,313 +15510,14 @@
           </p:sp>
         </mc:Fallback>
       </mc:AlternateContent>
-      <p:sp>
-        <p:nvSpPr>
-          <p:cNvPr id="8" name="Rectangle 7">
-            <a:extLst>
-              <a:ext uri="{FF2B5EF4-FFF2-40B4-BE49-F238E27FC236}">
-                <a16:creationId xmlns:a16="http://schemas.microsoft.com/office/drawing/2014/main" id="{B2310F2C-7C23-5807-9667-401B8664994E}"/>
-              </a:ext>
-            </a:extLst>
-          </p:cNvPr>
-          <p:cNvSpPr/>
-          <p:nvPr/>
-        </p:nvSpPr>
-        <p:spPr>
-          <a:xfrm>
-            <a:off x="6979498" y="3683105"/>
-            <a:ext cx="2683541" cy="1213450"/>
-          </a:xfrm>
-          <a:prstGeom prst="rect">
-            <a:avLst/>
-          </a:prstGeom>
-          <a:noFill/>
-          <a:ln w="76200">
-            <a:solidFill>
-              <a:schemeClr val="accent5"/>
-            </a:solidFill>
-            <a:prstDash val="solid"/>
-            <a:extLst>
-              <a:ext uri="{C807C97D-BFC1-408E-A445-0C87EB9F89A2}">
-                <ask:lineSketchStyleProps xmlns:ask="http://schemas.microsoft.com/office/drawing/2018/sketchyshapes">
-                  <ask:type>
-                    <ask:lineSketchNone/>
-                  </ask:type>
-                </ask:lineSketchStyleProps>
-              </a:ext>
-            </a:extLst>
-          </a:ln>
-        </p:spPr>
-        <p:style>
-          <a:lnRef idx="2">
-            <a:schemeClr val="accent1">
-              <a:shade val="15000"/>
-            </a:schemeClr>
-          </a:lnRef>
-          <a:fillRef idx="1">
-            <a:schemeClr val="accent1"/>
-          </a:fillRef>
-          <a:effectRef idx="0">
-            <a:schemeClr val="accent1"/>
-          </a:effectRef>
-          <a:fontRef idx="minor">
-            <a:schemeClr val="lt1"/>
-          </a:fontRef>
-        </p:style>
-        <p:txBody>
-          <a:bodyPr rtlCol="0" anchor="ctr"/>
-          <a:lstStyle/>
-          <a:p>
-            <a:pPr algn="ctr"/>
-            <a:r>
-              <a:rPr lang="en-US" sz="3600" b="1">
-                <a:solidFill>
-                  <a:schemeClr val="tx1"/>
-                </a:solidFill>
-              </a:rPr>
-              <a:t>Readout</a:t>
-            </a:r>
-            <a:endParaRPr lang="en-DK" sz="3600" b="1" dirty="0">
-              <a:solidFill>
-                <a:schemeClr val="tx1"/>
-              </a:solidFill>
-            </a:endParaRPr>
-          </a:p>
-        </p:txBody>
-      </p:sp>
-      <p:sp>
-        <p:nvSpPr>
-          <p:cNvPr id="3" name="Rectangle 2">
-            <a:extLst>
-              <a:ext uri="{FF2B5EF4-FFF2-40B4-BE49-F238E27FC236}">
-                <a16:creationId xmlns:a16="http://schemas.microsoft.com/office/drawing/2014/main" id="{E0C39E51-6475-D048-63B7-ED279A217F3D}"/>
-              </a:ext>
-            </a:extLst>
-          </p:cNvPr>
-          <p:cNvSpPr/>
-          <p:nvPr/>
-        </p:nvSpPr>
-        <p:spPr>
-          <a:xfrm>
-            <a:off x="3082507" y="3683105"/>
-            <a:ext cx="2683541" cy="1213450"/>
-          </a:xfrm>
-          <a:prstGeom prst="rect">
-            <a:avLst/>
-          </a:prstGeom>
-          <a:noFill/>
-          <a:ln w="76200">
-            <a:solidFill>
-              <a:schemeClr val="accent5"/>
-            </a:solidFill>
-            <a:prstDash val="solid"/>
-            <a:extLst>
-              <a:ext uri="{C807C97D-BFC1-408E-A445-0C87EB9F89A2}">
-                <ask:lineSketchStyleProps xmlns:ask="http://schemas.microsoft.com/office/drawing/2018/sketchyshapes">
-                  <ask:type>
-                    <ask:lineSketchNone/>
-                  </ask:type>
-                </ask:lineSketchStyleProps>
-              </a:ext>
-            </a:extLst>
-          </a:ln>
-        </p:spPr>
-        <p:style>
-          <a:lnRef idx="2">
-            <a:schemeClr val="accent1">
-              <a:shade val="15000"/>
-            </a:schemeClr>
-          </a:lnRef>
-          <a:fillRef idx="1">
-            <a:schemeClr val="accent1"/>
-          </a:fillRef>
-          <a:effectRef idx="0">
-            <a:schemeClr val="accent1"/>
-          </a:effectRef>
-          <a:fontRef idx="minor">
-            <a:schemeClr val="lt1"/>
-          </a:fontRef>
-        </p:style>
-        <p:txBody>
-          <a:bodyPr rtlCol="0" anchor="ctr"/>
-          <a:lstStyle/>
-          <a:p>
-            <a:pPr algn="ctr"/>
-            <a:r>
-              <a:rPr lang="en-US" sz="3600" b="1" dirty="0">
-                <a:solidFill>
-                  <a:schemeClr val="tx1"/>
-                </a:solidFill>
-              </a:rPr>
-              <a:t>“Readout”</a:t>
-            </a:r>
-            <a:endParaRPr lang="en-DK" sz="3600" b="1" dirty="0">
-              <a:solidFill>
-                <a:schemeClr val="tx1"/>
-              </a:solidFill>
-            </a:endParaRPr>
-          </a:p>
-        </p:txBody>
-      </p:sp>
-      <p:cxnSp>
-        <p:nvCxnSpPr>
-          <p:cNvPr id="4" name="Straight Connector 3">
-            <a:extLst>
-              <a:ext uri="{FF2B5EF4-FFF2-40B4-BE49-F238E27FC236}">
-                <a16:creationId xmlns:a16="http://schemas.microsoft.com/office/drawing/2014/main" id="{C4DA9E31-4BEE-8866-CA5F-E9AE4B73D6B6}"/>
-              </a:ext>
-            </a:extLst>
-          </p:cNvPr>
-          <p:cNvCxnSpPr>
-            <a:cxnSpLocks/>
-          </p:cNvCxnSpPr>
-          <p:nvPr/>
-        </p:nvCxnSpPr>
-        <p:spPr>
-          <a:xfrm flipV="1">
-            <a:off x="1529123" y="3667477"/>
-            <a:ext cx="8667300" cy="11502"/>
-          </a:xfrm>
-          <a:prstGeom prst="line">
-            <a:avLst/>
-          </a:prstGeom>
-          <a:ln w="76200">
-            <a:solidFill>
-              <a:schemeClr val="tx1"/>
-            </a:solidFill>
-          </a:ln>
-        </p:spPr>
-        <p:style>
-          <a:lnRef idx="1">
-            <a:schemeClr val="accent1"/>
-          </a:lnRef>
-          <a:fillRef idx="0">
-            <a:schemeClr val="accent1"/>
-          </a:fillRef>
-          <a:effectRef idx="0">
-            <a:schemeClr val="accent1"/>
-          </a:effectRef>
-          <a:fontRef idx="minor">
-            <a:schemeClr val="tx1"/>
-          </a:fontRef>
-        </p:style>
-      </p:cxnSp>
-      <mc:AlternateContent xmlns:mc="http://schemas.openxmlformats.org/markup-compatibility/2006" xmlns:a14="http://schemas.microsoft.com/office/drawing/2010/main">
-        <mc:Choice Requires="a14">
+      <mc:AlternateContent xmlns:mc="http://schemas.openxmlformats.org/markup-compatibility/2006">
+        <mc:Choice xmlns:a14="http://schemas.microsoft.com/office/drawing/2010/main" Requires="a14">
           <p:sp>
             <p:nvSpPr>
-              <p:cNvPr id="2" name="TextBox 1">
+              <p:cNvPr id="6" name="Rectangle 5">
                 <a:extLst>
                   <a:ext uri="{FF2B5EF4-FFF2-40B4-BE49-F238E27FC236}">
-                    <a16:creationId xmlns:a16="http://schemas.microsoft.com/office/drawing/2014/main" id="{6D99F296-36DB-FD9B-7DFE-DE3F6F8CD24D}"/>
-                  </a:ext>
-                </a:extLst>
-              </p:cNvPr>
-              <p:cNvSpPr txBox="1"/>
-              <p:nvPr/>
-            </p:nvSpPr>
-            <p:spPr>
-              <a:xfrm>
-                <a:off x="460076" y="3179021"/>
-                <a:ext cx="1141658" cy="830997"/>
-              </a:xfrm>
-              <a:prstGeom prst="rect">
-                <a:avLst/>
-              </a:prstGeom>
-              <a:noFill/>
-            </p:spPr>
-            <p:txBody>
-              <a:bodyPr wrap="none" rtlCol="0">
-                <a:spAutoFit/>
-              </a:bodyPr>
-              <a:lstStyle/>
-              <a:p>
-                <a:pPr/>
-                <a14:m>
-                  <m:oMathPara xmlns:m="http://schemas.openxmlformats.org/officeDocument/2006/math">
-                    <m:oMathParaPr>
-                      <m:jc m:val="centerGroup"/>
-                    </m:oMathParaPr>
-                    <m:oMath xmlns:m="http://schemas.openxmlformats.org/officeDocument/2006/math">
-                      <m:r>
-                        <a:rPr lang="en-US" sz="4800" b="1" i="1" smtClean="0">
-                          <a:latin typeface="Cambria Math" panose="02040503050406030204" pitchFamily="18" charset="0"/>
-                        </a:rPr>
-                        <m:t>|</m:t>
-                      </m:r>
-                      <m:r>
-                        <a:rPr lang="en-US" sz="4800" b="1" i="1" smtClean="0">
-                          <a:latin typeface="Cambria Math" panose="02040503050406030204" pitchFamily="18" charset="0"/>
-                        </a:rPr>
-                        <m:t>𝟎</m:t>
-                      </m:r>
-                      <m:r>
-                        <a:rPr lang="en-US" sz="4800" b="1" i="1" smtClean="0">
-                          <a:latin typeface="Cambria Math" panose="02040503050406030204" pitchFamily="18" charset="0"/>
-                        </a:rPr>
-                        <m:t>⟩</m:t>
-                      </m:r>
-                    </m:oMath>
-                  </m:oMathPara>
-                </a14:m>
-                <a:endParaRPr lang="en-DK" sz="4800" b="1" dirty="0"/>
-              </a:p>
-            </p:txBody>
-          </p:sp>
-        </mc:Choice>
-        <mc:Fallback xmlns="">
-          <p:sp>
-            <p:nvSpPr>
-              <p:cNvPr id="2" name="TextBox 1">
-                <a:extLst>
-                  <a:ext uri="{FF2B5EF4-FFF2-40B4-BE49-F238E27FC236}">
-                    <a16:creationId xmlns:a16="http://schemas.microsoft.com/office/drawing/2014/main" id="{6D99F296-36DB-FD9B-7DFE-DE3F6F8CD24D}"/>
-                  </a:ext>
-                </a:extLst>
-              </p:cNvPr>
-              <p:cNvSpPr txBox="1">
-                <a:spLocks noRot="1" noChangeAspect="1" noMove="1" noResize="1" noEditPoints="1" noAdjustHandles="1" noChangeArrowheads="1" noChangeShapeType="1" noTextEdit="1"/>
-              </p:cNvSpPr>
-              <p:nvPr/>
-            </p:nvSpPr>
-            <p:spPr>
-              <a:xfrm>
-                <a:off x="460076" y="3179021"/>
-                <a:ext cx="1141658" cy="830997"/>
-              </a:xfrm>
-              <a:prstGeom prst="rect">
-                <a:avLst/>
-              </a:prstGeom>
-              <a:blipFill>
-                <a:blip r:embed="rId3"/>
-                <a:stretch>
-                  <a:fillRect/>
-                </a:stretch>
-              </a:blipFill>
-            </p:spPr>
-            <p:txBody>
-              <a:bodyPr/>
-              <a:lstStyle/>
-              <a:p>
-                <a:r>
-                  <a:rPr lang="en-DK">
-                    <a:noFill/>
-                  </a:rPr>
-                  <a:t> </a:t>
-                </a:r>
-              </a:p>
-            </p:txBody>
-          </p:sp>
-        </mc:Fallback>
-      </mc:AlternateContent>
-      <mc:AlternateContent xmlns:mc="http://schemas.openxmlformats.org/markup-compatibility/2006" xmlns:a14="http://schemas.microsoft.com/office/drawing/2010/main">
-        <mc:Choice Requires="a14">
-          <p:sp>
-            <p:nvSpPr>
-              <p:cNvPr id="7" name="Rectangle 6">
-                <a:extLst>
-                  <a:ext uri="{FF2B5EF4-FFF2-40B4-BE49-F238E27FC236}">
-                    <a16:creationId xmlns:a16="http://schemas.microsoft.com/office/drawing/2014/main" id="{7C317013-2C7F-D591-F656-E7B2DFD5F211}"/>
+                    <a16:creationId xmlns:a16="http://schemas.microsoft.com/office/drawing/2014/main" id="{F0E7A0F5-F772-1664-A8EA-198A5C54D406}"/>
                   </a:ext>
                 </a:extLst>
               </p:cNvPr>
@@ -14966,7 +15526,7 @@
             </p:nvSpPr>
             <p:spPr>
               <a:xfrm>
-                <a:off x="1869057" y="2465529"/>
+                <a:off x="3896904" y="2434411"/>
                 <a:ext cx="1213450" cy="1213450"/>
               </a:xfrm>
               <a:prstGeom prst="rect">
@@ -15065,13 +15625,13 @@
             </p:txBody>
           </p:sp>
         </mc:Choice>
-        <mc:Fallback xmlns="">
+        <mc:Fallback>
           <p:sp>
             <p:nvSpPr>
-              <p:cNvPr id="7" name="Rectangle 6">
+              <p:cNvPr id="6" name="Rectangle 5">
                 <a:extLst>
                   <a:ext uri="{FF2B5EF4-FFF2-40B4-BE49-F238E27FC236}">
-                    <a16:creationId xmlns:a16="http://schemas.microsoft.com/office/drawing/2014/main" id="{7C317013-2C7F-D591-F656-E7B2DFD5F211}"/>
+                    <a16:creationId xmlns:a16="http://schemas.microsoft.com/office/drawing/2014/main" id="{F0E7A0F5-F772-1664-A8EA-198A5C54D406}"/>
                   </a:ext>
                 </a:extLst>
               </p:cNvPr>
@@ -15082,16 +15642,16 @@
             </p:nvSpPr>
             <p:spPr>
               <a:xfrm>
-                <a:off x="1869057" y="2465529"/>
+                <a:off x="3896904" y="2434411"/>
                 <a:ext cx="1213450" cy="1213450"/>
               </a:xfrm>
               <a:prstGeom prst="rect">
                 <a:avLst/>
               </a:prstGeom>
               <a:blipFill>
-                <a:blip r:embed="rId4"/>
+                <a:blip r:embed="rId3"/>
                 <a:stretch>
-                  <a:fillRect l="-472" b="-5634"/>
+                  <a:fillRect b="-6132"/>
                 </a:stretch>
               </a:blipFill>
               <a:ln w="76200">
@@ -15125,10 +15685,264 @@
           </p:sp>
         </mc:Fallback>
       </mc:AlternateContent>
+      <p:cxnSp>
+        <p:nvCxnSpPr>
+          <p:cNvPr id="3" name="Straight Connector 2">
+            <a:extLst>
+              <a:ext uri="{FF2B5EF4-FFF2-40B4-BE49-F238E27FC236}">
+                <a16:creationId xmlns:a16="http://schemas.microsoft.com/office/drawing/2014/main" id="{CA021BD1-0D32-1182-6D37-16374E0B5D55}"/>
+              </a:ext>
+            </a:extLst>
+          </p:cNvPr>
+          <p:cNvCxnSpPr>
+            <a:cxnSpLocks/>
+          </p:cNvCxnSpPr>
+          <p:nvPr/>
+        </p:nvCxnSpPr>
+        <p:spPr>
+          <a:xfrm>
+            <a:off x="3624079" y="5568546"/>
+            <a:ext cx="8216733" cy="0"/>
+          </a:xfrm>
+          <a:prstGeom prst="line">
+            <a:avLst/>
+          </a:prstGeom>
+          <a:ln w="76200">
+            <a:solidFill>
+              <a:schemeClr val="tx1"/>
+            </a:solidFill>
+          </a:ln>
+        </p:spPr>
+        <p:style>
+          <a:lnRef idx="1">
+            <a:schemeClr val="accent1"/>
+          </a:lnRef>
+          <a:fillRef idx="0">
+            <a:schemeClr val="accent1"/>
+          </a:fillRef>
+          <a:effectRef idx="0">
+            <a:schemeClr val="accent1"/>
+          </a:effectRef>
+          <a:fontRef idx="minor">
+            <a:schemeClr val="tx1"/>
+          </a:fontRef>
+        </p:style>
+      </p:cxnSp>
+      <p:sp>
+        <p:nvSpPr>
+          <p:cNvPr id="8" name="TextBox 7">
+            <a:extLst>
+              <a:ext uri="{FF2B5EF4-FFF2-40B4-BE49-F238E27FC236}">
+                <a16:creationId xmlns:a16="http://schemas.microsoft.com/office/drawing/2014/main" id="{EAFD8482-E56C-7FEB-6A6E-D58D3EED0B0C}"/>
+              </a:ext>
+            </a:extLst>
+          </p:cNvPr>
+          <p:cNvSpPr txBox="1"/>
+          <p:nvPr/>
+        </p:nvSpPr>
+        <p:spPr>
+          <a:xfrm>
+            <a:off x="351188" y="3305536"/>
+            <a:ext cx="1657826" cy="830997"/>
+          </a:xfrm>
+          <a:prstGeom prst="rect">
+            <a:avLst/>
+          </a:prstGeom>
+          <a:noFill/>
+        </p:spPr>
+        <p:txBody>
+          <a:bodyPr wrap="none" rtlCol="0">
+            <a:spAutoFit/>
+          </a:bodyPr>
+          <a:lstStyle/>
+          <a:p>
+            <a:r>
+              <a:rPr lang="en-US" sz="4800" dirty="0"/>
+              <a:t>Qubit</a:t>
+            </a:r>
+            <a:endParaRPr lang="en-DK" sz="4800" dirty="0"/>
+          </a:p>
+        </p:txBody>
+      </p:sp>
+      <p:sp>
+        <p:nvSpPr>
+          <p:cNvPr id="9" name="TextBox 8">
+            <a:extLst>
+              <a:ext uri="{FF2B5EF4-FFF2-40B4-BE49-F238E27FC236}">
+                <a16:creationId xmlns:a16="http://schemas.microsoft.com/office/drawing/2014/main" id="{53E21F6C-0702-D6A4-865B-77F276CABB89}"/>
+              </a:ext>
+            </a:extLst>
+          </p:cNvPr>
+          <p:cNvSpPr txBox="1"/>
+          <p:nvPr/>
+        </p:nvSpPr>
+        <p:spPr>
+          <a:xfrm>
+            <a:off x="345556" y="4947413"/>
+            <a:ext cx="3028393" cy="830997"/>
+          </a:xfrm>
+          <a:prstGeom prst="rect">
+            <a:avLst/>
+          </a:prstGeom>
+          <a:noFill/>
+        </p:spPr>
+        <p:txBody>
+          <a:bodyPr wrap="none" rtlCol="0">
+            <a:spAutoFit/>
+          </a:bodyPr>
+          <a:lstStyle/>
+          <a:p>
+            <a:r>
+              <a:rPr lang="en-US" sz="4800" dirty="0"/>
+              <a:t>Resonator</a:t>
+            </a:r>
+            <a:endParaRPr lang="en-DK" sz="4800" dirty="0"/>
+          </a:p>
+        </p:txBody>
+      </p:sp>
+      <mc:AlternateContent xmlns:mc="http://schemas.openxmlformats.org/markup-compatibility/2006">
+        <mc:Choice xmlns:a14="http://schemas.microsoft.com/office/drawing/2010/main" Requires="a14">
+          <p:sp>
+            <p:nvSpPr>
+              <p:cNvPr id="10" name="TextBox 9">
+                <a:extLst>
+                  <a:ext uri="{FF2B5EF4-FFF2-40B4-BE49-F238E27FC236}">
+                    <a16:creationId xmlns:a16="http://schemas.microsoft.com/office/drawing/2014/main" id="{CD70FD5E-DE0E-7DE6-4F82-5F3776A580BC}"/>
+                  </a:ext>
+                </a:extLst>
+              </p:cNvPr>
+              <p:cNvSpPr txBox="1"/>
+              <p:nvPr/>
+            </p:nvSpPr>
+            <p:spPr>
+              <a:xfrm>
+                <a:off x="2259541" y="3247853"/>
+                <a:ext cx="1114408" cy="830997"/>
+              </a:xfrm>
+              <a:prstGeom prst="rect">
+                <a:avLst/>
+              </a:prstGeom>
+              <a:noFill/>
+            </p:spPr>
+            <p:txBody>
+              <a:bodyPr wrap="none" rtlCol="0">
+                <a:spAutoFit/>
+              </a:bodyPr>
+              <a:lstStyle/>
+              <a:p>
+                <a:pPr/>
+                <a14:m>
+                  <m:oMathPara xmlns:m="http://schemas.openxmlformats.org/officeDocument/2006/math">
+                    <m:oMathParaPr>
+                      <m:jc m:val="centerGroup"/>
+                    </m:oMathParaPr>
+                    <m:oMath xmlns:m="http://schemas.openxmlformats.org/officeDocument/2006/math">
+                      <m:r>
+                        <a:rPr lang="en-US" sz="4800" b="0" i="1" smtClean="0">
+                          <a:latin typeface="Cambria Math" panose="02040503050406030204" pitchFamily="18" charset="0"/>
+                        </a:rPr>
+                        <m:t>|0⟩</m:t>
+                      </m:r>
+                    </m:oMath>
+                  </m:oMathPara>
+                </a14:m>
+                <a:endParaRPr lang="en-DK" sz="4800" dirty="0"/>
+              </a:p>
+            </p:txBody>
+          </p:sp>
+        </mc:Choice>
+        <mc:Fallback>
+          <p:sp>
+            <p:nvSpPr>
+              <p:cNvPr id="10" name="TextBox 9">
+                <a:extLst>
+                  <a:ext uri="{FF2B5EF4-FFF2-40B4-BE49-F238E27FC236}">
+                    <a16:creationId xmlns:a16="http://schemas.microsoft.com/office/drawing/2014/main" id="{CD70FD5E-DE0E-7DE6-4F82-5F3776A580BC}"/>
+                  </a:ext>
+                </a:extLst>
+              </p:cNvPr>
+              <p:cNvSpPr txBox="1">
+                <a:spLocks noRot="1" noChangeAspect="1" noMove="1" noResize="1" noEditPoints="1" noAdjustHandles="1" noChangeArrowheads="1" noChangeShapeType="1" noTextEdit="1"/>
+              </p:cNvSpPr>
+              <p:nvPr/>
+            </p:nvSpPr>
+            <p:spPr>
+              <a:xfrm>
+                <a:off x="2259541" y="3247853"/>
+                <a:ext cx="1114408" cy="830997"/>
+              </a:xfrm>
+              <a:prstGeom prst="rect">
+                <a:avLst/>
+              </a:prstGeom>
+              <a:blipFill>
+                <a:blip r:embed="rId4"/>
+                <a:stretch>
+                  <a:fillRect/>
+                </a:stretch>
+              </a:blipFill>
+            </p:spPr>
+            <p:txBody>
+              <a:bodyPr/>
+              <a:lstStyle/>
+              <a:p>
+                <a:r>
+                  <a:rPr lang="en-DK">
+                    <a:noFill/>
+                  </a:rPr>
+                  <a:t> </a:t>
+                </a:r>
+              </a:p>
+            </p:txBody>
+          </p:sp>
+        </mc:Fallback>
+      </mc:AlternateContent>
+      <p:cxnSp>
+        <p:nvCxnSpPr>
+          <p:cNvPr id="19" name="Straight Connector 18">
+            <a:extLst>
+              <a:ext uri="{FF2B5EF4-FFF2-40B4-BE49-F238E27FC236}">
+                <a16:creationId xmlns:a16="http://schemas.microsoft.com/office/drawing/2014/main" id="{1F05FB26-CD98-08A8-88ED-32B34915DA95}"/>
+              </a:ext>
+            </a:extLst>
+          </p:cNvPr>
+          <p:cNvCxnSpPr>
+            <a:cxnSpLocks/>
+          </p:cNvCxnSpPr>
+          <p:nvPr/>
+        </p:nvCxnSpPr>
+        <p:spPr>
+          <a:xfrm>
+            <a:off x="3624079" y="3647861"/>
+            <a:ext cx="7929922" cy="0"/>
+          </a:xfrm>
+          <a:prstGeom prst="line">
+            <a:avLst/>
+          </a:prstGeom>
+          <a:ln w="76200">
+            <a:solidFill>
+              <a:schemeClr val="tx1"/>
+            </a:solidFill>
+          </a:ln>
+        </p:spPr>
+        <p:style>
+          <a:lnRef idx="1">
+            <a:schemeClr val="accent1"/>
+          </a:lnRef>
+          <a:fillRef idx="0">
+            <a:schemeClr val="accent1"/>
+          </a:fillRef>
+          <a:effectRef idx="0">
+            <a:schemeClr val="accent1"/>
+          </a:effectRef>
+          <a:fontRef idx="minor">
+            <a:schemeClr val="tx1"/>
+          </a:fontRef>
+        </p:style>
+      </p:cxnSp>
     </p:spTree>
     <p:extLst>
       <p:ext uri="{BB962C8B-B14F-4D97-AF65-F5344CB8AC3E}">
-        <p14:creationId xmlns:p14="http://schemas.microsoft.com/office/powerpoint/2010/main" val="2974111751"/>
+        <p14:creationId xmlns:p14="http://schemas.microsoft.com/office/powerpoint/2010/main" val="3275447184"/>
       </p:ext>
     </p:extLst>
   </p:cSld>

</xml_diff>

<commit_message>
Figures for the first 3 chapters, test
</commit_message>
<xml_diff>
--- a/Figs/circuits.pptx
+++ b/Figs/circuits.pptx
@@ -125,7 +125,7 @@
 <file path=ppt/revisionInfo.xml><?xml version="1.0" encoding="utf-8"?>
 <p1510:revInfo xmlns:a="http://schemas.openxmlformats.org/drawingml/2006/main" xmlns:r="http://schemas.openxmlformats.org/officeDocument/2006/relationships" xmlns:p1510="http://schemas.microsoft.com/office/powerpoint/2015/10/main">
   <p1510:revLst>
-    <p1510:client id="{C03BB677-E050-4623-A208-34D9F8363555}" v="42" dt="2023-10-20T07:08:05.269"/>
+    <p1510:client id="{C03BB677-E050-4623-A208-34D9F8363555}" v="45" dt="2023-10-23T08:37:18.250"/>
   </p1510:revLst>
 </p1510:revInfo>
 </file>
@@ -4519,10 +4519,233 @@
   <pc:docChgLst>
     <pc:chgData name="Johann Bock Severin" userId="3b36179260fc8001" providerId="LiveId" clId="{C03BB677-E050-4623-A208-34D9F8363555}"/>
     <pc:docChg chg="undo custSel addSld delSld modSld sldOrd">
-      <pc:chgData name="Johann Bock Severin" userId="3b36179260fc8001" providerId="LiveId" clId="{C03BB677-E050-4623-A208-34D9F8363555}" dt="2023-10-20T07:12:27.405" v="246" actId="1076"/>
+      <pc:chgData name="Johann Bock Severin" userId="3b36179260fc8001" providerId="LiveId" clId="{C03BB677-E050-4623-A208-34D9F8363555}" dt="2023-10-23T08:37:33.079" v="262" actId="208"/>
       <pc:docMkLst>
         <pc:docMk/>
       </pc:docMkLst>
+      <pc:sldChg chg="addSp delSp modSp mod">
+        <pc:chgData name="Johann Bock Severin" userId="3b36179260fc8001" providerId="LiveId" clId="{C03BB677-E050-4623-A208-34D9F8363555}" dt="2023-10-23T08:37:33.079" v="262" actId="208"/>
+        <pc:sldMkLst>
+          <pc:docMk/>
+          <pc:sldMk cId="2845768841" sldId="260"/>
+        </pc:sldMkLst>
+        <pc:spChg chg="mod topLvl">
+          <ac:chgData name="Johann Bock Severin" userId="3b36179260fc8001" providerId="LiveId" clId="{C03BB677-E050-4623-A208-34D9F8363555}" dt="2023-10-23T08:37:18.250" v="261" actId="165"/>
+          <ac:spMkLst>
+            <pc:docMk/>
+            <pc:sldMk cId="2845768841" sldId="260"/>
+            <ac:spMk id="3" creationId="{518BCE2B-DC1A-C07B-A697-CD9F8D1B8CFA}"/>
+          </ac:spMkLst>
+        </pc:spChg>
+        <pc:spChg chg="mod topLvl">
+          <ac:chgData name="Johann Bock Severin" userId="3b36179260fc8001" providerId="LiveId" clId="{C03BB677-E050-4623-A208-34D9F8363555}" dt="2023-10-23T08:37:18.250" v="261" actId="165"/>
+          <ac:spMkLst>
+            <pc:docMk/>
+            <pc:sldMk cId="2845768841" sldId="260"/>
+            <ac:spMk id="12" creationId="{F217EFA6-9729-D04F-9C0F-DFC38083C799}"/>
+          </ac:spMkLst>
+        </pc:spChg>
+        <pc:spChg chg="mod">
+          <ac:chgData name="Johann Bock Severin" userId="3b36179260fc8001" providerId="LiveId" clId="{C03BB677-E050-4623-A208-34D9F8363555}" dt="2023-10-23T08:37:18.250" v="261" actId="165"/>
+          <ac:spMkLst>
+            <pc:docMk/>
+            <pc:sldMk cId="2845768841" sldId="260"/>
+            <ac:spMk id="19" creationId="{CFEEF5C5-3798-D49C-DF44-8D871F9A8F84}"/>
+          </ac:spMkLst>
+        </pc:spChg>
+        <pc:spChg chg="mod topLvl">
+          <ac:chgData name="Johann Bock Severin" userId="3b36179260fc8001" providerId="LiveId" clId="{C03BB677-E050-4623-A208-34D9F8363555}" dt="2023-10-23T08:37:18.250" v="261" actId="165"/>
+          <ac:spMkLst>
+            <pc:docMk/>
+            <pc:sldMk cId="2845768841" sldId="260"/>
+            <ac:spMk id="25" creationId="{5C026F19-6499-9D9A-74FD-900128C35E91}"/>
+          </ac:spMkLst>
+        </pc:spChg>
+        <pc:spChg chg="mod topLvl">
+          <ac:chgData name="Johann Bock Severin" userId="3b36179260fc8001" providerId="LiveId" clId="{C03BB677-E050-4623-A208-34D9F8363555}" dt="2023-10-23T08:37:18.250" v="261" actId="165"/>
+          <ac:spMkLst>
+            <pc:docMk/>
+            <pc:sldMk cId="2845768841" sldId="260"/>
+            <ac:spMk id="28" creationId="{34A23BE5-BB45-AB13-4F45-8D3E7E980432}"/>
+          </ac:spMkLst>
+        </pc:spChg>
+        <pc:spChg chg="mod topLvl">
+          <ac:chgData name="Johann Bock Severin" userId="3b36179260fc8001" providerId="LiveId" clId="{C03BB677-E050-4623-A208-34D9F8363555}" dt="2023-10-23T08:37:18.250" v="261" actId="165"/>
+          <ac:spMkLst>
+            <pc:docMk/>
+            <pc:sldMk cId="2845768841" sldId="260"/>
+            <ac:spMk id="39" creationId="{45954C39-762E-7D28-F6DB-5379FBB2C7E2}"/>
+          </ac:spMkLst>
+        </pc:spChg>
+        <pc:spChg chg="mod topLvl">
+          <ac:chgData name="Johann Bock Severin" userId="3b36179260fc8001" providerId="LiveId" clId="{C03BB677-E050-4623-A208-34D9F8363555}" dt="2023-10-23T08:37:33.079" v="262" actId="208"/>
+          <ac:spMkLst>
+            <pc:docMk/>
+            <pc:sldMk cId="2845768841" sldId="260"/>
+            <ac:spMk id="62" creationId="{06FC1A69-B502-EE8D-8F71-28BF09E50F98}"/>
+          </ac:spMkLst>
+        </pc:spChg>
+        <pc:spChg chg="mod topLvl">
+          <ac:chgData name="Johann Bock Severin" userId="3b36179260fc8001" providerId="LiveId" clId="{C03BB677-E050-4623-A208-34D9F8363555}" dt="2023-10-23T08:37:33.079" v="262" actId="208"/>
+          <ac:spMkLst>
+            <pc:docMk/>
+            <pc:sldMk cId="2845768841" sldId="260"/>
+            <ac:spMk id="63" creationId="{E4F97A73-2630-A383-36FE-1427D3242DFB}"/>
+          </ac:spMkLst>
+        </pc:spChg>
+        <pc:spChg chg="mod topLvl">
+          <ac:chgData name="Johann Bock Severin" userId="3b36179260fc8001" providerId="LiveId" clId="{C03BB677-E050-4623-A208-34D9F8363555}" dt="2023-10-23T08:37:33.079" v="262" actId="208"/>
+          <ac:spMkLst>
+            <pc:docMk/>
+            <pc:sldMk cId="2845768841" sldId="260"/>
+            <ac:spMk id="64" creationId="{9607E7CF-5DA4-96D3-5042-1BE3DF692B01}"/>
+          </ac:spMkLst>
+        </pc:spChg>
+        <pc:spChg chg="mod topLvl">
+          <ac:chgData name="Johann Bock Severin" userId="3b36179260fc8001" providerId="LiveId" clId="{C03BB677-E050-4623-A208-34D9F8363555}" dt="2023-10-23T08:37:18.250" v="261" actId="165"/>
+          <ac:spMkLst>
+            <pc:docMk/>
+            <pc:sldMk cId="2845768841" sldId="260"/>
+            <ac:spMk id="66" creationId="{21DF2710-2D08-FD43-9AC8-D62428E22FD7}"/>
+          </ac:spMkLst>
+        </pc:spChg>
+        <pc:spChg chg="mod">
+          <ac:chgData name="Johann Bock Severin" userId="3b36179260fc8001" providerId="LiveId" clId="{C03BB677-E050-4623-A208-34D9F8363555}" dt="2023-10-23T08:37:18.250" v="261" actId="165"/>
+          <ac:spMkLst>
+            <pc:docMk/>
+            <pc:sldMk cId="2845768841" sldId="260"/>
+            <ac:spMk id="75" creationId="{8532AC6E-5A0D-E208-DCF3-DE3281C41EE9}"/>
+          </ac:spMkLst>
+        </pc:spChg>
+        <pc:grpChg chg="mod topLvl">
+          <ac:chgData name="Johann Bock Severin" userId="3b36179260fc8001" providerId="LiveId" clId="{C03BB677-E050-4623-A208-34D9F8363555}" dt="2023-10-23T08:37:18.250" v="261" actId="165"/>
+          <ac:grpSpMkLst>
+            <pc:docMk/>
+            <pc:sldMk cId="2845768841" sldId="260"/>
+            <ac:grpSpMk id="22" creationId="{1FD162D7-17F8-B458-EF88-EB9899C07A1D}"/>
+          </ac:grpSpMkLst>
+        </pc:grpChg>
+        <pc:grpChg chg="mod topLvl">
+          <ac:chgData name="Johann Bock Severin" userId="3b36179260fc8001" providerId="LiveId" clId="{C03BB677-E050-4623-A208-34D9F8363555}" dt="2023-10-23T08:37:18.250" v="261" actId="165"/>
+          <ac:grpSpMkLst>
+            <pc:docMk/>
+            <pc:sldMk cId="2845768841" sldId="260"/>
+            <ac:grpSpMk id="72" creationId="{F624F559-F909-CAE3-1732-405C4DC9035F}"/>
+          </ac:grpSpMkLst>
+        </pc:grpChg>
+        <pc:grpChg chg="add del mod">
+          <ac:chgData name="Johann Bock Severin" userId="3b36179260fc8001" providerId="LiveId" clId="{C03BB677-E050-4623-A208-34D9F8363555}" dt="2023-10-23T08:37:18.250" v="261" actId="165"/>
+          <ac:grpSpMkLst>
+            <pc:docMk/>
+            <pc:sldMk cId="2845768841" sldId="260"/>
+            <ac:grpSpMk id="76" creationId="{107718F0-5F0B-D431-5064-50BD9424D4C4}"/>
+          </ac:grpSpMkLst>
+        </pc:grpChg>
+        <pc:cxnChg chg="mod topLvl">
+          <ac:chgData name="Johann Bock Severin" userId="3b36179260fc8001" providerId="LiveId" clId="{C03BB677-E050-4623-A208-34D9F8363555}" dt="2023-10-23T08:37:18.250" v="261" actId="165"/>
+          <ac:cxnSpMkLst>
+            <pc:docMk/>
+            <pc:sldMk cId="2845768841" sldId="260"/>
+            <ac:cxnSpMk id="9" creationId="{52FCE10B-5C22-4207-4CA8-155C94710450}"/>
+          </ac:cxnSpMkLst>
+        </pc:cxnChg>
+        <pc:cxnChg chg="mod topLvl">
+          <ac:chgData name="Johann Bock Severin" userId="3b36179260fc8001" providerId="LiveId" clId="{C03BB677-E050-4623-A208-34D9F8363555}" dt="2023-10-23T08:37:18.250" v="261" actId="165"/>
+          <ac:cxnSpMkLst>
+            <pc:docMk/>
+            <pc:sldMk cId="2845768841" sldId="260"/>
+            <ac:cxnSpMk id="11" creationId="{E306E4C2-BEC6-17CA-2874-DA459E494760}"/>
+          </ac:cxnSpMkLst>
+        </pc:cxnChg>
+        <pc:cxnChg chg="mod topLvl">
+          <ac:chgData name="Johann Bock Severin" userId="3b36179260fc8001" providerId="LiveId" clId="{C03BB677-E050-4623-A208-34D9F8363555}" dt="2023-10-23T08:37:18.250" v="261" actId="165"/>
+          <ac:cxnSpMkLst>
+            <pc:docMk/>
+            <pc:sldMk cId="2845768841" sldId="260"/>
+            <ac:cxnSpMk id="15" creationId="{4E800688-6EF7-C483-A5A9-21F088388A1D}"/>
+          </ac:cxnSpMkLst>
+        </pc:cxnChg>
+        <pc:cxnChg chg="mod topLvl">
+          <ac:chgData name="Johann Bock Severin" userId="3b36179260fc8001" providerId="LiveId" clId="{C03BB677-E050-4623-A208-34D9F8363555}" dt="2023-10-23T08:37:18.250" v="261" actId="165"/>
+          <ac:cxnSpMkLst>
+            <pc:docMk/>
+            <pc:sldMk cId="2845768841" sldId="260"/>
+            <ac:cxnSpMk id="16" creationId="{95600A1E-DD0F-F93F-0183-8385E7CE23AE}"/>
+          </ac:cxnSpMkLst>
+        </pc:cxnChg>
+        <pc:cxnChg chg="mod">
+          <ac:chgData name="Johann Bock Severin" userId="3b36179260fc8001" providerId="LiveId" clId="{C03BB677-E050-4623-A208-34D9F8363555}" dt="2023-10-23T08:37:18.250" v="261" actId="165"/>
+          <ac:cxnSpMkLst>
+            <pc:docMk/>
+            <pc:sldMk cId="2845768841" sldId="260"/>
+            <ac:cxnSpMk id="17" creationId="{9470C6EF-15D3-6870-85DA-8915F48D2371}"/>
+          </ac:cxnSpMkLst>
+        </pc:cxnChg>
+        <pc:cxnChg chg="mod">
+          <ac:chgData name="Johann Bock Severin" userId="3b36179260fc8001" providerId="LiveId" clId="{C03BB677-E050-4623-A208-34D9F8363555}" dt="2023-10-23T08:37:18.250" v="261" actId="165"/>
+          <ac:cxnSpMkLst>
+            <pc:docMk/>
+            <pc:sldMk cId="2845768841" sldId="260"/>
+            <ac:cxnSpMk id="18" creationId="{A06D8CB9-F997-4ED1-0B8A-A81DEAD7BFE5}"/>
+          </ac:cxnSpMkLst>
+        </pc:cxnChg>
+        <pc:cxnChg chg="mod topLvl">
+          <ac:chgData name="Johann Bock Severin" userId="3b36179260fc8001" providerId="LiveId" clId="{C03BB677-E050-4623-A208-34D9F8363555}" dt="2023-10-23T08:37:18.250" v="261" actId="165"/>
+          <ac:cxnSpMkLst>
+            <pc:docMk/>
+            <pc:sldMk cId="2845768841" sldId="260"/>
+            <ac:cxnSpMk id="24" creationId="{A4ECEA47-1BE3-2F84-03C9-BE38F10F6EEB}"/>
+          </ac:cxnSpMkLst>
+        </pc:cxnChg>
+        <pc:cxnChg chg="mod topLvl">
+          <ac:chgData name="Johann Bock Severin" userId="3b36179260fc8001" providerId="LiveId" clId="{C03BB677-E050-4623-A208-34D9F8363555}" dt="2023-10-23T08:37:18.250" v="261" actId="165"/>
+          <ac:cxnSpMkLst>
+            <pc:docMk/>
+            <pc:sldMk cId="2845768841" sldId="260"/>
+            <ac:cxnSpMk id="26" creationId="{CD417901-E7B1-AB50-B20A-A66F2A93F328}"/>
+          </ac:cxnSpMkLst>
+        </pc:cxnChg>
+        <pc:cxnChg chg="mod topLvl">
+          <ac:chgData name="Johann Bock Severin" userId="3b36179260fc8001" providerId="LiveId" clId="{C03BB677-E050-4623-A208-34D9F8363555}" dt="2023-10-23T08:37:18.250" v="261" actId="165"/>
+          <ac:cxnSpMkLst>
+            <pc:docMk/>
+            <pc:sldMk cId="2845768841" sldId="260"/>
+            <ac:cxnSpMk id="27" creationId="{B6F57EC3-2C7B-9A1B-3D6F-B7EAE8FF958F}"/>
+          </ac:cxnSpMkLst>
+        </pc:cxnChg>
+        <pc:cxnChg chg="mod topLvl">
+          <ac:chgData name="Johann Bock Severin" userId="3b36179260fc8001" providerId="LiveId" clId="{C03BB677-E050-4623-A208-34D9F8363555}" dt="2023-10-23T08:37:18.250" v="261" actId="165"/>
+          <ac:cxnSpMkLst>
+            <pc:docMk/>
+            <pc:sldMk cId="2845768841" sldId="260"/>
+            <ac:cxnSpMk id="31" creationId="{52704B50-1134-9B3D-454B-CEBFD849175C}"/>
+          </ac:cxnSpMkLst>
+        </pc:cxnChg>
+        <pc:cxnChg chg="mod topLvl">
+          <ac:chgData name="Johann Bock Severin" userId="3b36179260fc8001" providerId="LiveId" clId="{C03BB677-E050-4623-A208-34D9F8363555}" dt="2023-10-23T08:37:18.250" v="261" actId="165"/>
+          <ac:cxnSpMkLst>
+            <pc:docMk/>
+            <pc:sldMk cId="2845768841" sldId="260"/>
+            <ac:cxnSpMk id="69" creationId="{B14C8072-9F81-7D1B-C042-5EF5D65FB1D0}"/>
+          </ac:cxnSpMkLst>
+        </pc:cxnChg>
+        <pc:cxnChg chg="mod">
+          <ac:chgData name="Johann Bock Severin" userId="3b36179260fc8001" providerId="LiveId" clId="{C03BB677-E050-4623-A208-34D9F8363555}" dt="2023-10-23T08:37:18.250" v="261" actId="165"/>
+          <ac:cxnSpMkLst>
+            <pc:docMk/>
+            <pc:sldMk cId="2845768841" sldId="260"/>
+            <ac:cxnSpMk id="73" creationId="{69C797AE-A21D-81DA-8CAA-10C67A319098}"/>
+          </ac:cxnSpMkLst>
+        </pc:cxnChg>
+        <pc:cxnChg chg="mod">
+          <ac:chgData name="Johann Bock Severin" userId="3b36179260fc8001" providerId="LiveId" clId="{C03BB677-E050-4623-A208-34D9F8363555}" dt="2023-10-23T08:37:18.250" v="261" actId="165"/>
+          <ac:cxnSpMkLst>
+            <pc:docMk/>
+            <pc:sldMk cId="2845768841" sldId="260"/>
+            <ac:cxnSpMk id="74" creationId="{48F28497-4A1A-3702-2BEC-1AE70091B521}"/>
+          </ac:cxnSpMkLst>
+        </pc:cxnChg>
+      </pc:sldChg>
       <pc:sldChg chg="addSp delSp modSp mod">
         <pc:chgData name="Johann Bock Severin" userId="3b36179260fc8001" providerId="LiveId" clId="{C03BB677-E050-4623-A208-34D9F8363555}" dt="2023-10-19T07:38:20.567" v="157" actId="1076"/>
         <pc:sldMkLst>
@@ -5893,7 +6116,7 @@
           <a:p>
             <a:fld id="{53BF19A1-7C9B-4536-8619-E606248327B6}" type="datetimeFigureOut">
               <a:rPr lang="en-DK" smtClean="0"/>
-              <a:t>19/10/2023</a:t>
+              <a:t>23/10/2023</a:t>
             </a:fld>
             <a:endParaRPr lang="en-DK"/>
           </a:p>
@@ -6310,7 +6533,7 @@
           <a:p>
             <a:fld id="{B21175D6-FCE9-4988-8B6E-5CB52F8DC15C}" type="datetimeFigureOut">
               <a:rPr lang="en-DK" smtClean="0"/>
-              <a:t>19/10/2023</a:t>
+              <a:t>23/10/2023</a:t>
             </a:fld>
             <a:endParaRPr lang="en-DK"/>
           </a:p>
@@ -6510,7 +6733,7 @@
           <a:p>
             <a:fld id="{B21175D6-FCE9-4988-8B6E-5CB52F8DC15C}" type="datetimeFigureOut">
               <a:rPr lang="en-DK" smtClean="0"/>
-              <a:t>19/10/2023</a:t>
+              <a:t>23/10/2023</a:t>
             </a:fld>
             <a:endParaRPr lang="en-DK"/>
           </a:p>
@@ -6720,7 +6943,7 @@
           <a:p>
             <a:fld id="{B21175D6-FCE9-4988-8B6E-5CB52F8DC15C}" type="datetimeFigureOut">
               <a:rPr lang="en-DK" smtClean="0"/>
-              <a:t>19/10/2023</a:t>
+              <a:t>23/10/2023</a:t>
             </a:fld>
             <a:endParaRPr lang="en-DK"/>
           </a:p>
@@ -6920,7 +7143,7 @@
           <a:p>
             <a:fld id="{B21175D6-FCE9-4988-8B6E-5CB52F8DC15C}" type="datetimeFigureOut">
               <a:rPr lang="en-DK" smtClean="0"/>
-              <a:t>19/10/2023</a:t>
+              <a:t>23/10/2023</a:t>
             </a:fld>
             <a:endParaRPr lang="en-DK"/>
           </a:p>
@@ -7196,7 +7419,7 @@
           <a:p>
             <a:fld id="{B21175D6-FCE9-4988-8B6E-5CB52F8DC15C}" type="datetimeFigureOut">
               <a:rPr lang="en-DK" smtClean="0"/>
-              <a:t>19/10/2023</a:t>
+              <a:t>23/10/2023</a:t>
             </a:fld>
             <a:endParaRPr lang="en-DK"/>
           </a:p>
@@ -7464,7 +7687,7 @@
           <a:p>
             <a:fld id="{B21175D6-FCE9-4988-8B6E-5CB52F8DC15C}" type="datetimeFigureOut">
               <a:rPr lang="en-DK" smtClean="0"/>
-              <a:t>19/10/2023</a:t>
+              <a:t>23/10/2023</a:t>
             </a:fld>
             <a:endParaRPr lang="en-DK"/>
           </a:p>
@@ -7879,7 +8102,7 @@
           <a:p>
             <a:fld id="{B21175D6-FCE9-4988-8B6E-5CB52F8DC15C}" type="datetimeFigureOut">
               <a:rPr lang="en-DK" smtClean="0"/>
-              <a:t>19/10/2023</a:t>
+              <a:t>23/10/2023</a:t>
             </a:fld>
             <a:endParaRPr lang="en-DK"/>
           </a:p>
@@ -8021,7 +8244,7 @@
           <a:p>
             <a:fld id="{B21175D6-FCE9-4988-8B6E-5CB52F8DC15C}" type="datetimeFigureOut">
               <a:rPr lang="en-DK" smtClean="0"/>
-              <a:t>19/10/2023</a:t>
+              <a:t>23/10/2023</a:t>
             </a:fld>
             <a:endParaRPr lang="en-DK"/>
           </a:p>
@@ -8134,7 +8357,7 @@
           <a:p>
             <a:fld id="{B21175D6-FCE9-4988-8B6E-5CB52F8DC15C}" type="datetimeFigureOut">
               <a:rPr lang="en-DK" smtClean="0"/>
-              <a:t>19/10/2023</a:t>
+              <a:t>23/10/2023</a:t>
             </a:fld>
             <a:endParaRPr lang="en-DK"/>
           </a:p>
@@ -8447,7 +8670,7 @@
           <a:p>
             <a:fld id="{B21175D6-FCE9-4988-8B6E-5CB52F8DC15C}" type="datetimeFigureOut">
               <a:rPr lang="en-DK" smtClean="0"/>
-              <a:t>19/10/2023</a:t>
+              <a:t>23/10/2023</a:t>
             </a:fld>
             <a:endParaRPr lang="en-DK"/>
           </a:p>
@@ -8736,7 +8959,7 @@
           <a:p>
             <a:fld id="{B21175D6-FCE9-4988-8B6E-5CB52F8DC15C}" type="datetimeFigureOut">
               <a:rPr lang="en-DK" smtClean="0"/>
-              <a:t>19/10/2023</a:t>
+              <a:t>23/10/2023</a:t>
             </a:fld>
             <a:endParaRPr lang="en-DK"/>
           </a:p>
@@ -8979,7 +9202,7 @@
           <a:p>
             <a:fld id="{B21175D6-FCE9-4988-8B6E-5CB52F8DC15C}" type="datetimeFigureOut">
               <a:rPr lang="en-DK" smtClean="0"/>
-              <a:t>19/10/2023</a:t>
+              <a:t>23/10/2023</a:t>
             </a:fld>
             <a:endParaRPr lang="en-DK"/>
           </a:p>
@@ -9396,12 +9619,270 @@
           <a:chExt cx="0" cy="0"/>
         </a:xfrm>
       </p:grpSpPr>
+      <p:sp>
+        <p:nvSpPr>
+          <p:cNvPr id="3" name="Rectangle 2">
+            <a:extLst>
+              <a:ext uri="{FF2B5EF4-FFF2-40B4-BE49-F238E27FC236}">
+                <a16:creationId xmlns:a16="http://schemas.microsoft.com/office/drawing/2014/main" id="{518BCE2B-DC1A-C07B-A697-CD9F8D1B8CFA}"/>
+              </a:ext>
+            </a:extLst>
+          </p:cNvPr>
+          <p:cNvSpPr/>
+          <p:nvPr/>
+        </p:nvSpPr>
+        <p:spPr>
+          <a:xfrm>
+            <a:off x="3836775" y="2736030"/>
+            <a:ext cx="1531214" cy="1531214"/>
+          </a:xfrm>
+          <a:prstGeom prst="rect">
+            <a:avLst/>
+          </a:prstGeom>
+          <a:noFill/>
+          <a:ln w="38100">
+            <a:solidFill>
+              <a:schemeClr val="tx2"/>
+            </a:solidFill>
+          </a:ln>
+        </p:spPr>
+        <p:style>
+          <a:lnRef idx="2">
+            <a:schemeClr val="accent1">
+              <a:shade val="50000"/>
+            </a:schemeClr>
+          </a:lnRef>
+          <a:fillRef idx="1">
+            <a:schemeClr val="accent1"/>
+          </a:fillRef>
+          <a:effectRef idx="0">
+            <a:schemeClr val="accent1"/>
+          </a:effectRef>
+          <a:fontRef idx="minor">
+            <a:schemeClr val="lt1"/>
+          </a:fontRef>
+        </p:style>
+        <p:txBody>
+          <a:bodyPr rtlCol="0" anchor="ctr"/>
+          <a:lstStyle/>
+          <a:p>
+            <a:pPr algn="ctr"/>
+            <a:endParaRPr lang="en-DK"/>
+          </a:p>
+        </p:txBody>
+      </p:sp>
+      <p:cxnSp>
+        <p:nvCxnSpPr>
+          <p:cNvPr id="9" name="Straight Connector 8">
+            <a:extLst>
+              <a:ext uri="{FF2B5EF4-FFF2-40B4-BE49-F238E27FC236}">
+                <a16:creationId xmlns:a16="http://schemas.microsoft.com/office/drawing/2014/main" id="{52FCE10B-5C22-4207-4CA8-155C94710450}"/>
+              </a:ext>
+            </a:extLst>
+          </p:cNvPr>
+          <p:cNvCxnSpPr/>
+          <p:nvPr/>
+        </p:nvCxnSpPr>
+        <p:spPr>
+          <a:xfrm>
+            <a:off x="3592662" y="3514049"/>
+            <a:ext cx="450993" cy="0"/>
+          </a:xfrm>
+          <a:prstGeom prst="line">
+            <a:avLst/>
+          </a:prstGeom>
+          <a:ln w="38100"/>
+        </p:spPr>
+        <p:style>
+          <a:lnRef idx="1">
+            <a:schemeClr val="accent1"/>
+          </a:lnRef>
+          <a:fillRef idx="0">
+            <a:schemeClr val="accent1"/>
+          </a:fillRef>
+          <a:effectRef idx="0">
+            <a:schemeClr val="accent1"/>
+          </a:effectRef>
+          <a:fontRef idx="minor">
+            <a:schemeClr val="tx1"/>
+          </a:fontRef>
+        </p:style>
+      </p:cxnSp>
+      <p:cxnSp>
+        <p:nvCxnSpPr>
+          <p:cNvPr id="11" name="Straight Connector 10">
+            <a:extLst>
+              <a:ext uri="{FF2B5EF4-FFF2-40B4-BE49-F238E27FC236}">
+                <a16:creationId xmlns:a16="http://schemas.microsoft.com/office/drawing/2014/main" id="{E306E4C2-BEC6-17CA-2874-DA459E494760}"/>
+              </a:ext>
+            </a:extLst>
+          </p:cNvPr>
+          <p:cNvCxnSpPr/>
+          <p:nvPr/>
+        </p:nvCxnSpPr>
+        <p:spPr>
+          <a:xfrm>
+            <a:off x="3592662" y="3389922"/>
+            <a:ext cx="450993" cy="0"/>
+          </a:xfrm>
+          <a:prstGeom prst="line">
+            <a:avLst/>
+          </a:prstGeom>
+          <a:ln w="38100"/>
+        </p:spPr>
+        <p:style>
+          <a:lnRef idx="1">
+            <a:schemeClr val="accent1"/>
+          </a:lnRef>
+          <a:fillRef idx="0">
+            <a:schemeClr val="accent1"/>
+          </a:fillRef>
+          <a:effectRef idx="0">
+            <a:schemeClr val="accent1"/>
+          </a:effectRef>
+          <a:fontRef idx="minor">
+            <a:schemeClr val="tx1"/>
+          </a:fontRef>
+        </p:style>
+      </p:cxnSp>
+      <p:sp>
+        <p:nvSpPr>
+          <p:cNvPr id="12" name="Rectangle 11">
+            <a:extLst>
+              <a:ext uri="{FF2B5EF4-FFF2-40B4-BE49-F238E27FC236}">
+                <a16:creationId xmlns:a16="http://schemas.microsoft.com/office/drawing/2014/main" id="{F217EFA6-9729-D04F-9C0F-DFC38083C799}"/>
+              </a:ext>
+            </a:extLst>
+          </p:cNvPr>
+          <p:cNvSpPr/>
+          <p:nvPr/>
+        </p:nvSpPr>
+        <p:spPr>
+          <a:xfrm>
+            <a:off x="3558625" y="3409231"/>
+            <a:ext cx="556300" cy="85509"/>
+          </a:xfrm>
+          <a:prstGeom prst="rect">
+            <a:avLst/>
+          </a:prstGeom>
+          <a:solidFill>
+            <a:schemeClr val="bg1"/>
+          </a:solidFill>
+          <a:ln>
+            <a:solidFill>
+              <a:schemeClr val="bg1"/>
+            </a:solidFill>
+          </a:ln>
+        </p:spPr>
+        <p:style>
+          <a:lnRef idx="2">
+            <a:schemeClr val="accent1">
+              <a:shade val="50000"/>
+            </a:schemeClr>
+          </a:lnRef>
+          <a:fillRef idx="1">
+            <a:schemeClr val="accent1"/>
+          </a:fillRef>
+          <a:effectRef idx="0">
+            <a:schemeClr val="accent1"/>
+          </a:effectRef>
+          <a:fontRef idx="minor">
+            <a:schemeClr val="lt1"/>
+          </a:fontRef>
+        </p:style>
+        <p:txBody>
+          <a:bodyPr rtlCol="0" anchor="ctr"/>
+          <a:lstStyle/>
+          <a:p>
+            <a:pPr algn="ctr"/>
+            <a:endParaRPr lang="en-DK" dirty="0"/>
+          </a:p>
+        </p:txBody>
+      </p:sp>
+      <p:cxnSp>
+        <p:nvCxnSpPr>
+          <p:cNvPr id="15" name="Straight Connector 14">
+            <a:extLst>
+              <a:ext uri="{FF2B5EF4-FFF2-40B4-BE49-F238E27FC236}">
+                <a16:creationId xmlns:a16="http://schemas.microsoft.com/office/drawing/2014/main" id="{4E800688-6EF7-C483-A5A9-21F088388A1D}"/>
+              </a:ext>
+            </a:extLst>
+          </p:cNvPr>
+          <p:cNvCxnSpPr>
+            <a:cxnSpLocks/>
+          </p:cNvCxnSpPr>
+          <p:nvPr/>
+        </p:nvCxnSpPr>
+        <p:spPr>
+          <a:xfrm rot="2700000">
+            <a:off x="5142493" y="3436695"/>
+            <a:ext cx="450993" cy="0"/>
+          </a:xfrm>
+          <a:prstGeom prst="line">
+            <a:avLst/>
+          </a:prstGeom>
+          <a:ln w="38100"/>
+        </p:spPr>
+        <p:style>
+          <a:lnRef idx="1">
+            <a:schemeClr val="accent1"/>
+          </a:lnRef>
+          <a:fillRef idx="0">
+            <a:schemeClr val="accent1"/>
+          </a:fillRef>
+          <a:effectRef idx="0">
+            <a:schemeClr val="accent1"/>
+          </a:effectRef>
+          <a:fontRef idx="minor">
+            <a:schemeClr val="tx1"/>
+          </a:fontRef>
+        </p:style>
+      </p:cxnSp>
+      <p:cxnSp>
+        <p:nvCxnSpPr>
+          <p:cNvPr id="16" name="Straight Connector 15">
+            <a:extLst>
+              <a:ext uri="{FF2B5EF4-FFF2-40B4-BE49-F238E27FC236}">
+                <a16:creationId xmlns:a16="http://schemas.microsoft.com/office/drawing/2014/main" id="{95600A1E-DD0F-F93F-0183-8385E7CE23AE}"/>
+              </a:ext>
+            </a:extLst>
+          </p:cNvPr>
+          <p:cNvCxnSpPr>
+            <a:cxnSpLocks/>
+          </p:cNvCxnSpPr>
+          <p:nvPr/>
+        </p:nvCxnSpPr>
+        <p:spPr>
+          <a:xfrm rot="18900000" flipH="1">
+            <a:off x="5142492" y="3436696"/>
+            <a:ext cx="450993" cy="0"/>
+          </a:xfrm>
+          <a:prstGeom prst="line">
+            <a:avLst/>
+          </a:prstGeom>
+          <a:ln w="38100"/>
+        </p:spPr>
+        <p:style>
+          <a:lnRef idx="1">
+            <a:schemeClr val="accent1"/>
+          </a:lnRef>
+          <a:fillRef idx="0">
+            <a:schemeClr val="accent1"/>
+          </a:fillRef>
+          <a:effectRef idx="0">
+            <a:schemeClr val="accent1"/>
+          </a:effectRef>
+          <a:fontRef idx="minor">
+            <a:schemeClr val="tx1"/>
+          </a:fontRef>
+        </p:style>
+      </p:cxnSp>
       <p:grpSp>
         <p:nvGrpSpPr>
-          <p:cNvPr id="76" name="Group 75">
+          <p:cNvPr id="22" name="Group 21">
             <a:extLst>
               <a:ext uri="{FF2B5EF4-FFF2-40B4-BE49-F238E27FC236}">
-                <a16:creationId xmlns:a16="http://schemas.microsoft.com/office/drawing/2014/main" id="{107718F0-5F0B-D431-5064-50BD9424D4C4}"/>
+                <a16:creationId xmlns:a16="http://schemas.microsoft.com/office/drawing/2014/main" id="{1FD162D7-17F8-B458-EF88-EB9899C07A1D}"/>
               </a:ext>
             </a:extLst>
           </p:cNvPr>
@@ -9409,80 +9890,30 @@
           <p:nvPr/>
         </p:nvGrpSpPr>
         <p:grpSpPr>
-          <a:xfrm>
-            <a:off x="3558625" y="1243327"/>
-            <a:ext cx="4788910" cy="3023917"/>
-            <a:chOff x="3219319" y="1536625"/>
-            <a:chExt cx="4788910" cy="3023917"/>
+          <a:xfrm rot="5400000">
+            <a:off x="5979304" y="2132664"/>
+            <a:ext cx="556300" cy="124127"/>
+            <a:chOff x="8257117" y="1115678"/>
+            <a:chExt cx="556300" cy="124127"/>
           </a:xfrm>
         </p:grpSpPr>
-        <p:sp>
-          <p:nvSpPr>
-            <p:cNvPr id="3" name="Rectangle 2">
+        <p:cxnSp>
+          <p:nvCxnSpPr>
+            <p:cNvPr id="17" name="Straight Connector 16">
               <a:extLst>
                 <a:ext uri="{FF2B5EF4-FFF2-40B4-BE49-F238E27FC236}">
-                  <a16:creationId xmlns:a16="http://schemas.microsoft.com/office/drawing/2014/main" id="{518BCE2B-DC1A-C07B-A697-CD9F8D1B8CFA}"/>
+                  <a16:creationId xmlns:a16="http://schemas.microsoft.com/office/drawing/2014/main" id="{9470C6EF-15D3-6870-85DA-8915F48D2371}"/>
                 </a:ext>
               </a:extLst>
             </p:cNvPr>
-            <p:cNvSpPr/>
-            <p:nvPr/>
-          </p:nvSpPr>
-          <p:spPr>
-            <a:xfrm>
-              <a:off x="3497469" y="3029328"/>
-              <a:ext cx="1531214" cy="1531214"/>
-            </a:xfrm>
-            <a:prstGeom prst="rect">
-              <a:avLst/>
-            </a:prstGeom>
-            <a:noFill/>
-            <a:ln w="38100">
-              <a:solidFill>
-                <a:schemeClr val="tx2"/>
-              </a:solidFill>
-            </a:ln>
-          </p:spPr>
-          <p:style>
-            <a:lnRef idx="2">
-              <a:schemeClr val="accent1">
-                <a:shade val="50000"/>
-              </a:schemeClr>
-            </a:lnRef>
-            <a:fillRef idx="1">
-              <a:schemeClr val="accent1"/>
-            </a:fillRef>
-            <a:effectRef idx="0">
-              <a:schemeClr val="accent1"/>
-            </a:effectRef>
-            <a:fontRef idx="minor">
-              <a:schemeClr val="lt1"/>
-            </a:fontRef>
-          </p:style>
-          <p:txBody>
-            <a:bodyPr rtlCol="0" anchor="ctr"/>
-            <a:lstStyle/>
-            <a:p>
-              <a:pPr algn="ctr"/>
-              <a:endParaRPr lang="en-DK"/>
-            </a:p>
-          </p:txBody>
-        </p:sp>
-        <p:cxnSp>
-          <p:nvCxnSpPr>
-            <p:cNvPr id="9" name="Straight Connector 8">
-              <a:extLst>
-                <a:ext uri="{FF2B5EF4-FFF2-40B4-BE49-F238E27FC236}">
-                  <a16:creationId xmlns:a16="http://schemas.microsoft.com/office/drawing/2014/main" id="{52FCE10B-5C22-4207-4CA8-155C94710450}"/>
-                </a:ext>
-              </a:extLst>
-            </p:cNvPr>
-            <p:cNvCxnSpPr/>
+            <p:cNvCxnSpPr>
+              <a:cxnSpLocks/>
+            </p:cNvCxnSpPr>
             <p:nvPr/>
           </p:nvCxnSpPr>
           <p:spPr>
             <a:xfrm>
-              <a:off x="3253356" y="3807347"/>
+              <a:off x="8291154" y="1239805"/>
               <a:ext cx="450993" cy="0"/>
             </a:xfrm>
             <a:prstGeom prst="line">
@@ -9507,19 +9938,21 @@
         </p:cxnSp>
         <p:cxnSp>
           <p:nvCxnSpPr>
-            <p:cNvPr id="11" name="Straight Connector 10">
+            <p:cNvPr id="18" name="Straight Connector 17">
               <a:extLst>
                 <a:ext uri="{FF2B5EF4-FFF2-40B4-BE49-F238E27FC236}">
-                  <a16:creationId xmlns:a16="http://schemas.microsoft.com/office/drawing/2014/main" id="{E306E4C2-BEC6-17CA-2874-DA459E494760}"/>
+                  <a16:creationId xmlns:a16="http://schemas.microsoft.com/office/drawing/2014/main" id="{A06D8CB9-F997-4ED1-0B8A-A81DEAD7BFE5}"/>
                 </a:ext>
               </a:extLst>
             </p:cNvPr>
-            <p:cNvCxnSpPr/>
+            <p:cNvCxnSpPr>
+              <a:cxnSpLocks/>
+            </p:cNvCxnSpPr>
             <p:nvPr/>
           </p:nvCxnSpPr>
           <p:spPr>
             <a:xfrm>
-              <a:off x="3253356" y="3683220"/>
+              <a:off x="8291154" y="1115678"/>
               <a:ext cx="450993" cy="0"/>
             </a:xfrm>
             <a:prstGeom prst="line">
@@ -9544,10 +9977,10 @@
         </p:cxnSp>
         <p:sp>
           <p:nvSpPr>
-            <p:cNvPr id="12" name="Rectangle 11">
+            <p:cNvPr id="19" name="Rectangle 18">
               <a:extLst>
                 <a:ext uri="{FF2B5EF4-FFF2-40B4-BE49-F238E27FC236}">
-                  <a16:creationId xmlns:a16="http://schemas.microsoft.com/office/drawing/2014/main" id="{F217EFA6-9729-D04F-9C0F-DFC38083C799}"/>
+                  <a16:creationId xmlns:a16="http://schemas.microsoft.com/office/drawing/2014/main" id="{CFEEF5C5-3798-D49C-DF44-8D871F9A8F84}"/>
                 </a:ext>
               </a:extLst>
             </p:cNvPr>
@@ -9556,7 +9989,7 @@
           </p:nvSpPr>
           <p:spPr>
             <a:xfrm>
-              <a:off x="3219319" y="3702529"/>
+              <a:off x="8257117" y="1134987"/>
               <a:ext cx="556300" cy="85509"/>
             </a:xfrm>
             <a:prstGeom prst="rect">
@@ -9596,12 +10029,772 @@
             </a:p>
           </p:txBody>
         </p:sp>
+      </p:grpSp>
+      <p:cxnSp>
+        <p:nvCxnSpPr>
+          <p:cNvPr id="24" name="Connector: Elbow 23">
+            <a:extLst>
+              <a:ext uri="{FF2B5EF4-FFF2-40B4-BE49-F238E27FC236}">
+                <a16:creationId xmlns:a16="http://schemas.microsoft.com/office/drawing/2014/main" id="{A4ECEA47-1BE3-2F84-03C9-BE38F10F6EEB}"/>
+              </a:ext>
+            </a:extLst>
+          </p:cNvPr>
+          <p:cNvCxnSpPr>
+            <a:cxnSpLocks/>
+          </p:cNvCxnSpPr>
+          <p:nvPr/>
+        </p:nvCxnSpPr>
+        <p:spPr>
+          <a:xfrm rot="5400000" flipH="1" flipV="1">
+            <a:off x="5106992" y="1659176"/>
+            <a:ext cx="541302" cy="1612318"/>
+          </a:xfrm>
+          <a:prstGeom prst="bentConnector2">
+            <a:avLst/>
+          </a:prstGeom>
+          <a:ln w="38100"/>
+        </p:spPr>
+        <p:style>
+          <a:lnRef idx="1">
+            <a:schemeClr val="accent1"/>
+          </a:lnRef>
+          <a:fillRef idx="0">
+            <a:schemeClr val="accent1"/>
+          </a:fillRef>
+          <a:effectRef idx="0">
+            <a:schemeClr val="accent1"/>
+          </a:effectRef>
+          <a:fontRef idx="minor">
+            <a:schemeClr val="tx1"/>
+          </a:fontRef>
+        </p:style>
+      </p:cxnSp>
+      <p:sp>
+        <p:nvSpPr>
+          <p:cNvPr id="25" name="Rectangle 24">
+            <a:extLst>
+              <a:ext uri="{FF2B5EF4-FFF2-40B4-BE49-F238E27FC236}">
+                <a16:creationId xmlns:a16="http://schemas.microsoft.com/office/drawing/2014/main" id="{5C026F19-6499-9D9A-74FD-900128C35E91}"/>
+              </a:ext>
+            </a:extLst>
+          </p:cNvPr>
+          <p:cNvSpPr/>
+          <p:nvPr/>
+        </p:nvSpPr>
+        <p:spPr>
+          <a:xfrm flipH="1">
+            <a:off x="6538171" y="2721440"/>
+            <a:ext cx="1531214" cy="1531214"/>
+          </a:xfrm>
+          <a:prstGeom prst="rect">
+            <a:avLst/>
+          </a:prstGeom>
+          <a:noFill/>
+          <a:ln w="38100">
+            <a:solidFill>
+              <a:schemeClr val="tx2"/>
+            </a:solidFill>
+          </a:ln>
+        </p:spPr>
+        <p:style>
+          <a:lnRef idx="2">
+            <a:schemeClr val="accent1">
+              <a:shade val="50000"/>
+            </a:schemeClr>
+          </a:lnRef>
+          <a:fillRef idx="1">
+            <a:schemeClr val="accent1"/>
+          </a:fillRef>
+          <a:effectRef idx="0">
+            <a:schemeClr val="accent1"/>
+          </a:effectRef>
+          <a:fontRef idx="minor">
+            <a:schemeClr val="lt1"/>
+          </a:fontRef>
+        </p:style>
+        <p:txBody>
+          <a:bodyPr rtlCol="0" anchor="ctr"/>
+          <a:lstStyle/>
+          <a:p>
+            <a:pPr algn="ctr"/>
+            <a:endParaRPr lang="en-DK"/>
+          </a:p>
+        </p:txBody>
+      </p:sp>
+      <p:cxnSp>
+        <p:nvCxnSpPr>
+          <p:cNvPr id="26" name="Straight Connector 25">
+            <a:extLst>
+              <a:ext uri="{FF2B5EF4-FFF2-40B4-BE49-F238E27FC236}">
+                <a16:creationId xmlns:a16="http://schemas.microsoft.com/office/drawing/2014/main" id="{CD417901-E7B1-AB50-B20A-A66F2A93F328}"/>
+              </a:ext>
+            </a:extLst>
+          </p:cNvPr>
+          <p:cNvCxnSpPr>
+            <a:cxnSpLocks/>
+          </p:cNvCxnSpPr>
+          <p:nvPr/>
+        </p:nvCxnSpPr>
+        <p:spPr>
+          <a:xfrm flipH="1">
+            <a:off x="7862505" y="3499459"/>
+            <a:ext cx="450993" cy="0"/>
+          </a:xfrm>
+          <a:prstGeom prst="line">
+            <a:avLst/>
+          </a:prstGeom>
+          <a:ln w="38100"/>
+        </p:spPr>
+        <p:style>
+          <a:lnRef idx="1">
+            <a:schemeClr val="accent1"/>
+          </a:lnRef>
+          <a:fillRef idx="0">
+            <a:schemeClr val="accent1"/>
+          </a:fillRef>
+          <a:effectRef idx="0">
+            <a:schemeClr val="accent1"/>
+          </a:effectRef>
+          <a:fontRef idx="minor">
+            <a:schemeClr val="tx1"/>
+          </a:fontRef>
+        </p:style>
+      </p:cxnSp>
+      <p:cxnSp>
+        <p:nvCxnSpPr>
+          <p:cNvPr id="27" name="Straight Connector 26">
+            <a:extLst>
+              <a:ext uri="{FF2B5EF4-FFF2-40B4-BE49-F238E27FC236}">
+                <a16:creationId xmlns:a16="http://schemas.microsoft.com/office/drawing/2014/main" id="{B6F57EC3-2C7B-9A1B-3D6F-B7EAE8FF958F}"/>
+              </a:ext>
+            </a:extLst>
+          </p:cNvPr>
+          <p:cNvCxnSpPr>
+            <a:cxnSpLocks/>
+          </p:cNvCxnSpPr>
+          <p:nvPr/>
+        </p:nvCxnSpPr>
+        <p:spPr>
+          <a:xfrm flipH="1">
+            <a:off x="7862505" y="3375332"/>
+            <a:ext cx="450993" cy="0"/>
+          </a:xfrm>
+          <a:prstGeom prst="line">
+            <a:avLst/>
+          </a:prstGeom>
+          <a:ln w="38100"/>
+        </p:spPr>
+        <p:style>
+          <a:lnRef idx="1">
+            <a:schemeClr val="accent1"/>
+          </a:lnRef>
+          <a:fillRef idx="0">
+            <a:schemeClr val="accent1"/>
+          </a:fillRef>
+          <a:effectRef idx="0">
+            <a:schemeClr val="accent1"/>
+          </a:effectRef>
+          <a:fontRef idx="minor">
+            <a:schemeClr val="tx1"/>
+          </a:fontRef>
+        </p:style>
+      </p:cxnSp>
+      <p:sp>
+        <p:nvSpPr>
+          <p:cNvPr id="28" name="Rectangle 27">
+            <a:extLst>
+              <a:ext uri="{FF2B5EF4-FFF2-40B4-BE49-F238E27FC236}">
+                <a16:creationId xmlns:a16="http://schemas.microsoft.com/office/drawing/2014/main" id="{34A23BE5-BB45-AB13-4F45-8D3E7E980432}"/>
+              </a:ext>
+            </a:extLst>
+          </p:cNvPr>
+          <p:cNvSpPr/>
+          <p:nvPr/>
+        </p:nvSpPr>
+        <p:spPr>
+          <a:xfrm flipH="1">
+            <a:off x="7791235" y="3394641"/>
+            <a:ext cx="556300" cy="85509"/>
+          </a:xfrm>
+          <a:prstGeom prst="rect">
+            <a:avLst/>
+          </a:prstGeom>
+          <a:solidFill>
+            <a:schemeClr val="bg1"/>
+          </a:solidFill>
+          <a:ln>
+            <a:solidFill>
+              <a:schemeClr val="bg1"/>
+            </a:solidFill>
+          </a:ln>
+        </p:spPr>
+        <p:style>
+          <a:lnRef idx="2">
+            <a:schemeClr val="accent1">
+              <a:shade val="50000"/>
+            </a:schemeClr>
+          </a:lnRef>
+          <a:fillRef idx="1">
+            <a:schemeClr val="accent1"/>
+          </a:fillRef>
+          <a:effectRef idx="0">
+            <a:schemeClr val="accent1"/>
+          </a:effectRef>
+          <a:fontRef idx="minor">
+            <a:schemeClr val="lt1"/>
+          </a:fontRef>
+        </p:style>
+        <p:txBody>
+          <a:bodyPr rtlCol="0" anchor="ctr"/>
+          <a:lstStyle/>
+          <a:p>
+            <a:pPr algn="ctr"/>
+            <a:endParaRPr lang="en-DK" dirty="0"/>
+          </a:p>
+        </p:txBody>
+      </p:sp>
+      <p:cxnSp>
+        <p:nvCxnSpPr>
+          <p:cNvPr id="31" name="Connector: Elbow 30">
+            <a:extLst>
+              <a:ext uri="{FF2B5EF4-FFF2-40B4-BE49-F238E27FC236}">
+                <a16:creationId xmlns:a16="http://schemas.microsoft.com/office/drawing/2014/main" id="{52704B50-1134-9B3D-454B-CEBFD849175C}"/>
+              </a:ext>
+            </a:extLst>
+          </p:cNvPr>
+          <p:cNvCxnSpPr>
+            <a:cxnSpLocks/>
+          </p:cNvCxnSpPr>
+          <p:nvPr/>
+        </p:nvCxnSpPr>
+        <p:spPr>
+          <a:xfrm rot="10800000">
+            <a:off x="6338827" y="2194684"/>
+            <a:ext cx="1593009" cy="526712"/>
+          </a:xfrm>
+          <a:prstGeom prst="bentConnector3">
+            <a:avLst>
+              <a:gd name="adj1" fmla="val 50000"/>
+            </a:avLst>
+          </a:prstGeom>
+          <a:ln w="38100"/>
+        </p:spPr>
+        <p:style>
+          <a:lnRef idx="1">
+            <a:schemeClr val="accent1"/>
+          </a:lnRef>
+          <a:fillRef idx="0">
+            <a:schemeClr val="accent1"/>
+          </a:fillRef>
+          <a:effectRef idx="0">
+            <a:schemeClr val="accent1"/>
+          </a:effectRef>
+          <a:fontRef idx="minor">
+            <a:schemeClr val="tx1"/>
+          </a:fontRef>
+        </p:style>
+      </p:cxnSp>
+      <p:sp>
+        <p:nvSpPr>
+          <p:cNvPr id="39" name="Rectangle 38">
+            <a:extLst>
+              <a:ext uri="{FF2B5EF4-FFF2-40B4-BE49-F238E27FC236}">
+                <a16:creationId xmlns:a16="http://schemas.microsoft.com/office/drawing/2014/main" id="{45954C39-762E-7D28-F6DB-5379FBB2C7E2}"/>
+              </a:ext>
+            </a:extLst>
+          </p:cNvPr>
+          <p:cNvSpPr/>
+          <p:nvPr/>
+        </p:nvSpPr>
+        <p:spPr>
+          <a:xfrm rot="5400000" flipH="1">
+            <a:off x="6264102" y="3366476"/>
+            <a:ext cx="556300" cy="85509"/>
+          </a:xfrm>
+          <a:prstGeom prst="rect">
+            <a:avLst/>
+          </a:prstGeom>
+          <a:solidFill>
+            <a:schemeClr val="bg1"/>
+          </a:solidFill>
+          <a:ln>
+            <a:solidFill>
+              <a:schemeClr val="bg1"/>
+            </a:solidFill>
+          </a:ln>
+        </p:spPr>
+        <p:style>
+          <a:lnRef idx="2">
+            <a:schemeClr val="accent1">
+              <a:shade val="50000"/>
+            </a:schemeClr>
+          </a:lnRef>
+          <a:fillRef idx="1">
+            <a:schemeClr val="accent1"/>
+          </a:fillRef>
+          <a:effectRef idx="0">
+            <a:schemeClr val="accent1"/>
+          </a:effectRef>
+          <a:fontRef idx="minor">
+            <a:schemeClr val="lt1"/>
+          </a:fontRef>
+        </p:style>
+        <p:txBody>
+          <a:bodyPr rtlCol="0" anchor="ctr"/>
+          <a:lstStyle/>
+          <a:p>
+            <a:pPr algn="ctr"/>
+            <a:endParaRPr lang="en-DK" dirty="0"/>
+          </a:p>
+        </p:txBody>
+      </p:sp>
+      <p:sp>
+        <p:nvSpPr>
+          <p:cNvPr id="62" name="Freeform: Shape 61">
+            <a:extLst>
+              <a:ext uri="{FF2B5EF4-FFF2-40B4-BE49-F238E27FC236}">
+                <a16:creationId xmlns:a16="http://schemas.microsoft.com/office/drawing/2014/main" id="{06FC1A69-B502-EE8D-8F71-28BF09E50F98}"/>
+              </a:ext>
+            </a:extLst>
+          </p:cNvPr>
+          <p:cNvSpPr/>
+          <p:nvPr/>
+        </p:nvSpPr>
+        <p:spPr>
+          <a:xfrm>
+            <a:off x="6284755" y="3132570"/>
+            <a:ext cx="253716" cy="225562"/>
+          </a:xfrm>
+          <a:custGeom>
+            <a:avLst/>
+            <a:gdLst>
+              <a:gd name="connsiteX0" fmla="*/ 253716 w 253716"/>
+              <a:gd name="connsiteY0" fmla="*/ 0 h 225562"/>
+              <a:gd name="connsiteX1" fmla="*/ 253716 w 253716"/>
+              <a:gd name="connsiteY1" fmla="*/ 225562 h 225562"/>
+              <a:gd name="connsiteX2" fmla="*/ 158079 w 253716"/>
+              <a:gd name="connsiteY2" fmla="*/ 217115 h 225562"/>
+              <a:gd name="connsiteX3" fmla="*/ 0 w 253716"/>
+              <a:gd name="connsiteY3" fmla="*/ 112781 h 225562"/>
+              <a:gd name="connsiteX4" fmla="*/ 158079 w 253716"/>
+              <a:gd name="connsiteY4" fmla="*/ 8448 h 225562"/>
+            </a:gdLst>
+            <a:ahLst/>
+            <a:cxnLst>
+              <a:cxn ang="0">
+                <a:pos x="connsiteX0" y="connsiteY0"/>
+              </a:cxn>
+              <a:cxn ang="0">
+                <a:pos x="connsiteX1" y="connsiteY1"/>
+              </a:cxn>
+              <a:cxn ang="0">
+                <a:pos x="connsiteX2" y="connsiteY2"/>
+              </a:cxn>
+              <a:cxn ang="0">
+                <a:pos x="connsiteX3" y="connsiteY3"/>
+              </a:cxn>
+              <a:cxn ang="0">
+                <a:pos x="connsiteX4" y="connsiteY4"/>
+              </a:cxn>
+            </a:cxnLst>
+            <a:rect l="l" t="t" r="r" b="b"/>
+            <a:pathLst>
+              <a:path w="253716" h="225562">
+                <a:moveTo>
+                  <a:pt x="253716" y="0"/>
+                </a:moveTo>
+                <a:lnTo>
+                  <a:pt x="253716" y="225562"/>
+                </a:lnTo>
+                <a:lnTo>
+                  <a:pt x="158079" y="217115"/>
+                </a:lnTo>
+                <a:cubicBezTo>
+                  <a:pt x="65183" y="199925"/>
+                  <a:pt x="0" y="159683"/>
+                  <a:pt x="0" y="112781"/>
+                </a:cubicBezTo>
+                <a:cubicBezTo>
+                  <a:pt x="0" y="65879"/>
+                  <a:pt x="65183" y="25637"/>
+                  <a:pt x="158079" y="8448"/>
+                </a:cubicBezTo>
+                <a:close/>
+              </a:path>
+            </a:pathLst>
+          </a:custGeom>
+          <a:noFill/>
+          <a:ln w="38100">
+            <a:solidFill>
+              <a:schemeClr val="accent1"/>
+            </a:solidFill>
+          </a:ln>
+        </p:spPr>
+        <p:style>
+          <a:lnRef idx="2">
+            <a:schemeClr val="accent1">
+              <a:shade val="50000"/>
+            </a:schemeClr>
+          </a:lnRef>
+          <a:fillRef idx="1">
+            <a:schemeClr val="accent1"/>
+          </a:fillRef>
+          <a:effectRef idx="0">
+            <a:schemeClr val="accent1"/>
+          </a:effectRef>
+          <a:fontRef idx="minor">
+            <a:schemeClr val="lt1"/>
+          </a:fontRef>
+        </p:style>
+        <p:txBody>
+          <a:bodyPr wrap="square" rtlCol="0" anchor="ctr">
+            <a:noAutofit/>
+          </a:bodyPr>
+          <a:lstStyle/>
+          <a:p>
+            <a:pPr algn="ctr"/>
+            <a:endParaRPr lang="en-DK"/>
+          </a:p>
+        </p:txBody>
+      </p:sp>
+      <p:sp>
+        <p:nvSpPr>
+          <p:cNvPr id="63" name="Freeform: Shape 62">
+            <a:extLst>
+              <a:ext uri="{FF2B5EF4-FFF2-40B4-BE49-F238E27FC236}">
+                <a16:creationId xmlns:a16="http://schemas.microsoft.com/office/drawing/2014/main" id="{E4F97A73-2630-A383-36FE-1427D3242DFB}"/>
+              </a:ext>
+            </a:extLst>
+          </p:cNvPr>
+          <p:cNvSpPr/>
+          <p:nvPr/>
+        </p:nvSpPr>
+        <p:spPr>
+          <a:xfrm>
+            <a:off x="6283828" y="3360187"/>
+            <a:ext cx="253716" cy="225562"/>
+          </a:xfrm>
+          <a:custGeom>
+            <a:avLst/>
+            <a:gdLst>
+              <a:gd name="connsiteX0" fmla="*/ 253716 w 253716"/>
+              <a:gd name="connsiteY0" fmla="*/ 0 h 225562"/>
+              <a:gd name="connsiteX1" fmla="*/ 253716 w 253716"/>
+              <a:gd name="connsiteY1" fmla="*/ 225562 h 225562"/>
+              <a:gd name="connsiteX2" fmla="*/ 158079 w 253716"/>
+              <a:gd name="connsiteY2" fmla="*/ 217115 h 225562"/>
+              <a:gd name="connsiteX3" fmla="*/ 0 w 253716"/>
+              <a:gd name="connsiteY3" fmla="*/ 112781 h 225562"/>
+              <a:gd name="connsiteX4" fmla="*/ 158079 w 253716"/>
+              <a:gd name="connsiteY4" fmla="*/ 8448 h 225562"/>
+            </a:gdLst>
+            <a:ahLst/>
+            <a:cxnLst>
+              <a:cxn ang="0">
+                <a:pos x="connsiteX0" y="connsiteY0"/>
+              </a:cxn>
+              <a:cxn ang="0">
+                <a:pos x="connsiteX1" y="connsiteY1"/>
+              </a:cxn>
+              <a:cxn ang="0">
+                <a:pos x="connsiteX2" y="connsiteY2"/>
+              </a:cxn>
+              <a:cxn ang="0">
+                <a:pos x="connsiteX3" y="connsiteY3"/>
+              </a:cxn>
+              <a:cxn ang="0">
+                <a:pos x="connsiteX4" y="connsiteY4"/>
+              </a:cxn>
+            </a:cxnLst>
+            <a:rect l="l" t="t" r="r" b="b"/>
+            <a:pathLst>
+              <a:path w="253716" h="225562">
+                <a:moveTo>
+                  <a:pt x="253716" y="0"/>
+                </a:moveTo>
+                <a:lnTo>
+                  <a:pt x="253716" y="225562"/>
+                </a:lnTo>
+                <a:lnTo>
+                  <a:pt x="158079" y="217115"/>
+                </a:lnTo>
+                <a:cubicBezTo>
+                  <a:pt x="65183" y="199925"/>
+                  <a:pt x="0" y="159683"/>
+                  <a:pt x="0" y="112781"/>
+                </a:cubicBezTo>
+                <a:cubicBezTo>
+                  <a:pt x="0" y="65879"/>
+                  <a:pt x="65183" y="25637"/>
+                  <a:pt x="158079" y="8448"/>
+                </a:cubicBezTo>
+                <a:close/>
+              </a:path>
+            </a:pathLst>
+          </a:custGeom>
+          <a:noFill/>
+          <a:ln w="38100">
+            <a:solidFill>
+              <a:schemeClr val="accent1"/>
+            </a:solidFill>
+          </a:ln>
+        </p:spPr>
+        <p:style>
+          <a:lnRef idx="2">
+            <a:schemeClr val="accent1">
+              <a:shade val="50000"/>
+            </a:schemeClr>
+          </a:lnRef>
+          <a:fillRef idx="1">
+            <a:schemeClr val="accent1"/>
+          </a:fillRef>
+          <a:effectRef idx="0">
+            <a:schemeClr val="accent1"/>
+          </a:effectRef>
+          <a:fontRef idx="minor">
+            <a:schemeClr val="lt1"/>
+          </a:fontRef>
+        </p:style>
+        <p:txBody>
+          <a:bodyPr wrap="square" rtlCol="0" anchor="ctr">
+            <a:noAutofit/>
+          </a:bodyPr>
+          <a:lstStyle/>
+          <a:p>
+            <a:pPr algn="ctr"/>
+            <a:endParaRPr lang="en-DK"/>
+          </a:p>
+        </p:txBody>
+      </p:sp>
+      <p:sp>
+        <p:nvSpPr>
+          <p:cNvPr id="64" name="Freeform: Shape 63">
+            <a:extLst>
+              <a:ext uri="{FF2B5EF4-FFF2-40B4-BE49-F238E27FC236}">
+                <a16:creationId xmlns:a16="http://schemas.microsoft.com/office/drawing/2014/main" id="{9607E7CF-5DA4-96D3-5042-1BE3DF692B01}"/>
+              </a:ext>
+            </a:extLst>
+          </p:cNvPr>
+          <p:cNvSpPr/>
+          <p:nvPr/>
+        </p:nvSpPr>
+        <p:spPr>
+          <a:xfrm>
+            <a:off x="6283822" y="3588361"/>
+            <a:ext cx="253716" cy="225562"/>
+          </a:xfrm>
+          <a:custGeom>
+            <a:avLst/>
+            <a:gdLst>
+              <a:gd name="connsiteX0" fmla="*/ 253716 w 253716"/>
+              <a:gd name="connsiteY0" fmla="*/ 0 h 225562"/>
+              <a:gd name="connsiteX1" fmla="*/ 253716 w 253716"/>
+              <a:gd name="connsiteY1" fmla="*/ 225562 h 225562"/>
+              <a:gd name="connsiteX2" fmla="*/ 158079 w 253716"/>
+              <a:gd name="connsiteY2" fmla="*/ 217115 h 225562"/>
+              <a:gd name="connsiteX3" fmla="*/ 0 w 253716"/>
+              <a:gd name="connsiteY3" fmla="*/ 112781 h 225562"/>
+              <a:gd name="connsiteX4" fmla="*/ 158079 w 253716"/>
+              <a:gd name="connsiteY4" fmla="*/ 8448 h 225562"/>
+            </a:gdLst>
+            <a:ahLst/>
+            <a:cxnLst>
+              <a:cxn ang="0">
+                <a:pos x="connsiteX0" y="connsiteY0"/>
+              </a:cxn>
+              <a:cxn ang="0">
+                <a:pos x="connsiteX1" y="connsiteY1"/>
+              </a:cxn>
+              <a:cxn ang="0">
+                <a:pos x="connsiteX2" y="connsiteY2"/>
+              </a:cxn>
+              <a:cxn ang="0">
+                <a:pos x="connsiteX3" y="connsiteY3"/>
+              </a:cxn>
+              <a:cxn ang="0">
+                <a:pos x="connsiteX4" y="connsiteY4"/>
+              </a:cxn>
+            </a:cxnLst>
+            <a:rect l="l" t="t" r="r" b="b"/>
+            <a:pathLst>
+              <a:path w="253716" h="225562">
+                <a:moveTo>
+                  <a:pt x="253716" y="0"/>
+                </a:moveTo>
+                <a:lnTo>
+                  <a:pt x="253716" y="225562"/>
+                </a:lnTo>
+                <a:lnTo>
+                  <a:pt x="158079" y="217115"/>
+                </a:lnTo>
+                <a:cubicBezTo>
+                  <a:pt x="65183" y="199925"/>
+                  <a:pt x="0" y="159683"/>
+                  <a:pt x="0" y="112781"/>
+                </a:cubicBezTo>
+                <a:cubicBezTo>
+                  <a:pt x="0" y="65879"/>
+                  <a:pt x="65183" y="25637"/>
+                  <a:pt x="158079" y="8448"/>
+                </a:cubicBezTo>
+                <a:close/>
+              </a:path>
+            </a:pathLst>
+          </a:custGeom>
+          <a:noFill/>
+          <a:ln w="38100">
+            <a:solidFill>
+              <a:schemeClr val="accent1"/>
+            </a:solidFill>
+          </a:ln>
+        </p:spPr>
+        <p:style>
+          <a:lnRef idx="2">
+            <a:schemeClr val="accent1">
+              <a:shade val="50000"/>
+            </a:schemeClr>
+          </a:lnRef>
+          <a:fillRef idx="1">
+            <a:schemeClr val="accent1"/>
+          </a:fillRef>
+          <a:effectRef idx="0">
+            <a:schemeClr val="accent1"/>
+          </a:effectRef>
+          <a:fontRef idx="minor">
+            <a:schemeClr val="lt1"/>
+          </a:fontRef>
+        </p:style>
+        <p:txBody>
+          <a:bodyPr wrap="square" rtlCol="0" anchor="ctr">
+            <a:noAutofit/>
+          </a:bodyPr>
+          <a:lstStyle/>
+          <a:p>
+            <a:pPr algn="ctr"/>
+            <a:endParaRPr lang="en-DK"/>
+          </a:p>
+        </p:txBody>
+      </p:sp>
+      <p:sp>
+        <p:nvSpPr>
+          <p:cNvPr id="66" name="Rectangle 65">
+            <a:extLst>
+              <a:ext uri="{FF2B5EF4-FFF2-40B4-BE49-F238E27FC236}">
+                <a16:creationId xmlns:a16="http://schemas.microsoft.com/office/drawing/2014/main" id="{21DF2710-2D08-FD43-9AC8-D62428E22FD7}"/>
+              </a:ext>
+            </a:extLst>
+          </p:cNvPr>
+          <p:cNvSpPr/>
+          <p:nvPr/>
+        </p:nvSpPr>
+        <p:spPr>
+          <a:xfrm>
+            <a:off x="6510148" y="3159549"/>
+            <a:ext cx="291457" cy="625167"/>
+          </a:xfrm>
+          <a:prstGeom prst="rect">
+            <a:avLst/>
+          </a:prstGeom>
+          <a:solidFill>
+            <a:schemeClr val="bg1"/>
+          </a:solidFill>
+          <a:ln>
+            <a:solidFill>
+              <a:schemeClr val="bg1"/>
+            </a:solidFill>
+          </a:ln>
+        </p:spPr>
+        <p:style>
+          <a:lnRef idx="2">
+            <a:schemeClr val="accent1">
+              <a:shade val="50000"/>
+            </a:schemeClr>
+          </a:lnRef>
+          <a:fillRef idx="1">
+            <a:schemeClr val="accent1"/>
+          </a:fillRef>
+          <a:effectRef idx="0">
+            <a:schemeClr val="accent1"/>
+          </a:effectRef>
+          <a:fontRef idx="minor">
+            <a:schemeClr val="lt1"/>
+          </a:fontRef>
+        </p:style>
+        <p:txBody>
+          <a:bodyPr rtlCol="0" anchor="ctr"/>
+          <a:lstStyle/>
+          <a:p>
+            <a:pPr algn="ctr"/>
+            <a:endParaRPr lang="en-DK"/>
+          </a:p>
+        </p:txBody>
+      </p:sp>
+      <p:cxnSp>
+        <p:nvCxnSpPr>
+          <p:cNvPr id="69" name="Straight Connector 68">
+            <a:extLst>
+              <a:ext uri="{FF2B5EF4-FFF2-40B4-BE49-F238E27FC236}">
+                <a16:creationId xmlns:a16="http://schemas.microsoft.com/office/drawing/2014/main" id="{B14C8072-9F81-7D1B-C042-5EF5D65FB1D0}"/>
+              </a:ext>
+            </a:extLst>
+          </p:cNvPr>
+          <p:cNvCxnSpPr>
+            <a:cxnSpLocks/>
+            <a:endCxn id="25" idx="0"/>
+          </p:cNvCxnSpPr>
+          <p:nvPr/>
+        </p:nvCxnSpPr>
+        <p:spPr>
+          <a:xfrm flipH="1">
+            <a:off x="7303778" y="1243327"/>
+            <a:ext cx="50206" cy="1478113"/>
+          </a:xfrm>
+          <a:prstGeom prst="line">
+            <a:avLst/>
+          </a:prstGeom>
+          <a:ln w="38100"/>
+        </p:spPr>
+        <p:style>
+          <a:lnRef idx="1">
+            <a:schemeClr val="accent1"/>
+          </a:lnRef>
+          <a:fillRef idx="0">
+            <a:schemeClr val="accent1"/>
+          </a:fillRef>
+          <a:effectRef idx="0">
+            <a:schemeClr val="accent1"/>
+          </a:effectRef>
+          <a:fontRef idx="minor">
+            <a:schemeClr val="tx1"/>
+          </a:fontRef>
+        </p:style>
+      </p:cxnSp>
+      <p:grpSp>
+        <p:nvGrpSpPr>
+          <p:cNvPr id="72" name="Group 71">
+            <a:extLst>
+              <a:ext uri="{FF2B5EF4-FFF2-40B4-BE49-F238E27FC236}">
+                <a16:creationId xmlns:a16="http://schemas.microsoft.com/office/drawing/2014/main" id="{F624F559-F909-CAE3-1732-405C4DC9035F}"/>
+              </a:ext>
+            </a:extLst>
+          </p:cNvPr>
+          <p:cNvGrpSpPr/>
+          <p:nvPr/>
+        </p:nvGrpSpPr>
+        <p:grpSpPr>
+          <a:xfrm flipH="1">
+            <a:off x="7050731" y="1547233"/>
+            <a:ext cx="556300" cy="124127"/>
+            <a:chOff x="8257117" y="1115678"/>
+            <a:chExt cx="556300" cy="124127"/>
+          </a:xfrm>
+        </p:grpSpPr>
         <p:cxnSp>
           <p:nvCxnSpPr>
-            <p:cNvPr id="15" name="Straight Connector 14">
+            <p:cNvPr id="73" name="Straight Connector 72">
               <a:extLst>
                 <a:ext uri="{FF2B5EF4-FFF2-40B4-BE49-F238E27FC236}">
-                  <a16:creationId xmlns:a16="http://schemas.microsoft.com/office/drawing/2014/main" id="{4E800688-6EF7-C483-A5A9-21F088388A1D}"/>
+                  <a16:creationId xmlns:a16="http://schemas.microsoft.com/office/drawing/2014/main" id="{69C797AE-A21D-81DA-8CAA-10C67A319098}"/>
                 </a:ext>
               </a:extLst>
             </p:cNvPr>
@@ -9611,8 +10804,8 @@
             <p:nvPr/>
           </p:nvCxnSpPr>
           <p:spPr>
-            <a:xfrm rot="2700000">
-              <a:off x="4803187" y="3729993"/>
+            <a:xfrm>
+              <a:off x="8291154" y="1239805"/>
               <a:ext cx="450993" cy="0"/>
             </a:xfrm>
             <a:prstGeom prst="line">
@@ -9637,10 +10830,10 @@
         </p:cxnSp>
         <p:cxnSp>
           <p:nvCxnSpPr>
-            <p:cNvPr id="16" name="Straight Connector 15">
+            <p:cNvPr id="74" name="Straight Connector 73">
               <a:extLst>
                 <a:ext uri="{FF2B5EF4-FFF2-40B4-BE49-F238E27FC236}">
-                  <a16:creationId xmlns:a16="http://schemas.microsoft.com/office/drawing/2014/main" id="{95600A1E-DD0F-F93F-0183-8385E7CE23AE}"/>
+                  <a16:creationId xmlns:a16="http://schemas.microsoft.com/office/drawing/2014/main" id="{48F28497-4A1A-3702-2BEC-1AE70091B521}"/>
                 </a:ext>
               </a:extLst>
             </p:cNvPr>
@@ -9650,330 +10843,8 @@
             <p:nvPr/>
           </p:nvCxnSpPr>
           <p:spPr>
-            <a:xfrm rot="18900000" flipH="1">
-              <a:off x="4803186" y="3729994"/>
-              <a:ext cx="450993" cy="0"/>
-            </a:xfrm>
-            <a:prstGeom prst="line">
-              <a:avLst/>
-            </a:prstGeom>
-            <a:ln w="38100"/>
-          </p:spPr>
-          <p:style>
-            <a:lnRef idx="1">
-              <a:schemeClr val="accent1"/>
-            </a:lnRef>
-            <a:fillRef idx="0">
-              <a:schemeClr val="accent1"/>
-            </a:fillRef>
-            <a:effectRef idx="0">
-              <a:schemeClr val="accent1"/>
-            </a:effectRef>
-            <a:fontRef idx="minor">
-              <a:schemeClr val="tx1"/>
-            </a:fontRef>
-          </p:style>
-        </p:cxnSp>
-        <p:grpSp>
-          <p:nvGrpSpPr>
-            <p:cNvPr id="22" name="Group 21">
-              <a:extLst>
-                <a:ext uri="{FF2B5EF4-FFF2-40B4-BE49-F238E27FC236}">
-                  <a16:creationId xmlns:a16="http://schemas.microsoft.com/office/drawing/2014/main" id="{1FD162D7-17F8-B458-EF88-EB9899C07A1D}"/>
-                </a:ext>
-              </a:extLst>
-            </p:cNvPr>
-            <p:cNvGrpSpPr/>
-            <p:nvPr/>
-          </p:nvGrpSpPr>
-          <p:grpSpPr>
-            <a:xfrm rot="5400000">
-              <a:off x="5639998" y="2425962"/>
-              <a:ext cx="556300" cy="124127"/>
-              <a:chOff x="8257117" y="1115678"/>
-              <a:chExt cx="556300" cy="124127"/>
-            </a:xfrm>
-          </p:grpSpPr>
-          <p:cxnSp>
-            <p:nvCxnSpPr>
-              <p:cNvPr id="17" name="Straight Connector 16">
-                <a:extLst>
-                  <a:ext uri="{FF2B5EF4-FFF2-40B4-BE49-F238E27FC236}">
-                    <a16:creationId xmlns:a16="http://schemas.microsoft.com/office/drawing/2014/main" id="{9470C6EF-15D3-6870-85DA-8915F48D2371}"/>
-                  </a:ext>
-                </a:extLst>
-              </p:cNvPr>
-              <p:cNvCxnSpPr>
-                <a:cxnSpLocks/>
-              </p:cNvCxnSpPr>
-              <p:nvPr/>
-            </p:nvCxnSpPr>
-            <p:spPr>
-              <a:xfrm>
-                <a:off x="8291154" y="1239805"/>
-                <a:ext cx="450993" cy="0"/>
-              </a:xfrm>
-              <a:prstGeom prst="line">
-                <a:avLst/>
-              </a:prstGeom>
-              <a:ln w="38100"/>
-            </p:spPr>
-            <p:style>
-              <a:lnRef idx="1">
-                <a:schemeClr val="accent1"/>
-              </a:lnRef>
-              <a:fillRef idx="0">
-                <a:schemeClr val="accent1"/>
-              </a:fillRef>
-              <a:effectRef idx="0">
-                <a:schemeClr val="accent1"/>
-              </a:effectRef>
-              <a:fontRef idx="minor">
-                <a:schemeClr val="tx1"/>
-              </a:fontRef>
-            </p:style>
-          </p:cxnSp>
-          <p:cxnSp>
-            <p:nvCxnSpPr>
-              <p:cNvPr id="18" name="Straight Connector 17">
-                <a:extLst>
-                  <a:ext uri="{FF2B5EF4-FFF2-40B4-BE49-F238E27FC236}">
-                    <a16:creationId xmlns:a16="http://schemas.microsoft.com/office/drawing/2014/main" id="{A06D8CB9-F997-4ED1-0B8A-A81DEAD7BFE5}"/>
-                  </a:ext>
-                </a:extLst>
-              </p:cNvPr>
-              <p:cNvCxnSpPr>
-                <a:cxnSpLocks/>
-              </p:cNvCxnSpPr>
-              <p:nvPr/>
-            </p:nvCxnSpPr>
-            <p:spPr>
-              <a:xfrm>
-                <a:off x="8291154" y="1115678"/>
-                <a:ext cx="450993" cy="0"/>
-              </a:xfrm>
-              <a:prstGeom prst="line">
-                <a:avLst/>
-              </a:prstGeom>
-              <a:ln w="38100"/>
-            </p:spPr>
-            <p:style>
-              <a:lnRef idx="1">
-                <a:schemeClr val="accent1"/>
-              </a:lnRef>
-              <a:fillRef idx="0">
-                <a:schemeClr val="accent1"/>
-              </a:fillRef>
-              <a:effectRef idx="0">
-                <a:schemeClr val="accent1"/>
-              </a:effectRef>
-              <a:fontRef idx="minor">
-                <a:schemeClr val="tx1"/>
-              </a:fontRef>
-            </p:style>
-          </p:cxnSp>
-          <p:sp>
-            <p:nvSpPr>
-              <p:cNvPr id="19" name="Rectangle 18">
-                <a:extLst>
-                  <a:ext uri="{FF2B5EF4-FFF2-40B4-BE49-F238E27FC236}">
-                    <a16:creationId xmlns:a16="http://schemas.microsoft.com/office/drawing/2014/main" id="{CFEEF5C5-3798-D49C-DF44-8D871F9A8F84}"/>
-                  </a:ext>
-                </a:extLst>
-              </p:cNvPr>
-              <p:cNvSpPr/>
-              <p:nvPr/>
-            </p:nvSpPr>
-            <p:spPr>
-              <a:xfrm>
-                <a:off x="8257117" y="1134987"/>
-                <a:ext cx="556300" cy="85509"/>
-              </a:xfrm>
-              <a:prstGeom prst="rect">
-                <a:avLst/>
-              </a:prstGeom>
-              <a:solidFill>
-                <a:schemeClr val="bg1"/>
-              </a:solidFill>
-              <a:ln>
-                <a:solidFill>
-                  <a:schemeClr val="bg1"/>
-                </a:solidFill>
-              </a:ln>
-            </p:spPr>
-            <p:style>
-              <a:lnRef idx="2">
-                <a:schemeClr val="accent1">
-                  <a:shade val="50000"/>
-                </a:schemeClr>
-              </a:lnRef>
-              <a:fillRef idx="1">
-                <a:schemeClr val="accent1"/>
-              </a:fillRef>
-              <a:effectRef idx="0">
-                <a:schemeClr val="accent1"/>
-              </a:effectRef>
-              <a:fontRef idx="minor">
-                <a:schemeClr val="lt1"/>
-              </a:fontRef>
-            </p:style>
-            <p:txBody>
-              <a:bodyPr rtlCol="0" anchor="ctr"/>
-              <a:lstStyle/>
-              <a:p>
-                <a:pPr algn="ctr"/>
-                <a:endParaRPr lang="en-DK" dirty="0"/>
-              </a:p>
-            </p:txBody>
-          </p:sp>
-        </p:grpSp>
-        <p:cxnSp>
-          <p:nvCxnSpPr>
-            <p:cNvPr id="24" name="Connector: Elbow 23">
-              <a:extLst>
-                <a:ext uri="{FF2B5EF4-FFF2-40B4-BE49-F238E27FC236}">
-                  <a16:creationId xmlns:a16="http://schemas.microsoft.com/office/drawing/2014/main" id="{A4ECEA47-1BE3-2F84-03C9-BE38F10F6EEB}"/>
-                </a:ext>
-              </a:extLst>
-            </p:cNvPr>
-            <p:cNvCxnSpPr>
-              <a:cxnSpLocks/>
-            </p:cNvCxnSpPr>
-            <p:nvPr/>
-          </p:nvCxnSpPr>
-          <p:spPr>
-            <a:xfrm rot="5400000" flipH="1" flipV="1">
-              <a:off x="4767686" y="1952474"/>
-              <a:ext cx="541302" cy="1612318"/>
-            </a:xfrm>
-            <a:prstGeom prst="bentConnector2">
-              <a:avLst/>
-            </a:prstGeom>
-            <a:ln w="38100"/>
-          </p:spPr>
-          <p:style>
-            <a:lnRef idx="1">
-              <a:schemeClr val="accent1"/>
-            </a:lnRef>
-            <a:fillRef idx="0">
-              <a:schemeClr val="accent1"/>
-            </a:fillRef>
-            <a:effectRef idx="0">
-              <a:schemeClr val="accent1"/>
-            </a:effectRef>
-            <a:fontRef idx="minor">
-              <a:schemeClr val="tx1"/>
-            </a:fontRef>
-          </p:style>
-        </p:cxnSp>
-        <p:sp>
-          <p:nvSpPr>
-            <p:cNvPr id="25" name="Rectangle 24">
-              <a:extLst>
-                <a:ext uri="{FF2B5EF4-FFF2-40B4-BE49-F238E27FC236}">
-                  <a16:creationId xmlns:a16="http://schemas.microsoft.com/office/drawing/2014/main" id="{5C026F19-6499-9D9A-74FD-900128C35E91}"/>
-                </a:ext>
-              </a:extLst>
-            </p:cNvPr>
-            <p:cNvSpPr/>
-            <p:nvPr/>
-          </p:nvSpPr>
-          <p:spPr>
-            <a:xfrm flipH="1">
-              <a:off x="6198865" y="3014738"/>
-              <a:ext cx="1531214" cy="1531214"/>
-            </a:xfrm>
-            <a:prstGeom prst="rect">
-              <a:avLst/>
-            </a:prstGeom>
-            <a:noFill/>
-            <a:ln w="38100">
-              <a:solidFill>
-                <a:schemeClr val="tx2"/>
-              </a:solidFill>
-            </a:ln>
-          </p:spPr>
-          <p:style>
-            <a:lnRef idx="2">
-              <a:schemeClr val="accent1">
-                <a:shade val="50000"/>
-              </a:schemeClr>
-            </a:lnRef>
-            <a:fillRef idx="1">
-              <a:schemeClr val="accent1"/>
-            </a:fillRef>
-            <a:effectRef idx="0">
-              <a:schemeClr val="accent1"/>
-            </a:effectRef>
-            <a:fontRef idx="minor">
-              <a:schemeClr val="lt1"/>
-            </a:fontRef>
-          </p:style>
-          <p:txBody>
-            <a:bodyPr rtlCol="0" anchor="ctr"/>
-            <a:lstStyle/>
-            <a:p>
-              <a:pPr algn="ctr"/>
-              <a:endParaRPr lang="en-DK"/>
-            </a:p>
-          </p:txBody>
-        </p:sp>
-        <p:cxnSp>
-          <p:nvCxnSpPr>
-            <p:cNvPr id="26" name="Straight Connector 25">
-              <a:extLst>
-                <a:ext uri="{FF2B5EF4-FFF2-40B4-BE49-F238E27FC236}">
-                  <a16:creationId xmlns:a16="http://schemas.microsoft.com/office/drawing/2014/main" id="{CD417901-E7B1-AB50-B20A-A66F2A93F328}"/>
-                </a:ext>
-              </a:extLst>
-            </p:cNvPr>
-            <p:cNvCxnSpPr>
-              <a:cxnSpLocks/>
-            </p:cNvCxnSpPr>
-            <p:nvPr/>
-          </p:nvCxnSpPr>
-          <p:spPr>
-            <a:xfrm flipH="1">
-              <a:off x="7523199" y="3792757"/>
-              <a:ext cx="450993" cy="0"/>
-            </a:xfrm>
-            <a:prstGeom prst="line">
-              <a:avLst/>
-            </a:prstGeom>
-            <a:ln w="38100"/>
-          </p:spPr>
-          <p:style>
-            <a:lnRef idx="1">
-              <a:schemeClr val="accent1"/>
-            </a:lnRef>
-            <a:fillRef idx="0">
-              <a:schemeClr val="accent1"/>
-            </a:fillRef>
-            <a:effectRef idx="0">
-              <a:schemeClr val="accent1"/>
-            </a:effectRef>
-            <a:fontRef idx="minor">
-              <a:schemeClr val="tx1"/>
-            </a:fontRef>
-          </p:style>
-        </p:cxnSp>
-        <p:cxnSp>
-          <p:nvCxnSpPr>
-            <p:cNvPr id="27" name="Straight Connector 26">
-              <a:extLst>
-                <a:ext uri="{FF2B5EF4-FFF2-40B4-BE49-F238E27FC236}">
-                  <a16:creationId xmlns:a16="http://schemas.microsoft.com/office/drawing/2014/main" id="{B6F57EC3-2C7B-9A1B-3D6F-B7EAE8FF958F}"/>
-                </a:ext>
-              </a:extLst>
-            </p:cNvPr>
-            <p:cNvCxnSpPr>
-              <a:cxnSpLocks/>
-            </p:cNvCxnSpPr>
-            <p:nvPr/>
-          </p:nvCxnSpPr>
-          <p:spPr>
-            <a:xfrm flipH="1">
-              <a:off x="7523199" y="3668630"/>
+            <a:xfrm>
+              <a:off x="8291154" y="1115678"/>
               <a:ext cx="450993" cy="0"/>
             </a:xfrm>
             <a:prstGeom prst="line">
@@ -9998,10 +10869,10 @@
         </p:cxnSp>
         <p:sp>
           <p:nvSpPr>
-            <p:cNvPr id="28" name="Rectangle 27">
+            <p:cNvPr id="75" name="Rectangle 74">
               <a:extLst>
                 <a:ext uri="{FF2B5EF4-FFF2-40B4-BE49-F238E27FC236}">
-                  <a16:creationId xmlns:a16="http://schemas.microsoft.com/office/drawing/2014/main" id="{34A23BE5-BB45-AB13-4F45-8D3E7E980432}"/>
+                  <a16:creationId xmlns:a16="http://schemas.microsoft.com/office/drawing/2014/main" id="{8532AC6E-5A0D-E208-DCF3-DE3281C41EE9}"/>
                 </a:ext>
               </a:extLst>
             </p:cNvPr>
@@ -10009,8 +10880,8 @@
             <p:nvPr/>
           </p:nvSpPr>
           <p:spPr>
-            <a:xfrm flipH="1">
-              <a:off x="7451929" y="3687939"/>
+            <a:xfrm>
+              <a:off x="8257117" y="1134987"/>
               <a:ext cx="556300" cy="85509"/>
             </a:xfrm>
             <a:prstGeom prst="rect">
@@ -10050,663 +10921,6 @@
             </a:p>
           </p:txBody>
         </p:sp>
-        <p:cxnSp>
-          <p:nvCxnSpPr>
-            <p:cNvPr id="31" name="Connector: Elbow 30">
-              <a:extLst>
-                <a:ext uri="{FF2B5EF4-FFF2-40B4-BE49-F238E27FC236}">
-                  <a16:creationId xmlns:a16="http://schemas.microsoft.com/office/drawing/2014/main" id="{52704B50-1134-9B3D-454B-CEBFD849175C}"/>
-                </a:ext>
-              </a:extLst>
-            </p:cNvPr>
-            <p:cNvCxnSpPr>
-              <a:cxnSpLocks/>
-            </p:cNvCxnSpPr>
-            <p:nvPr/>
-          </p:nvCxnSpPr>
-          <p:spPr>
-            <a:xfrm rot="10800000">
-              <a:off x="5999521" y="2487982"/>
-              <a:ext cx="1593009" cy="526712"/>
-            </a:xfrm>
-            <a:prstGeom prst="bentConnector3">
-              <a:avLst>
-                <a:gd name="adj1" fmla="val 50000"/>
-              </a:avLst>
-            </a:prstGeom>
-            <a:ln w="38100"/>
-          </p:spPr>
-          <p:style>
-            <a:lnRef idx="1">
-              <a:schemeClr val="accent1"/>
-            </a:lnRef>
-            <a:fillRef idx="0">
-              <a:schemeClr val="accent1"/>
-            </a:fillRef>
-            <a:effectRef idx="0">
-              <a:schemeClr val="accent1"/>
-            </a:effectRef>
-            <a:fontRef idx="minor">
-              <a:schemeClr val="tx1"/>
-            </a:fontRef>
-          </p:style>
-        </p:cxnSp>
-        <p:sp>
-          <p:nvSpPr>
-            <p:cNvPr id="39" name="Rectangle 38">
-              <a:extLst>
-                <a:ext uri="{FF2B5EF4-FFF2-40B4-BE49-F238E27FC236}">
-                  <a16:creationId xmlns:a16="http://schemas.microsoft.com/office/drawing/2014/main" id="{45954C39-762E-7D28-F6DB-5379FBB2C7E2}"/>
-                </a:ext>
-              </a:extLst>
-            </p:cNvPr>
-            <p:cNvSpPr/>
-            <p:nvPr/>
-          </p:nvSpPr>
-          <p:spPr>
-            <a:xfrm rot="5400000" flipH="1">
-              <a:off x="5924796" y="3659774"/>
-              <a:ext cx="556300" cy="85509"/>
-            </a:xfrm>
-            <a:prstGeom prst="rect">
-              <a:avLst/>
-            </a:prstGeom>
-            <a:solidFill>
-              <a:schemeClr val="bg1"/>
-            </a:solidFill>
-            <a:ln>
-              <a:solidFill>
-                <a:schemeClr val="bg1"/>
-              </a:solidFill>
-            </a:ln>
-          </p:spPr>
-          <p:style>
-            <a:lnRef idx="2">
-              <a:schemeClr val="accent1">
-                <a:shade val="50000"/>
-              </a:schemeClr>
-            </a:lnRef>
-            <a:fillRef idx="1">
-              <a:schemeClr val="accent1"/>
-            </a:fillRef>
-            <a:effectRef idx="0">
-              <a:schemeClr val="accent1"/>
-            </a:effectRef>
-            <a:fontRef idx="minor">
-              <a:schemeClr val="lt1"/>
-            </a:fontRef>
-          </p:style>
-          <p:txBody>
-            <a:bodyPr rtlCol="0" anchor="ctr"/>
-            <a:lstStyle/>
-            <a:p>
-              <a:pPr algn="ctr"/>
-              <a:endParaRPr lang="en-DK" dirty="0"/>
-            </a:p>
-          </p:txBody>
-        </p:sp>
-        <p:sp>
-          <p:nvSpPr>
-            <p:cNvPr id="62" name="Freeform: Shape 61">
-              <a:extLst>
-                <a:ext uri="{FF2B5EF4-FFF2-40B4-BE49-F238E27FC236}">
-                  <a16:creationId xmlns:a16="http://schemas.microsoft.com/office/drawing/2014/main" id="{06FC1A69-B502-EE8D-8F71-28BF09E50F98}"/>
-                </a:ext>
-              </a:extLst>
-            </p:cNvPr>
-            <p:cNvSpPr/>
-            <p:nvPr/>
-          </p:nvSpPr>
-          <p:spPr>
-            <a:xfrm>
-              <a:off x="5945449" y="3425868"/>
-              <a:ext cx="253716" cy="225562"/>
-            </a:xfrm>
-            <a:custGeom>
-              <a:avLst/>
-              <a:gdLst>
-                <a:gd name="connsiteX0" fmla="*/ 253716 w 253716"/>
-                <a:gd name="connsiteY0" fmla="*/ 0 h 225562"/>
-                <a:gd name="connsiteX1" fmla="*/ 253716 w 253716"/>
-                <a:gd name="connsiteY1" fmla="*/ 225562 h 225562"/>
-                <a:gd name="connsiteX2" fmla="*/ 158079 w 253716"/>
-                <a:gd name="connsiteY2" fmla="*/ 217115 h 225562"/>
-                <a:gd name="connsiteX3" fmla="*/ 0 w 253716"/>
-                <a:gd name="connsiteY3" fmla="*/ 112781 h 225562"/>
-                <a:gd name="connsiteX4" fmla="*/ 158079 w 253716"/>
-                <a:gd name="connsiteY4" fmla="*/ 8448 h 225562"/>
-              </a:gdLst>
-              <a:ahLst/>
-              <a:cxnLst>
-                <a:cxn ang="0">
-                  <a:pos x="connsiteX0" y="connsiteY0"/>
-                </a:cxn>
-                <a:cxn ang="0">
-                  <a:pos x="connsiteX1" y="connsiteY1"/>
-                </a:cxn>
-                <a:cxn ang="0">
-                  <a:pos x="connsiteX2" y="connsiteY2"/>
-                </a:cxn>
-                <a:cxn ang="0">
-                  <a:pos x="connsiteX3" y="connsiteY3"/>
-                </a:cxn>
-                <a:cxn ang="0">
-                  <a:pos x="connsiteX4" y="connsiteY4"/>
-                </a:cxn>
-              </a:cxnLst>
-              <a:rect l="l" t="t" r="r" b="b"/>
-              <a:pathLst>
-                <a:path w="253716" h="225562">
-                  <a:moveTo>
-                    <a:pt x="253716" y="0"/>
-                  </a:moveTo>
-                  <a:lnTo>
-                    <a:pt x="253716" y="225562"/>
-                  </a:lnTo>
-                  <a:lnTo>
-                    <a:pt x="158079" y="217115"/>
-                  </a:lnTo>
-                  <a:cubicBezTo>
-                    <a:pt x="65183" y="199925"/>
-                    <a:pt x="0" y="159683"/>
-                    <a:pt x="0" y="112781"/>
-                  </a:cubicBezTo>
-                  <a:cubicBezTo>
-                    <a:pt x="0" y="65879"/>
-                    <a:pt x="65183" y="25637"/>
-                    <a:pt x="158079" y="8448"/>
-                  </a:cubicBezTo>
-                  <a:close/>
-                </a:path>
-              </a:pathLst>
-            </a:custGeom>
-            <a:noFill/>
-            <a:ln w="38100"/>
-          </p:spPr>
-          <p:style>
-            <a:lnRef idx="2">
-              <a:schemeClr val="accent1">
-                <a:shade val="50000"/>
-              </a:schemeClr>
-            </a:lnRef>
-            <a:fillRef idx="1">
-              <a:schemeClr val="accent1"/>
-            </a:fillRef>
-            <a:effectRef idx="0">
-              <a:schemeClr val="accent1"/>
-            </a:effectRef>
-            <a:fontRef idx="minor">
-              <a:schemeClr val="lt1"/>
-            </a:fontRef>
-          </p:style>
-          <p:txBody>
-            <a:bodyPr wrap="square" rtlCol="0" anchor="ctr">
-              <a:noAutofit/>
-            </a:bodyPr>
-            <a:lstStyle/>
-            <a:p>
-              <a:pPr algn="ctr"/>
-              <a:endParaRPr lang="en-DK"/>
-            </a:p>
-          </p:txBody>
-        </p:sp>
-        <p:sp>
-          <p:nvSpPr>
-            <p:cNvPr id="63" name="Freeform: Shape 62">
-              <a:extLst>
-                <a:ext uri="{FF2B5EF4-FFF2-40B4-BE49-F238E27FC236}">
-                  <a16:creationId xmlns:a16="http://schemas.microsoft.com/office/drawing/2014/main" id="{E4F97A73-2630-A383-36FE-1427D3242DFB}"/>
-                </a:ext>
-              </a:extLst>
-            </p:cNvPr>
-            <p:cNvSpPr/>
-            <p:nvPr/>
-          </p:nvSpPr>
-          <p:spPr>
-            <a:xfrm>
-              <a:off x="5944522" y="3653485"/>
-              <a:ext cx="253716" cy="225562"/>
-            </a:xfrm>
-            <a:custGeom>
-              <a:avLst/>
-              <a:gdLst>
-                <a:gd name="connsiteX0" fmla="*/ 253716 w 253716"/>
-                <a:gd name="connsiteY0" fmla="*/ 0 h 225562"/>
-                <a:gd name="connsiteX1" fmla="*/ 253716 w 253716"/>
-                <a:gd name="connsiteY1" fmla="*/ 225562 h 225562"/>
-                <a:gd name="connsiteX2" fmla="*/ 158079 w 253716"/>
-                <a:gd name="connsiteY2" fmla="*/ 217115 h 225562"/>
-                <a:gd name="connsiteX3" fmla="*/ 0 w 253716"/>
-                <a:gd name="connsiteY3" fmla="*/ 112781 h 225562"/>
-                <a:gd name="connsiteX4" fmla="*/ 158079 w 253716"/>
-                <a:gd name="connsiteY4" fmla="*/ 8448 h 225562"/>
-              </a:gdLst>
-              <a:ahLst/>
-              <a:cxnLst>
-                <a:cxn ang="0">
-                  <a:pos x="connsiteX0" y="connsiteY0"/>
-                </a:cxn>
-                <a:cxn ang="0">
-                  <a:pos x="connsiteX1" y="connsiteY1"/>
-                </a:cxn>
-                <a:cxn ang="0">
-                  <a:pos x="connsiteX2" y="connsiteY2"/>
-                </a:cxn>
-                <a:cxn ang="0">
-                  <a:pos x="connsiteX3" y="connsiteY3"/>
-                </a:cxn>
-                <a:cxn ang="0">
-                  <a:pos x="connsiteX4" y="connsiteY4"/>
-                </a:cxn>
-              </a:cxnLst>
-              <a:rect l="l" t="t" r="r" b="b"/>
-              <a:pathLst>
-                <a:path w="253716" h="225562">
-                  <a:moveTo>
-                    <a:pt x="253716" y="0"/>
-                  </a:moveTo>
-                  <a:lnTo>
-                    <a:pt x="253716" y="225562"/>
-                  </a:lnTo>
-                  <a:lnTo>
-                    <a:pt x="158079" y="217115"/>
-                  </a:lnTo>
-                  <a:cubicBezTo>
-                    <a:pt x="65183" y="199925"/>
-                    <a:pt x="0" y="159683"/>
-                    <a:pt x="0" y="112781"/>
-                  </a:cubicBezTo>
-                  <a:cubicBezTo>
-                    <a:pt x="0" y="65879"/>
-                    <a:pt x="65183" y="25637"/>
-                    <a:pt x="158079" y="8448"/>
-                  </a:cubicBezTo>
-                  <a:close/>
-                </a:path>
-              </a:pathLst>
-            </a:custGeom>
-            <a:noFill/>
-            <a:ln w="38100"/>
-          </p:spPr>
-          <p:style>
-            <a:lnRef idx="2">
-              <a:schemeClr val="accent1">
-                <a:shade val="50000"/>
-              </a:schemeClr>
-            </a:lnRef>
-            <a:fillRef idx="1">
-              <a:schemeClr val="accent1"/>
-            </a:fillRef>
-            <a:effectRef idx="0">
-              <a:schemeClr val="accent1"/>
-            </a:effectRef>
-            <a:fontRef idx="minor">
-              <a:schemeClr val="lt1"/>
-            </a:fontRef>
-          </p:style>
-          <p:txBody>
-            <a:bodyPr wrap="square" rtlCol="0" anchor="ctr">
-              <a:noAutofit/>
-            </a:bodyPr>
-            <a:lstStyle/>
-            <a:p>
-              <a:pPr algn="ctr"/>
-              <a:endParaRPr lang="en-DK"/>
-            </a:p>
-          </p:txBody>
-        </p:sp>
-        <p:sp>
-          <p:nvSpPr>
-            <p:cNvPr id="64" name="Freeform: Shape 63">
-              <a:extLst>
-                <a:ext uri="{FF2B5EF4-FFF2-40B4-BE49-F238E27FC236}">
-                  <a16:creationId xmlns:a16="http://schemas.microsoft.com/office/drawing/2014/main" id="{9607E7CF-5DA4-96D3-5042-1BE3DF692B01}"/>
-                </a:ext>
-              </a:extLst>
-            </p:cNvPr>
-            <p:cNvSpPr/>
-            <p:nvPr/>
-          </p:nvSpPr>
-          <p:spPr>
-            <a:xfrm>
-              <a:off x="5944516" y="3881659"/>
-              <a:ext cx="253716" cy="225562"/>
-            </a:xfrm>
-            <a:custGeom>
-              <a:avLst/>
-              <a:gdLst>
-                <a:gd name="connsiteX0" fmla="*/ 253716 w 253716"/>
-                <a:gd name="connsiteY0" fmla="*/ 0 h 225562"/>
-                <a:gd name="connsiteX1" fmla="*/ 253716 w 253716"/>
-                <a:gd name="connsiteY1" fmla="*/ 225562 h 225562"/>
-                <a:gd name="connsiteX2" fmla="*/ 158079 w 253716"/>
-                <a:gd name="connsiteY2" fmla="*/ 217115 h 225562"/>
-                <a:gd name="connsiteX3" fmla="*/ 0 w 253716"/>
-                <a:gd name="connsiteY3" fmla="*/ 112781 h 225562"/>
-                <a:gd name="connsiteX4" fmla="*/ 158079 w 253716"/>
-                <a:gd name="connsiteY4" fmla="*/ 8448 h 225562"/>
-              </a:gdLst>
-              <a:ahLst/>
-              <a:cxnLst>
-                <a:cxn ang="0">
-                  <a:pos x="connsiteX0" y="connsiteY0"/>
-                </a:cxn>
-                <a:cxn ang="0">
-                  <a:pos x="connsiteX1" y="connsiteY1"/>
-                </a:cxn>
-                <a:cxn ang="0">
-                  <a:pos x="connsiteX2" y="connsiteY2"/>
-                </a:cxn>
-                <a:cxn ang="0">
-                  <a:pos x="connsiteX3" y="connsiteY3"/>
-                </a:cxn>
-                <a:cxn ang="0">
-                  <a:pos x="connsiteX4" y="connsiteY4"/>
-                </a:cxn>
-              </a:cxnLst>
-              <a:rect l="l" t="t" r="r" b="b"/>
-              <a:pathLst>
-                <a:path w="253716" h="225562">
-                  <a:moveTo>
-                    <a:pt x="253716" y="0"/>
-                  </a:moveTo>
-                  <a:lnTo>
-                    <a:pt x="253716" y="225562"/>
-                  </a:lnTo>
-                  <a:lnTo>
-                    <a:pt x="158079" y="217115"/>
-                  </a:lnTo>
-                  <a:cubicBezTo>
-                    <a:pt x="65183" y="199925"/>
-                    <a:pt x="0" y="159683"/>
-                    <a:pt x="0" y="112781"/>
-                  </a:cubicBezTo>
-                  <a:cubicBezTo>
-                    <a:pt x="0" y="65879"/>
-                    <a:pt x="65183" y="25637"/>
-                    <a:pt x="158079" y="8448"/>
-                  </a:cubicBezTo>
-                  <a:close/>
-                </a:path>
-              </a:pathLst>
-            </a:custGeom>
-            <a:noFill/>
-            <a:ln w="38100"/>
-          </p:spPr>
-          <p:style>
-            <a:lnRef idx="2">
-              <a:schemeClr val="accent1">
-                <a:shade val="50000"/>
-              </a:schemeClr>
-            </a:lnRef>
-            <a:fillRef idx="1">
-              <a:schemeClr val="accent1"/>
-            </a:fillRef>
-            <a:effectRef idx="0">
-              <a:schemeClr val="accent1"/>
-            </a:effectRef>
-            <a:fontRef idx="minor">
-              <a:schemeClr val="lt1"/>
-            </a:fontRef>
-          </p:style>
-          <p:txBody>
-            <a:bodyPr wrap="square" rtlCol="0" anchor="ctr">
-              <a:noAutofit/>
-            </a:bodyPr>
-            <a:lstStyle/>
-            <a:p>
-              <a:pPr algn="ctr"/>
-              <a:endParaRPr lang="en-DK"/>
-            </a:p>
-          </p:txBody>
-        </p:sp>
-        <p:sp>
-          <p:nvSpPr>
-            <p:cNvPr id="66" name="Rectangle 65">
-              <a:extLst>
-                <a:ext uri="{FF2B5EF4-FFF2-40B4-BE49-F238E27FC236}">
-                  <a16:creationId xmlns:a16="http://schemas.microsoft.com/office/drawing/2014/main" id="{21DF2710-2D08-FD43-9AC8-D62428E22FD7}"/>
-                </a:ext>
-              </a:extLst>
-            </p:cNvPr>
-            <p:cNvSpPr/>
-            <p:nvPr/>
-          </p:nvSpPr>
-          <p:spPr>
-            <a:xfrm>
-              <a:off x="6170842" y="3452847"/>
-              <a:ext cx="291457" cy="625167"/>
-            </a:xfrm>
-            <a:prstGeom prst="rect">
-              <a:avLst/>
-            </a:prstGeom>
-            <a:solidFill>
-              <a:schemeClr val="bg1"/>
-            </a:solidFill>
-            <a:ln>
-              <a:solidFill>
-                <a:schemeClr val="bg1"/>
-              </a:solidFill>
-            </a:ln>
-          </p:spPr>
-          <p:style>
-            <a:lnRef idx="2">
-              <a:schemeClr val="accent1">
-                <a:shade val="50000"/>
-              </a:schemeClr>
-            </a:lnRef>
-            <a:fillRef idx="1">
-              <a:schemeClr val="accent1"/>
-            </a:fillRef>
-            <a:effectRef idx="0">
-              <a:schemeClr val="accent1"/>
-            </a:effectRef>
-            <a:fontRef idx="minor">
-              <a:schemeClr val="lt1"/>
-            </a:fontRef>
-          </p:style>
-          <p:txBody>
-            <a:bodyPr rtlCol="0" anchor="ctr"/>
-            <a:lstStyle/>
-            <a:p>
-              <a:pPr algn="ctr"/>
-              <a:endParaRPr lang="en-DK"/>
-            </a:p>
-          </p:txBody>
-        </p:sp>
-        <p:cxnSp>
-          <p:nvCxnSpPr>
-            <p:cNvPr id="69" name="Straight Connector 68">
-              <a:extLst>
-                <a:ext uri="{FF2B5EF4-FFF2-40B4-BE49-F238E27FC236}">
-                  <a16:creationId xmlns:a16="http://schemas.microsoft.com/office/drawing/2014/main" id="{B14C8072-9F81-7D1B-C042-5EF5D65FB1D0}"/>
-                </a:ext>
-              </a:extLst>
-            </p:cNvPr>
-            <p:cNvCxnSpPr>
-              <a:cxnSpLocks/>
-              <a:endCxn id="25" idx="0"/>
-            </p:cNvCxnSpPr>
-            <p:nvPr/>
-          </p:nvCxnSpPr>
-          <p:spPr>
-            <a:xfrm flipH="1">
-              <a:off x="6964472" y="1536625"/>
-              <a:ext cx="50206" cy="1478113"/>
-            </a:xfrm>
-            <a:prstGeom prst="line">
-              <a:avLst/>
-            </a:prstGeom>
-            <a:ln w="38100"/>
-          </p:spPr>
-          <p:style>
-            <a:lnRef idx="1">
-              <a:schemeClr val="accent1"/>
-            </a:lnRef>
-            <a:fillRef idx="0">
-              <a:schemeClr val="accent1"/>
-            </a:fillRef>
-            <a:effectRef idx="0">
-              <a:schemeClr val="accent1"/>
-            </a:effectRef>
-            <a:fontRef idx="minor">
-              <a:schemeClr val="tx1"/>
-            </a:fontRef>
-          </p:style>
-        </p:cxnSp>
-        <p:grpSp>
-          <p:nvGrpSpPr>
-            <p:cNvPr id="72" name="Group 71">
-              <a:extLst>
-                <a:ext uri="{FF2B5EF4-FFF2-40B4-BE49-F238E27FC236}">
-                  <a16:creationId xmlns:a16="http://schemas.microsoft.com/office/drawing/2014/main" id="{F624F559-F909-CAE3-1732-405C4DC9035F}"/>
-                </a:ext>
-              </a:extLst>
-            </p:cNvPr>
-            <p:cNvGrpSpPr/>
-            <p:nvPr/>
-          </p:nvGrpSpPr>
-          <p:grpSpPr>
-            <a:xfrm flipH="1">
-              <a:off x="6711425" y="1840531"/>
-              <a:ext cx="556300" cy="124127"/>
-              <a:chOff x="8257117" y="1115678"/>
-              <a:chExt cx="556300" cy="124127"/>
-            </a:xfrm>
-          </p:grpSpPr>
-          <p:cxnSp>
-            <p:nvCxnSpPr>
-              <p:cNvPr id="73" name="Straight Connector 72">
-                <a:extLst>
-                  <a:ext uri="{FF2B5EF4-FFF2-40B4-BE49-F238E27FC236}">
-                    <a16:creationId xmlns:a16="http://schemas.microsoft.com/office/drawing/2014/main" id="{69C797AE-A21D-81DA-8CAA-10C67A319098}"/>
-                  </a:ext>
-                </a:extLst>
-              </p:cNvPr>
-              <p:cNvCxnSpPr>
-                <a:cxnSpLocks/>
-              </p:cNvCxnSpPr>
-              <p:nvPr/>
-            </p:nvCxnSpPr>
-            <p:spPr>
-              <a:xfrm>
-                <a:off x="8291154" y="1239805"/>
-                <a:ext cx="450993" cy="0"/>
-              </a:xfrm>
-              <a:prstGeom prst="line">
-                <a:avLst/>
-              </a:prstGeom>
-              <a:ln w="38100"/>
-            </p:spPr>
-            <p:style>
-              <a:lnRef idx="1">
-                <a:schemeClr val="accent1"/>
-              </a:lnRef>
-              <a:fillRef idx="0">
-                <a:schemeClr val="accent1"/>
-              </a:fillRef>
-              <a:effectRef idx="0">
-                <a:schemeClr val="accent1"/>
-              </a:effectRef>
-              <a:fontRef idx="minor">
-                <a:schemeClr val="tx1"/>
-              </a:fontRef>
-            </p:style>
-          </p:cxnSp>
-          <p:cxnSp>
-            <p:nvCxnSpPr>
-              <p:cNvPr id="74" name="Straight Connector 73">
-                <a:extLst>
-                  <a:ext uri="{FF2B5EF4-FFF2-40B4-BE49-F238E27FC236}">
-                    <a16:creationId xmlns:a16="http://schemas.microsoft.com/office/drawing/2014/main" id="{48F28497-4A1A-3702-2BEC-1AE70091B521}"/>
-                  </a:ext>
-                </a:extLst>
-              </p:cNvPr>
-              <p:cNvCxnSpPr>
-                <a:cxnSpLocks/>
-              </p:cNvCxnSpPr>
-              <p:nvPr/>
-            </p:nvCxnSpPr>
-            <p:spPr>
-              <a:xfrm>
-                <a:off x="8291154" y="1115678"/>
-                <a:ext cx="450993" cy="0"/>
-              </a:xfrm>
-              <a:prstGeom prst="line">
-                <a:avLst/>
-              </a:prstGeom>
-              <a:ln w="38100"/>
-            </p:spPr>
-            <p:style>
-              <a:lnRef idx="1">
-                <a:schemeClr val="accent1"/>
-              </a:lnRef>
-              <a:fillRef idx="0">
-                <a:schemeClr val="accent1"/>
-              </a:fillRef>
-              <a:effectRef idx="0">
-                <a:schemeClr val="accent1"/>
-              </a:effectRef>
-              <a:fontRef idx="minor">
-                <a:schemeClr val="tx1"/>
-              </a:fontRef>
-            </p:style>
-          </p:cxnSp>
-          <p:sp>
-            <p:nvSpPr>
-              <p:cNvPr id="75" name="Rectangle 74">
-                <a:extLst>
-                  <a:ext uri="{FF2B5EF4-FFF2-40B4-BE49-F238E27FC236}">
-                    <a16:creationId xmlns:a16="http://schemas.microsoft.com/office/drawing/2014/main" id="{8532AC6E-5A0D-E208-DCF3-DE3281C41EE9}"/>
-                  </a:ext>
-                </a:extLst>
-              </p:cNvPr>
-              <p:cNvSpPr/>
-              <p:nvPr/>
-            </p:nvSpPr>
-            <p:spPr>
-              <a:xfrm>
-                <a:off x="8257117" y="1134987"/>
-                <a:ext cx="556300" cy="85509"/>
-              </a:xfrm>
-              <a:prstGeom prst="rect">
-                <a:avLst/>
-              </a:prstGeom>
-              <a:solidFill>
-                <a:schemeClr val="bg1"/>
-              </a:solidFill>
-              <a:ln>
-                <a:solidFill>
-                  <a:schemeClr val="bg1"/>
-                </a:solidFill>
-              </a:ln>
-            </p:spPr>
-            <p:style>
-              <a:lnRef idx="2">
-                <a:schemeClr val="accent1">
-                  <a:shade val="50000"/>
-                </a:schemeClr>
-              </a:lnRef>
-              <a:fillRef idx="1">
-                <a:schemeClr val="accent1"/>
-              </a:fillRef>
-              <a:effectRef idx="0">
-                <a:schemeClr val="accent1"/>
-              </a:effectRef>
-              <a:fontRef idx="minor">
-                <a:schemeClr val="lt1"/>
-              </a:fontRef>
-            </p:style>
-            <p:txBody>
-              <a:bodyPr rtlCol="0" anchor="ctr"/>
-              <a:lstStyle/>
-              <a:p>
-                <a:pPr algn="ctr"/>
-                <a:endParaRPr lang="en-DK" dirty="0"/>
-              </a:p>
-            </p:txBody>
-          </p:sp>
-        </p:grpSp>
       </p:grpSp>
     </p:spTree>
     <p:extLst>
@@ -11047,8 +11261,8 @@
           </a:p>
         </p:txBody>
       </p:sp>
-      <mc:AlternateContent xmlns:mc="http://schemas.openxmlformats.org/markup-compatibility/2006">
-        <mc:Choice xmlns:a14="http://schemas.microsoft.com/office/drawing/2010/main" Requires="a14">
+      <mc:AlternateContent xmlns:mc="http://schemas.openxmlformats.org/markup-compatibility/2006" xmlns:a14="http://schemas.microsoft.com/office/drawing/2010/main">
+        <mc:Choice Requires="a14">
           <p:sp>
             <p:nvSpPr>
               <p:cNvPr id="10" name="TextBox 9">
@@ -11098,7 +11312,7 @@
             </p:txBody>
           </p:sp>
         </mc:Choice>
-        <mc:Fallback>
+        <mc:Fallback xmlns="">
           <p:sp>
             <p:nvSpPr>
               <p:cNvPr id="10" name="TextBox 9">
@@ -11408,8 +11622,8 @@
           </a:p>
         </p:txBody>
       </p:sp>
-      <mc:AlternateContent xmlns:mc="http://schemas.openxmlformats.org/markup-compatibility/2006">
-        <mc:Choice xmlns:a14="http://schemas.microsoft.com/office/drawing/2010/main" Requires="a14">
+      <mc:AlternateContent xmlns:mc="http://schemas.openxmlformats.org/markup-compatibility/2006" xmlns:a14="http://schemas.microsoft.com/office/drawing/2010/main">
+        <mc:Choice Requires="a14">
           <p:sp>
             <p:nvSpPr>
               <p:cNvPr id="8" name="TextBox 7">
@@ -11462,7 +11676,7 @@
             </p:txBody>
           </p:sp>
         </mc:Choice>
-        <mc:Fallback>
+        <mc:Fallback xmlns="">
           <p:sp>
             <p:nvSpPr>
               <p:cNvPr id="8" name="TextBox 7">
@@ -11622,8 +11836,8 @@
           </a:p>
         </p:txBody>
       </p:sp>
-      <mc:AlternateContent xmlns:mc="http://schemas.openxmlformats.org/markup-compatibility/2006">
-        <mc:Choice xmlns:a14="http://schemas.microsoft.com/office/drawing/2010/main" Requires="a14">
+      <mc:AlternateContent xmlns:mc="http://schemas.openxmlformats.org/markup-compatibility/2006" xmlns:a14="http://schemas.microsoft.com/office/drawing/2010/main">
+        <mc:Choice Requires="a14">
           <p:sp>
             <p:nvSpPr>
               <p:cNvPr id="9" name="TextBox 8">
@@ -11673,7 +11887,7 @@
             </p:txBody>
           </p:sp>
         </mc:Choice>
-        <mc:Fallback>
+        <mc:Fallback xmlns="">
           <p:sp>
             <p:nvSpPr>
               <p:cNvPr id="9" name="TextBox 8">
@@ -12093,8 +12307,8 @@
           </a:p>
         </p:txBody>
       </p:sp>
-      <mc:AlternateContent xmlns:mc="http://schemas.openxmlformats.org/markup-compatibility/2006">
-        <mc:Choice xmlns:a14="http://schemas.microsoft.com/office/drawing/2010/main" Requires="a14">
+      <mc:AlternateContent xmlns:mc="http://schemas.openxmlformats.org/markup-compatibility/2006" xmlns:a14="http://schemas.microsoft.com/office/drawing/2010/main">
+        <mc:Choice Requires="a14">
           <p:sp>
             <p:nvSpPr>
               <p:cNvPr id="11" name="TextBox 10">
@@ -12163,7 +12377,7 @@
             </p:txBody>
           </p:sp>
         </mc:Choice>
-        <mc:Fallback>
+        <mc:Fallback xmlns="">
           <p:sp>
             <p:nvSpPr>
               <p:cNvPr id="11" name="TextBox 10">
@@ -12280,8 +12494,8 @@
           </a:p>
         </p:txBody>
       </p:sp>
-      <mc:AlternateContent xmlns:mc="http://schemas.openxmlformats.org/markup-compatibility/2006">
-        <mc:Choice xmlns:a14="http://schemas.microsoft.com/office/drawing/2010/main" Requires="a14">
+      <mc:AlternateContent xmlns:mc="http://schemas.openxmlformats.org/markup-compatibility/2006" xmlns:a14="http://schemas.microsoft.com/office/drawing/2010/main">
+        <mc:Choice Requires="a14">
           <p:sp>
             <p:nvSpPr>
               <p:cNvPr id="14" name="TextBox 13">
@@ -12331,7 +12545,7 @@
             </p:txBody>
           </p:sp>
         </mc:Choice>
-        <mc:Fallback>
+        <mc:Fallback xmlns="">
           <p:sp>
             <p:nvSpPr>
               <p:cNvPr id="14" name="TextBox 13">
@@ -12418,8 +12632,8 @@
           <a:chExt cx="0" cy="0"/>
         </a:xfrm>
       </p:grpSpPr>
-      <mc:AlternateContent xmlns:mc="http://schemas.openxmlformats.org/markup-compatibility/2006">
-        <mc:Choice xmlns:a14="http://schemas.microsoft.com/office/drawing/2010/main" Requires="a14">
+      <mc:AlternateContent xmlns:mc="http://schemas.openxmlformats.org/markup-compatibility/2006" xmlns:a14="http://schemas.microsoft.com/office/drawing/2010/main">
+        <mc:Choice Requires="a14">
           <p:sp>
             <p:nvSpPr>
               <p:cNvPr id="8" name="Rectangle 7">
@@ -12533,7 +12747,7 @@
             </p:txBody>
           </p:sp>
         </mc:Choice>
-        <mc:Fallback>
+        <mc:Fallback xmlns="">
           <p:sp>
             <p:nvSpPr>
               <p:cNvPr id="8" name="Rectangle 7">
@@ -12593,8 +12807,8 @@
           </p:sp>
         </mc:Fallback>
       </mc:AlternateContent>
-      <mc:AlternateContent xmlns:mc="http://schemas.openxmlformats.org/markup-compatibility/2006">
-        <mc:Choice xmlns:a14="http://schemas.microsoft.com/office/drawing/2010/main" Requires="a14">
+      <mc:AlternateContent xmlns:mc="http://schemas.openxmlformats.org/markup-compatibility/2006" xmlns:a14="http://schemas.microsoft.com/office/drawing/2010/main">
+        <mc:Choice Requires="a14">
           <p:sp>
             <p:nvSpPr>
               <p:cNvPr id="9" name="Rectangle 8">
@@ -12708,7 +12922,7 @@
             </p:txBody>
           </p:sp>
         </mc:Choice>
-        <mc:Fallback>
+        <mc:Fallback xmlns="">
           <p:sp>
             <p:nvSpPr>
               <p:cNvPr id="9" name="Rectangle 8">
@@ -13052,8 +13266,8 @@
           </a:p>
         </p:txBody>
       </p:sp>
-      <mc:AlternateContent xmlns:mc="http://schemas.openxmlformats.org/markup-compatibility/2006">
-        <mc:Choice xmlns:a14="http://schemas.microsoft.com/office/drawing/2010/main" Requires="a14">
+      <mc:AlternateContent xmlns:mc="http://schemas.openxmlformats.org/markup-compatibility/2006" xmlns:a14="http://schemas.microsoft.com/office/drawing/2010/main">
+        <mc:Choice Requires="a14">
           <p:sp>
             <p:nvSpPr>
               <p:cNvPr id="14" name="TextBox 13">
@@ -13103,7 +13317,7 @@
             </p:txBody>
           </p:sp>
         </mc:Choice>
-        <mc:Fallback>
+        <mc:Fallback xmlns="">
           <p:sp>
             <p:nvSpPr>
               <p:cNvPr id="14" name="TextBox 13">
@@ -13148,8 +13362,8 @@
           </p:sp>
         </mc:Fallback>
       </mc:AlternateContent>
-      <mc:AlternateContent xmlns:mc="http://schemas.openxmlformats.org/markup-compatibility/2006">
-        <mc:Choice xmlns:a14="http://schemas.microsoft.com/office/drawing/2010/main" Requires="a14">
+      <mc:AlternateContent xmlns:mc="http://schemas.openxmlformats.org/markup-compatibility/2006" xmlns:a14="http://schemas.microsoft.com/office/drawing/2010/main">
+        <mc:Choice Requires="a14">
           <p:sp>
             <p:nvSpPr>
               <p:cNvPr id="16" name="TextBox 15">
@@ -13218,7 +13432,7 @@
             </p:txBody>
           </p:sp>
         </mc:Choice>
-        <mc:Fallback>
+        <mc:Fallback xmlns="">
           <p:sp>
             <p:nvSpPr>
               <p:cNvPr id="16" name="TextBox 15">
@@ -14906,8 +15120,8 @@
           </a:p>
         </p:txBody>
       </p:sp>
-      <mc:AlternateContent xmlns:mc="http://schemas.openxmlformats.org/markup-compatibility/2006">
-        <mc:Choice xmlns:a14="http://schemas.microsoft.com/office/drawing/2010/main" Requires="a14">
+      <mc:AlternateContent xmlns:mc="http://schemas.openxmlformats.org/markup-compatibility/2006" xmlns:a14="http://schemas.microsoft.com/office/drawing/2010/main">
+        <mc:Choice Requires="a14">
           <p:sp>
             <p:nvSpPr>
               <p:cNvPr id="10" name="TextBox 9">
@@ -14957,7 +15171,7 @@
             </p:txBody>
           </p:sp>
         </mc:Choice>
-        <mc:Fallback>
+        <mc:Fallback xmlns="">
           <p:sp>
             <p:nvSpPr>
               <p:cNvPr id="10" name="TextBox 9">
@@ -15327,8 +15541,8 @@
           </a:p>
         </p:txBody>
       </p:sp>
-      <mc:AlternateContent xmlns:mc="http://schemas.openxmlformats.org/markup-compatibility/2006">
-        <mc:Choice xmlns:a14="http://schemas.microsoft.com/office/drawing/2010/main" Requires="a14">
+      <mc:AlternateContent xmlns:mc="http://schemas.openxmlformats.org/markup-compatibility/2006" xmlns:a14="http://schemas.microsoft.com/office/drawing/2010/main">
+        <mc:Choice Requires="a14">
           <p:sp>
             <p:nvSpPr>
               <p:cNvPr id="5" name="Rectangle 4">
@@ -15450,7 +15664,7 @@
             </p:txBody>
           </p:sp>
         </mc:Choice>
-        <mc:Fallback>
+        <mc:Fallback xmlns="">
           <p:sp>
             <p:nvSpPr>
               <p:cNvPr id="5" name="Rectangle 4">
@@ -15510,8 +15724,8 @@
           </p:sp>
         </mc:Fallback>
       </mc:AlternateContent>
-      <mc:AlternateContent xmlns:mc="http://schemas.openxmlformats.org/markup-compatibility/2006">
-        <mc:Choice xmlns:a14="http://schemas.microsoft.com/office/drawing/2010/main" Requires="a14">
+      <mc:AlternateContent xmlns:mc="http://schemas.openxmlformats.org/markup-compatibility/2006" xmlns:a14="http://schemas.microsoft.com/office/drawing/2010/main">
+        <mc:Choice Requires="a14">
           <p:sp>
             <p:nvSpPr>
               <p:cNvPr id="6" name="Rectangle 5">
@@ -15625,7 +15839,7 @@
             </p:txBody>
           </p:sp>
         </mc:Choice>
-        <mc:Fallback>
+        <mc:Fallback xmlns="">
           <p:sp>
             <p:nvSpPr>
               <p:cNvPr id="6" name="Rectangle 5">
@@ -15800,8 +16014,8 @@
           </a:p>
         </p:txBody>
       </p:sp>
-      <mc:AlternateContent xmlns:mc="http://schemas.openxmlformats.org/markup-compatibility/2006">
-        <mc:Choice xmlns:a14="http://schemas.microsoft.com/office/drawing/2010/main" Requires="a14">
+      <mc:AlternateContent xmlns:mc="http://schemas.openxmlformats.org/markup-compatibility/2006" xmlns:a14="http://schemas.microsoft.com/office/drawing/2010/main">
+        <mc:Choice Requires="a14">
           <p:sp>
             <p:nvSpPr>
               <p:cNvPr id="10" name="TextBox 9">
@@ -15851,7 +16065,7 @@
             </p:txBody>
           </p:sp>
         </mc:Choice>
-        <mc:Fallback>
+        <mc:Fallback xmlns="">
           <p:sp>
             <p:nvSpPr>
               <p:cNvPr id="10" name="TextBox 9">

</xml_diff>